<commit_message>
added some ppx data
</commit_message>
<xml_diff>
--- a/Airbnb prices analysis powerpoint.pptx
+++ b/Airbnb prices analysis powerpoint.pptx
@@ -8,6 +8,8 @@
     <p:sldId id="256" r:id="rId2"/>
     <p:sldId id="257" r:id="rId3"/>
     <p:sldId id="258" r:id="rId4"/>
+    <p:sldId id="259" r:id="rId5"/>
+    <p:sldId id="260" r:id="rId6"/>
   </p:sldIdLst>
   <p:sldSz cx="12192000" cy="6858000"/>
   <p:notesSz cx="6858000" cy="9144000"/>
@@ -5381,6 +5383,2417 @@
 </p:sld>
 </file>
 
+<file path=ppt/slides/slide4.xml><?xml version="1.0" encoding="utf-8"?>
+<p:sld xmlns:a="http://schemas.openxmlformats.org/drawingml/2006/main" xmlns:r="http://schemas.openxmlformats.org/officeDocument/2006/relationships" xmlns:p="http://schemas.openxmlformats.org/presentationml/2006/main">
+  <p:cSld>
+    <p:spTree>
+      <p:nvGrpSpPr>
+        <p:cNvPr id="1" name=""/>
+        <p:cNvGrpSpPr/>
+        <p:nvPr/>
+      </p:nvGrpSpPr>
+      <p:grpSpPr>
+        <a:xfrm>
+          <a:off x="0" y="0"/>
+          <a:ext cx="0" cy="0"/>
+          <a:chOff x="0" y="0"/>
+          <a:chExt cx="0" cy="0"/>
+        </a:xfrm>
+      </p:grpSpPr>
+      <p:sp>
+        <p:nvSpPr>
+          <p:cNvPr id="2" name="Title 1">
+            <a:extLst>
+              <a:ext uri="{FF2B5EF4-FFF2-40B4-BE49-F238E27FC236}">
+                <a16:creationId xmlns:a16="http://schemas.microsoft.com/office/drawing/2014/main" id="{40600A46-BB12-E393-6BDF-EEE2FFB5A093}"/>
+              </a:ext>
+            </a:extLst>
+          </p:cNvPr>
+          <p:cNvSpPr>
+            <a:spLocks noGrp="1"/>
+          </p:cNvSpPr>
+          <p:nvPr>
+            <p:ph type="title"/>
+          </p:nvPr>
+        </p:nvSpPr>
+        <p:spPr>
+          <a:xfrm>
+            <a:off x="4277169" y="193006"/>
+            <a:ext cx="3831336" cy="1288509"/>
+          </a:xfrm>
+        </p:spPr>
+        <p:txBody>
+          <a:bodyPr anchor="ctr" anchorCtr="0">
+            <a:normAutofit/>
+          </a:bodyPr>
+          <a:lstStyle/>
+          <a:p>
+            <a:pPr marL="0" marR="0">
+              <a:spcBef>
+                <a:spcPts val="0"/>
+              </a:spcBef>
+              <a:spcAft>
+                <a:spcPts val="0"/>
+              </a:spcAft>
+            </a:pPr>
+            <a:r>
+              <a:rPr lang="en-US" sz="3200" kern="100" dirty="0">
+                <a:solidFill>
+                  <a:srgbClr val="000000"/>
+                </a:solidFill>
+                <a:effectLst/>
+                <a:latin typeface="Calibri" panose="020F0502020204030204" pitchFamily="34" charset="0"/>
+                <a:ea typeface="Calibri" panose="020F0502020204030204" pitchFamily="34" charset="0"/>
+                <a:cs typeface="Arial" panose="020B0604020202020204" pitchFamily="34" charset="0"/>
+              </a:rPr>
+              <a:t>Histogram Analysis:</a:t>
+            </a:r>
+            <a:endParaRPr lang="en-US" sz="3200" kern="100" dirty="0">
+              <a:effectLst/>
+              <a:latin typeface="Calibri" panose="020F0502020204030204" pitchFamily="34" charset="0"/>
+              <a:ea typeface="Calibri" panose="020F0502020204030204" pitchFamily="34" charset="0"/>
+              <a:cs typeface="Arial" panose="020B0604020202020204" pitchFamily="34" charset="0"/>
+            </a:endParaRPr>
+          </a:p>
+        </p:txBody>
+      </p:sp>
+      <p:pic>
+        <p:nvPicPr>
+          <p:cNvPr id="1028" name="Picture 4">
+            <a:extLst>
+              <a:ext uri="{FF2B5EF4-FFF2-40B4-BE49-F238E27FC236}">
+                <a16:creationId xmlns:a16="http://schemas.microsoft.com/office/drawing/2014/main" id="{1239B23B-61B5-A887-8186-F4F63B655094}"/>
+              </a:ext>
+            </a:extLst>
+          </p:cNvPr>
+          <p:cNvPicPr>
+            <a:picLocks noGrp="1" noChangeAspect="1" noChangeArrowheads="1"/>
+          </p:cNvPicPr>
+          <p:nvPr>
+            <p:ph idx="1"/>
+          </p:nvPr>
+        </p:nvPicPr>
+        <p:blipFill>
+          <a:blip r:embed="rId2">
+            <a:extLst>
+              <a:ext uri="{28A0092B-C50C-407E-A947-70E740481C1C}">
+                <a14:useLocalDpi xmlns:a14="http://schemas.microsoft.com/office/drawing/2010/main" val="0"/>
+              </a:ext>
+            </a:extLst>
+          </a:blip>
+          <a:srcRect/>
+          <a:stretch>
+            <a:fillRect/>
+          </a:stretch>
+        </p:blipFill>
+        <p:spPr bwMode="auto">
+          <a:xfrm>
+            <a:off x="5557917" y="1481515"/>
+            <a:ext cx="6324801" cy="4143203"/>
+          </a:xfrm>
+          <a:prstGeom prst="rect">
+            <a:avLst/>
+          </a:prstGeom>
+          <a:noFill/>
+          <a:extLst>
+            <a:ext uri="{909E8E84-426E-40DD-AFC4-6F175D3DCCD1}">
+              <a14:hiddenFill xmlns:a14="http://schemas.microsoft.com/office/drawing/2010/main">
+                <a:solidFill>
+                  <a:srgbClr val="FFFFFF"/>
+                </a:solidFill>
+              </a14:hiddenFill>
+            </a:ext>
+          </a:extLst>
+        </p:spPr>
+      </p:pic>
+      <p:sp>
+        <p:nvSpPr>
+          <p:cNvPr id="5" name="TextBox 4">
+            <a:extLst>
+              <a:ext uri="{FF2B5EF4-FFF2-40B4-BE49-F238E27FC236}">
+                <a16:creationId xmlns:a16="http://schemas.microsoft.com/office/drawing/2014/main" id="{C6396E51-AF7B-56ED-AED7-5848B18C702E}"/>
+              </a:ext>
+            </a:extLst>
+          </p:cNvPr>
+          <p:cNvSpPr txBox="1"/>
+          <p:nvPr/>
+        </p:nvSpPr>
+        <p:spPr>
+          <a:xfrm>
+            <a:off x="510988" y="1906512"/>
+            <a:ext cx="4636822" cy="3293209"/>
+          </a:xfrm>
+          <a:prstGeom prst="rect">
+            <a:avLst/>
+          </a:prstGeom>
+          <a:noFill/>
+        </p:spPr>
+        <p:txBody>
+          <a:bodyPr wrap="square" rtlCol="0">
+            <a:spAutoFit/>
+          </a:bodyPr>
+          <a:lstStyle/>
+          <a:p>
+            <a:endParaRPr lang="en-US" sz="1600" dirty="0"/>
+          </a:p>
+          <a:p>
+            <a:r>
+              <a:rPr lang="en-US" sz="1600" dirty="0"/>
+              <a:t>The Airbnb rental prices are mostly distributed under £2500, indicating that most of the data is concentrated on one end of the distribution. This type of distribution is commonly referred to as a "skewed right" distribution.</a:t>
+            </a:r>
+          </a:p>
+          <a:p>
+            <a:endParaRPr lang="en-US" sz="1600" dirty="0"/>
+          </a:p>
+          <a:p>
+            <a:pPr algn="l"/>
+            <a:r>
+              <a:rPr lang="en-US" sz="1600" dirty="0"/>
+              <a:t>To make this visualization more comprehensive, we are going to look at the bins of the data to identify where we can cut the data. By doing this, we can create a more balanced histogram that accurately reflects the distribution of the data.</a:t>
+            </a:r>
+          </a:p>
+        </p:txBody>
+      </p:sp>
+    </p:spTree>
+    <p:extLst>
+      <p:ext uri="{BB962C8B-B14F-4D97-AF65-F5344CB8AC3E}">
+        <p14:creationId xmlns:p14="http://schemas.microsoft.com/office/powerpoint/2010/main" val="2659196343"/>
+      </p:ext>
+    </p:extLst>
+  </p:cSld>
+  <p:clrMapOvr>
+    <a:masterClrMapping/>
+  </p:clrMapOvr>
+</p:sld>
+</file>
+
+<file path=ppt/slides/slide5.xml><?xml version="1.0" encoding="utf-8"?>
+<p:sld xmlns:a="http://schemas.openxmlformats.org/drawingml/2006/main" xmlns:r="http://schemas.openxmlformats.org/officeDocument/2006/relationships" xmlns:p="http://schemas.openxmlformats.org/presentationml/2006/main">
+  <p:cSld>
+    <p:bg>
+      <p:bgPr>
+        <a:solidFill>
+          <a:schemeClr val="bg1"/>
+        </a:solidFill>
+        <a:effectLst/>
+      </p:bgPr>
+    </p:bg>
+    <p:spTree>
+      <p:nvGrpSpPr>
+        <p:cNvPr id="1" name=""/>
+        <p:cNvGrpSpPr/>
+        <p:nvPr/>
+      </p:nvGrpSpPr>
+      <p:grpSpPr>
+        <a:xfrm>
+          <a:off x="0" y="0"/>
+          <a:ext cx="0" cy="0"/>
+          <a:chOff x="0" y="0"/>
+          <a:chExt cx="0" cy="0"/>
+        </a:xfrm>
+      </p:grpSpPr>
+      <p:sp>
+        <p:nvSpPr>
+          <p:cNvPr id="9" name="Rectangle 8">
+            <a:extLst>
+              <a:ext uri="{FF2B5EF4-FFF2-40B4-BE49-F238E27FC236}">
+                <a16:creationId xmlns:a16="http://schemas.microsoft.com/office/drawing/2014/main" id="{C5176844-69C3-4F79-BE38-EA5BDDF4FEA4}"/>
+              </a:ext>
+              <a:ext uri="{C183D7F6-B498-43B3-948B-1728B52AA6E4}">
+                <adec:decorative xmlns:adec="http://schemas.microsoft.com/office/drawing/2017/decorative" val="1"/>
+              </a:ext>
+            </a:extLst>
+          </p:cNvPr>
+          <p:cNvSpPr>
+            <a:spLocks noGrp="1" noRot="1" noChangeAspect="1" noMove="1" noResize="1" noEditPoints="1" noAdjustHandles="1" noChangeArrowheads="1" noChangeShapeType="1" noTextEdit="1"/>
+          </p:cNvSpPr>
+          <p:nvPr>
+            <p:extLst>
+              <p:ext uri="{386F3935-93C4-4BCD-93E2-E3B085C9AB24}">
+                <p16:designElem xmlns:p16="http://schemas.microsoft.com/office/powerpoint/2015/main" val="1"/>
+              </p:ext>
+            </p:extLst>
+          </p:nvPr>
+        </p:nvSpPr>
+        <p:spPr>
+          <a:xfrm>
+            <a:off x="0" y="0"/>
+            <a:ext cx="12192000" cy="6858000"/>
+          </a:xfrm>
+          <a:prstGeom prst="rect">
+            <a:avLst/>
+          </a:prstGeom>
+          <a:solidFill>
+            <a:schemeClr val="tx1">
+              <a:lumMod val="85000"/>
+              <a:lumOff val="15000"/>
+            </a:schemeClr>
+          </a:solidFill>
+          <a:ln>
+            <a:noFill/>
+          </a:ln>
+        </p:spPr>
+        <p:style>
+          <a:lnRef idx="2">
+            <a:schemeClr val="accent1">
+              <a:shade val="50000"/>
+            </a:schemeClr>
+          </a:lnRef>
+          <a:fillRef idx="1">
+            <a:schemeClr val="accent1"/>
+          </a:fillRef>
+          <a:effectRef idx="0">
+            <a:schemeClr val="accent1"/>
+          </a:effectRef>
+          <a:fontRef idx="minor">
+            <a:schemeClr val="lt1"/>
+          </a:fontRef>
+        </p:style>
+        <p:txBody>
+          <a:bodyPr rtlCol="0" anchor="ctr"/>
+          <a:lstStyle/>
+          <a:p>
+            <a:pPr algn="ctr"/>
+            <a:endParaRPr lang="en-US"/>
+          </a:p>
+        </p:txBody>
+      </p:sp>
+      <p:cxnSp>
+        <p:nvCxnSpPr>
+          <p:cNvPr id="11" name="Straight Connector 10">
+            <a:extLst>
+              <a:ext uri="{FF2B5EF4-FFF2-40B4-BE49-F238E27FC236}">
+                <a16:creationId xmlns:a16="http://schemas.microsoft.com/office/drawing/2014/main" id="{33862825-C012-4895-A17E-F3D1F62D89DD}"/>
+              </a:ext>
+              <a:ext uri="{C183D7F6-B498-43B3-948B-1728B52AA6E4}">
+                <adec:decorative xmlns:adec="http://schemas.microsoft.com/office/drawing/2017/decorative" val="1"/>
+              </a:ext>
+            </a:extLst>
+          </p:cNvPr>
+          <p:cNvCxnSpPr>
+            <a:cxnSpLocks noGrp="1" noRot="1" noChangeAspect="1" noMove="1" noResize="1" noEditPoints="1" noAdjustHandles="1" noChangeArrowheads="1" noChangeShapeType="1"/>
+          </p:cNvCxnSpPr>
+          <p:nvPr>
+            <p:extLst>
+              <p:ext uri="{386F3935-93C4-4BCD-93E2-E3B085C9AB24}">
+                <p16:designElem xmlns:p16="http://schemas.microsoft.com/office/powerpoint/2015/main" val="1"/>
+              </p:ext>
+            </p:extLst>
+          </p:nvPr>
+        </p:nvCxnSpPr>
+        <p:spPr>
+          <a:xfrm>
+            <a:off x="758952" y="1143293"/>
+            <a:ext cx="0" cy="5714707"/>
+          </a:xfrm>
+          <a:prstGeom prst="line">
+            <a:avLst/>
+          </a:prstGeom>
+          <a:ln w="19050">
+            <a:solidFill>
+              <a:schemeClr val="tx1">
+                <a:lumMod val="85000"/>
+                <a:lumOff val="15000"/>
+              </a:schemeClr>
+            </a:solidFill>
+          </a:ln>
+        </p:spPr>
+        <p:style>
+          <a:lnRef idx="1">
+            <a:schemeClr val="accent1"/>
+          </a:lnRef>
+          <a:fillRef idx="0">
+            <a:schemeClr val="accent1"/>
+          </a:fillRef>
+          <a:effectRef idx="0">
+            <a:schemeClr val="accent1"/>
+          </a:effectRef>
+          <a:fontRef idx="minor">
+            <a:schemeClr val="tx1"/>
+          </a:fontRef>
+        </p:style>
+      </p:cxnSp>
+      <p:sp>
+        <p:nvSpPr>
+          <p:cNvPr id="2" name="Title 1">
+            <a:extLst>
+              <a:ext uri="{FF2B5EF4-FFF2-40B4-BE49-F238E27FC236}">
+                <a16:creationId xmlns:a16="http://schemas.microsoft.com/office/drawing/2014/main" id="{42C549E1-66DC-DF8F-7E5E-0CBA631673F0}"/>
+              </a:ext>
+            </a:extLst>
+          </p:cNvPr>
+          <p:cNvSpPr>
+            <a:spLocks noGrp="1"/>
+          </p:cNvSpPr>
+          <p:nvPr>
+            <p:ph type="title"/>
+          </p:nvPr>
+        </p:nvSpPr>
+        <p:spPr>
+          <a:xfrm>
+            <a:off x="758953" y="1063256"/>
+            <a:ext cx="3382050" cy="4558954"/>
+          </a:xfrm>
+        </p:spPr>
+        <p:txBody>
+          <a:bodyPr anchor="ctr">
+            <a:normAutofit/>
+          </a:bodyPr>
+          <a:lstStyle/>
+          <a:p>
+            <a:endParaRPr lang="en-US">
+              <a:solidFill>
+                <a:schemeClr val="bg1"/>
+              </a:solidFill>
+            </a:endParaRPr>
+          </a:p>
+        </p:txBody>
+      </p:sp>
+      <p:sp useBgFill="1">
+        <p:nvSpPr>
+          <p:cNvPr id="13" name="Freeform: Shape 12">
+            <a:extLst>
+              <a:ext uri="{FF2B5EF4-FFF2-40B4-BE49-F238E27FC236}">
+                <a16:creationId xmlns:a16="http://schemas.microsoft.com/office/drawing/2014/main" id="{B96B26CA-9949-4D9C-A2F3-DB3CA283AD0C}"/>
+              </a:ext>
+              <a:ext uri="{C183D7F6-B498-43B3-948B-1728B52AA6E4}">
+                <adec:decorative xmlns:adec="http://schemas.microsoft.com/office/drawing/2017/decorative" val="1"/>
+              </a:ext>
+            </a:extLst>
+          </p:cNvPr>
+          <p:cNvSpPr>
+            <a:spLocks noGrp="1" noRot="1" noChangeAspect="1" noMove="1" noResize="1" noEditPoints="1" noAdjustHandles="1" noChangeArrowheads="1" noChangeShapeType="1" noTextEdit="1"/>
+          </p:cNvSpPr>
+          <p:nvPr>
+            <p:extLst>
+              <p:ext uri="{386F3935-93C4-4BCD-93E2-E3B085C9AB24}">
+                <p16:designElem xmlns:p16="http://schemas.microsoft.com/office/powerpoint/2015/main" val="1"/>
+              </p:ext>
+            </p:extLst>
+          </p:nvPr>
+        </p:nvSpPr>
+        <p:spPr>
+          <a:xfrm>
+            <a:off x="4576956" y="0"/>
+            <a:ext cx="7615044" cy="6858000"/>
+          </a:xfrm>
+          <a:custGeom>
+            <a:avLst/>
+            <a:gdLst>
+              <a:gd name="connsiteX0" fmla="*/ 2017353 w 7615044"/>
+              <a:gd name="connsiteY0" fmla="*/ 0 h 6858000"/>
+              <a:gd name="connsiteX1" fmla="*/ 3903088 w 7615044"/>
+              <a:gd name="connsiteY1" fmla="*/ 0 h 6858000"/>
+              <a:gd name="connsiteX2" fmla="*/ 5215066 w 7615044"/>
+              <a:gd name="connsiteY2" fmla="*/ 0 h 6858000"/>
+              <a:gd name="connsiteX3" fmla="*/ 7615044 w 7615044"/>
+              <a:gd name="connsiteY3" fmla="*/ 0 h 6858000"/>
+              <a:gd name="connsiteX4" fmla="*/ 7615044 w 7615044"/>
+              <a:gd name="connsiteY4" fmla="*/ 6858000 h 6858000"/>
+              <a:gd name="connsiteX5" fmla="*/ 5215066 w 7615044"/>
+              <a:gd name="connsiteY5" fmla="*/ 6858000 h 6858000"/>
+              <a:gd name="connsiteX6" fmla="*/ 3903088 w 7615044"/>
+              <a:gd name="connsiteY6" fmla="*/ 6858000 h 6858000"/>
+              <a:gd name="connsiteX7" fmla="*/ 1292431 w 7615044"/>
+              <a:gd name="connsiteY7" fmla="*/ 6858000 h 6858000"/>
+              <a:gd name="connsiteX8" fmla="*/ 1012702 w 7615044"/>
+              <a:gd name="connsiteY8" fmla="*/ 6549681 h 6858000"/>
+              <a:gd name="connsiteX9" fmla="*/ 0 w 7615044"/>
+              <a:gd name="connsiteY9" fmla="*/ 3723759 h 6858000"/>
+              <a:gd name="connsiteX10" fmla="*/ 1955279 w 7615044"/>
+              <a:gd name="connsiteY10" fmla="*/ 39865 h 6858000"/>
+            </a:gdLst>
+            <a:ahLst/>
+            <a:cxnLst>
+              <a:cxn ang="0">
+                <a:pos x="connsiteX0" y="connsiteY0"/>
+              </a:cxn>
+              <a:cxn ang="0">
+                <a:pos x="connsiteX1" y="connsiteY1"/>
+              </a:cxn>
+              <a:cxn ang="0">
+                <a:pos x="connsiteX2" y="connsiteY2"/>
+              </a:cxn>
+              <a:cxn ang="0">
+                <a:pos x="connsiteX3" y="connsiteY3"/>
+              </a:cxn>
+              <a:cxn ang="0">
+                <a:pos x="connsiteX4" y="connsiteY4"/>
+              </a:cxn>
+              <a:cxn ang="0">
+                <a:pos x="connsiteX5" y="connsiteY5"/>
+              </a:cxn>
+              <a:cxn ang="0">
+                <a:pos x="connsiteX6" y="connsiteY6"/>
+              </a:cxn>
+              <a:cxn ang="0">
+                <a:pos x="connsiteX7" y="connsiteY7"/>
+              </a:cxn>
+              <a:cxn ang="0">
+                <a:pos x="connsiteX8" y="connsiteY8"/>
+              </a:cxn>
+              <a:cxn ang="0">
+                <a:pos x="connsiteX9" y="connsiteY9"/>
+              </a:cxn>
+              <a:cxn ang="0">
+                <a:pos x="connsiteX10" y="connsiteY10"/>
+              </a:cxn>
+            </a:cxnLst>
+            <a:rect l="l" t="t" r="r" b="b"/>
+            <a:pathLst>
+              <a:path w="7615044" h="6858000">
+                <a:moveTo>
+                  <a:pt x="2017353" y="0"/>
+                </a:moveTo>
+                <a:lnTo>
+                  <a:pt x="3903088" y="0"/>
+                </a:lnTo>
+                <a:lnTo>
+                  <a:pt x="5215066" y="0"/>
+                </a:lnTo>
+                <a:lnTo>
+                  <a:pt x="7615044" y="0"/>
+                </a:lnTo>
+                <a:lnTo>
+                  <a:pt x="7615044" y="6858000"/>
+                </a:lnTo>
+                <a:lnTo>
+                  <a:pt x="5215066" y="6858000"/>
+                </a:lnTo>
+                <a:lnTo>
+                  <a:pt x="3903088" y="6858000"/>
+                </a:lnTo>
+                <a:lnTo>
+                  <a:pt x="1292431" y="6858000"/>
+                </a:lnTo>
+                <a:lnTo>
+                  <a:pt x="1012702" y="6549681"/>
+                </a:lnTo>
+                <a:cubicBezTo>
+                  <a:pt x="380046" y="5781733"/>
+                  <a:pt x="0" y="4797206"/>
+                  <a:pt x="0" y="3723759"/>
+                </a:cubicBezTo>
+                <a:cubicBezTo>
+                  <a:pt x="0" y="2190263"/>
+                  <a:pt x="775604" y="838237"/>
+                  <a:pt x="1955279" y="39865"/>
+                </a:cubicBezTo>
+                <a:close/>
+              </a:path>
+            </a:pathLst>
+          </a:custGeom>
+          <a:ln>
+            <a:noFill/>
+          </a:ln>
+        </p:spPr>
+        <p:style>
+          <a:lnRef idx="2">
+            <a:schemeClr val="accent1">
+              <a:shade val="50000"/>
+            </a:schemeClr>
+          </a:lnRef>
+          <a:fillRef idx="1">
+            <a:schemeClr val="accent1"/>
+          </a:fillRef>
+          <a:effectRef idx="0">
+            <a:schemeClr val="accent1"/>
+          </a:effectRef>
+          <a:fontRef idx="minor">
+            <a:schemeClr val="lt1"/>
+          </a:fontRef>
+        </p:style>
+        <p:txBody>
+          <a:bodyPr wrap="square" rtlCol="0" anchor="ctr">
+            <a:noAutofit/>
+          </a:bodyPr>
+          <a:lstStyle/>
+          <a:p>
+            <a:pPr algn="ctr"/>
+            <a:endParaRPr lang="en-US"/>
+          </a:p>
+        </p:txBody>
+      </p:sp>
+      <p:sp>
+        <p:nvSpPr>
+          <p:cNvPr id="15" name="Freeform 6">
+            <a:extLst>
+              <a:ext uri="{FF2B5EF4-FFF2-40B4-BE49-F238E27FC236}">
+                <a16:creationId xmlns:a16="http://schemas.microsoft.com/office/drawing/2014/main" id="{A101E513-AF74-4E9D-A31F-99664250722D}"/>
+              </a:ext>
+              <a:ext uri="{C183D7F6-B498-43B3-948B-1728B52AA6E4}">
+                <adec:decorative xmlns:adec="http://schemas.microsoft.com/office/drawing/2017/decorative" val="1"/>
+              </a:ext>
+            </a:extLst>
+          </p:cNvPr>
+          <p:cNvSpPr>
+            <a:spLocks noGrp="1" noRot="1" noChangeAspect="1" noMove="1" noResize="1" noEditPoints="1" noAdjustHandles="1" noChangeArrowheads="1" noChangeShapeType="1" noTextEdit="1"/>
+          </p:cNvSpPr>
+          <p:nvPr>
+            <p:extLst>
+              <p:ext uri="{386F3935-93C4-4BCD-93E2-E3B085C9AB24}">
+                <p16:designElem xmlns:p16="http://schemas.microsoft.com/office/powerpoint/2015/main" val="1"/>
+              </p:ext>
+            </p:extLst>
+          </p:nvPr>
+        </p:nvSpPr>
+        <p:spPr bwMode="auto">
+          <a:xfrm>
+            <a:off x="11784011" y="5783564"/>
+            <a:ext cx="407988" cy="819150"/>
+          </a:xfrm>
+          <a:custGeom>
+            <a:avLst/>
+            <a:gdLst/>
+            <a:ahLst/>
+            <a:cxnLst/>
+            <a:rect l="0" t="0" r="r" b="b"/>
+            <a:pathLst>
+              <a:path w="1799" h="3612">
+                <a:moveTo>
+                  <a:pt x="1799" y="0"/>
+                </a:moveTo>
+                <a:lnTo>
+                  <a:pt x="1799" y="3612"/>
+                </a:lnTo>
+                <a:lnTo>
+                  <a:pt x="1686" y="3609"/>
+                </a:lnTo>
+                <a:lnTo>
+                  <a:pt x="1574" y="3598"/>
+                </a:lnTo>
+                <a:lnTo>
+                  <a:pt x="1464" y="3581"/>
+                </a:lnTo>
+                <a:lnTo>
+                  <a:pt x="1357" y="3557"/>
+                </a:lnTo>
+                <a:lnTo>
+                  <a:pt x="1251" y="3527"/>
+                </a:lnTo>
+                <a:lnTo>
+                  <a:pt x="1150" y="3490"/>
+                </a:lnTo>
+                <a:lnTo>
+                  <a:pt x="1050" y="3448"/>
+                </a:lnTo>
+                <a:lnTo>
+                  <a:pt x="953" y="3401"/>
+                </a:lnTo>
+                <a:lnTo>
+                  <a:pt x="860" y="3347"/>
+                </a:lnTo>
+                <a:lnTo>
+                  <a:pt x="771" y="3289"/>
+                </a:lnTo>
+                <a:lnTo>
+                  <a:pt x="686" y="3224"/>
+                </a:lnTo>
+                <a:lnTo>
+                  <a:pt x="604" y="3156"/>
+                </a:lnTo>
+                <a:lnTo>
+                  <a:pt x="527" y="3083"/>
+                </a:lnTo>
+                <a:lnTo>
+                  <a:pt x="454" y="3005"/>
+                </a:lnTo>
+                <a:lnTo>
+                  <a:pt x="386" y="2923"/>
+                </a:lnTo>
+                <a:lnTo>
+                  <a:pt x="323" y="2838"/>
+                </a:lnTo>
+                <a:lnTo>
+                  <a:pt x="265" y="2748"/>
+                </a:lnTo>
+                <a:lnTo>
+                  <a:pt x="211" y="2655"/>
+                </a:lnTo>
+                <a:lnTo>
+                  <a:pt x="163" y="2559"/>
+                </a:lnTo>
+                <a:lnTo>
+                  <a:pt x="121" y="2459"/>
+                </a:lnTo>
+                <a:lnTo>
+                  <a:pt x="85" y="2356"/>
+                </a:lnTo>
+                <a:lnTo>
+                  <a:pt x="55" y="2251"/>
+                </a:lnTo>
+                <a:lnTo>
+                  <a:pt x="32" y="2143"/>
+                </a:lnTo>
+                <a:lnTo>
+                  <a:pt x="14" y="2033"/>
+                </a:lnTo>
+                <a:lnTo>
+                  <a:pt x="4" y="1920"/>
+                </a:lnTo>
+                <a:lnTo>
+                  <a:pt x="0" y="1806"/>
+                </a:lnTo>
+                <a:lnTo>
+                  <a:pt x="4" y="1692"/>
+                </a:lnTo>
+                <a:lnTo>
+                  <a:pt x="14" y="1580"/>
+                </a:lnTo>
+                <a:lnTo>
+                  <a:pt x="32" y="1469"/>
+                </a:lnTo>
+                <a:lnTo>
+                  <a:pt x="55" y="1362"/>
+                </a:lnTo>
+                <a:lnTo>
+                  <a:pt x="85" y="1256"/>
+                </a:lnTo>
+                <a:lnTo>
+                  <a:pt x="121" y="1154"/>
+                </a:lnTo>
+                <a:lnTo>
+                  <a:pt x="163" y="1054"/>
+                </a:lnTo>
+                <a:lnTo>
+                  <a:pt x="211" y="958"/>
+                </a:lnTo>
+                <a:lnTo>
+                  <a:pt x="265" y="864"/>
+                </a:lnTo>
+                <a:lnTo>
+                  <a:pt x="323" y="774"/>
+                </a:lnTo>
+                <a:lnTo>
+                  <a:pt x="386" y="689"/>
+                </a:lnTo>
+                <a:lnTo>
+                  <a:pt x="454" y="607"/>
+                </a:lnTo>
+                <a:lnTo>
+                  <a:pt x="527" y="529"/>
+                </a:lnTo>
+                <a:lnTo>
+                  <a:pt x="604" y="456"/>
+                </a:lnTo>
+                <a:lnTo>
+                  <a:pt x="686" y="388"/>
+                </a:lnTo>
+                <a:lnTo>
+                  <a:pt x="771" y="325"/>
+                </a:lnTo>
+                <a:lnTo>
+                  <a:pt x="860" y="266"/>
+                </a:lnTo>
+                <a:lnTo>
+                  <a:pt x="953" y="212"/>
+                </a:lnTo>
+                <a:lnTo>
+                  <a:pt x="1050" y="164"/>
+                </a:lnTo>
+                <a:lnTo>
+                  <a:pt x="1150" y="122"/>
+                </a:lnTo>
+                <a:lnTo>
+                  <a:pt x="1251" y="85"/>
+                </a:lnTo>
+                <a:lnTo>
+                  <a:pt x="1357" y="55"/>
+                </a:lnTo>
+                <a:lnTo>
+                  <a:pt x="1464" y="32"/>
+                </a:lnTo>
+                <a:lnTo>
+                  <a:pt x="1574" y="14"/>
+                </a:lnTo>
+                <a:lnTo>
+                  <a:pt x="1686" y="5"/>
+                </a:lnTo>
+                <a:lnTo>
+                  <a:pt x="1799" y="0"/>
+                </a:lnTo>
+                <a:close/>
+              </a:path>
+            </a:pathLst>
+          </a:custGeom>
+          <a:solidFill>
+            <a:schemeClr val="tx1">
+              <a:lumMod val="85000"/>
+              <a:lumOff val="15000"/>
+            </a:schemeClr>
+          </a:solidFill>
+          <a:ln w="0">
+            <a:noFill/>
+            <a:prstDash val="solid"/>
+            <a:round/>
+            <a:headEnd/>
+            <a:tailEnd/>
+          </a:ln>
+        </p:spPr>
+        <p:txBody>
+          <a:bodyPr anchor="ctr"/>
+          <a:lstStyle/>
+          <a:p>
+            <a:endParaRPr lang="en-US"/>
+          </a:p>
+        </p:txBody>
+      </p:sp>
+      <p:graphicFrame>
+        <p:nvGraphicFramePr>
+          <p:cNvPr id="4" name="Content Placeholder 3">
+            <a:extLst>
+              <a:ext uri="{FF2B5EF4-FFF2-40B4-BE49-F238E27FC236}">
+                <a16:creationId xmlns:a16="http://schemas.microsoft.com/office/drawing/2014/main" id="{B3513DA7-2CCC-2ACE-18E6-21D488BCEB22}"/>
+              </a:ext>
+            </a:extLst>
+          </p:cNvPr>
+          <p:cNvGraphicFramePr>
+            <a:graphicFrameLocks noGrp="1"/>
+          </p:cNvGraphicFramePr>
+          <p:nvPr>
+            <p:ph idx="1"/>
+            <p:extLst>
+              <p:ext uri="{D42A27DB-BD31-4B8C-83A1-F6EECF244321}">
+                <p14:modId xmlns:p14="http://schemas.microsoft.com/office/powerpoint/2010/main" val="432709860"/>
+              </p:ext>
+            </p:extLst>
+          </p:nvPr>
+        </p:nvGraphicFramePr>
+        <p:xfrm>
+          <a:off x="6331376" y="1063256"/>
+          <a:ext cx="4588020" cy="4720313"/>
+        </p:xfrm>
+        <a:graphic>
+          <a:graphicData uri="http://schemas.openxmlformats.org/drawingml/2006/table">
+            <a:tbl>
+              <a:tblPr/>
+              <a:tblGrid>
+                <a:gridCol w="830804">
+                  <a:extLst>
+                    <a:ext uri="{9D8B030D-6E8A-4147-A177-3AD203B41FA5}">
+                      <a16:colId xmlns:a16="http://schemas.microsoft.com/office/drawing/2014/main" val="3096964461"/>
+                    </a:ext>
+                  </a:extLst>
+                </a:gridCol>
+                <a:gridCol w="1878608">
+                  <a:extLst>
+                    <a:ext uri="{9D8B030D-6E8A-4147-A177-3AD203B41FA5}">
+                      <a16:colId xmlns:a16="http://schemas.microsoft.com/office/drawing/2014/main" val="2146167156"/>
+                    </a:ext>
+                  </a:extLst>
+                </a:gridCol>
+                <a:gridCol w="1878608">
+                  <a:extLst>
+                    <a:ext uri="{9D8B030D-6E8A-4147-A177-3AD203B41FA5}">
+                      <a16:colId xmlns:a16="http://schemas.microsoft.com/office/drawing/2014/main" val="3197709338"/>
+                    </a:ext>
+                  </a:extLst>
+                </a:gridCol>
+              </a:tblGrid>
+              <a:tr h="363101">
+                <a:tc>
+                  <a:txBody>
+                    <a:bodyPr/>
+                    <a:lstStyle/>
+                    <a:p>
+                      <a:pPr algn="r" fontAlgn="ctr">
+                        <a:spcBef>
+                          <a:spcPts val="0"/>
+                        </a:spcBef>
+                        <a:spcAft>
+                          <a:spcPts val="0"/>
+                        </a:spcAft>
+                      </a:pPr>
+                      <a:endParaRPr lang="en-US" sz="1600" b="0" i="0" u="none" strike="noStrike">
+                        <a:effectLst/>
+                        <a:latin typeface="Arial" panose="020B0604020202020204" pitchFamily="34" charset="0"/>
+                      </a:endParaRPr>
+                    </a:p>
+                  </a:txBody>
+                  <a:tcPr marL="82523" marR="82523" marT="41261" marB="41261" anchor="ctr">
+                    <a:lnL>
+                      <a:noFill/>
+                    </a:lnL>
+                    <a:lnR>
+                      <a:noFill/>
+                    </a:lnR>
+                    <a:lnT>
+                      <a:noFill/>
+                    </a:lnT>
+                    <a:lnB>
+                      <a:noFill/>
+                    </a:lnB>
+                  </a:tcPr>
+                </a:tc>
+                <a:tc>
+                  <a:txBody>
+                    <a:bodyPr/>
+                    <a:lstStyle/>
+                    <a:p>
+                      <a:pPr algn="r" fontAlgn="ctr">
+                        <a:spcBef>
+                          <a:spcPts val="0"/>
+                        </a:spcBef>
+                        <a:spcAft>
+                          <a:spcPts val="0"/>
+                        </a:spcAft>
+                      </a:pPr>
+                      <a:r>
+                        <a:rPr lang="en-US" sz="1600" b="1" i="0" u="none" strike="noStrike">
+                          <a:effectLst/>
+                          <a:latin typeface="Arial" panose="020B0604020202020204" pitchFamily="34" charset="0"/>
+                        </a:rPr>
+                        <a:t>range</a:t>
+                      </a:r>
+                      <a:endParaRPr lang="en-US" sz="1600" b="0" i="0" u="none" strike="noStrike">
+                        <a:effectLst/>
+                        <a:latin typeface="Arial" panose="020B0604020202020204" pitchFamily="34" charset="0"/>
+                      </a:endParaRPr>
+                    </a:p>
+                  </a:txBody>
+                  <a:tcPr marL="82523" marR="82523" marT="41261" marB="41261" anchor="ctr">
+                    <a:lnL>
+                      <a:noFill/>
+                    </a:lnL>
+                    <a:lnR>
+                      <a:noFill/>
+                    </a:lnR>
+                    <a:lnT>
+                      <a:noFill/>
+                    </a:lnT>
+                    <a:lnB>
+                      <a:noFill/>
+                    </a:lnB>
+                  </a:tcPr>
+                </a:tc>
+                <a:tc>
+                  <a:txBody>
+                    <a:bodyPr/>
+                    <a:lstStyle/>
+                    <a:p>
+                      <a:pPr algn="r" fontAlgn="ctr">
+                        <a:spcBef>
+                          <a:spcPts val="0"/>
+                        </a:spcBef>
+                        <a:spcAft>
+                          <a:spcPts val="0"/>
+                        </a:spcAft>
+                      </a:pPr>
+                      <a:r>
+                        <a:rPr lang="en-US" sz="1600" b="1" i="0" u="none" strike="noStrike">
+                          <a:effectLst/>
+                          <a:latin typeface="Arial" panose="020B0604020202020204" pitchFamily="34" charset="0"/>
+                        </a:rPr>
+                        <a:t>%</a:t>
+                      </a:r>
+                      <a:endParaRPr lang="en-US" sz="1600" b="0" i="0" u="none" strike="noStrike">
+                        <a:effectLst/>
+                        <a:latin typeface="Arial" panose="020B0604020202020204" pitchFamily="34" charset="0"/>
+                      </a:endParaRPr>
+                    </a:p>
+                  </a:txBody>
+                  <a:tcPr marL="82523" marR="82523" marT="41261" marB="41261" anchor="ctr">
+                    <a:lnL>
+                      <a:noFill/>
+                    </a:lnL>
+                    <a:lnR>
+                      <a:noFill/>
+                    </a:lnR>
+                    <a:lnT>
+                      <a:noFill/>
+                    </a:lnT>
+                    <a:lnB>
+                      <a:noFill/>
+                    </a:lnB>
+                  </a:tcPr>
+                </a:tc>
+                <a:extLst>
+                  <a:ext uri="{0D108BD9-81ED-4DB2-BD59-A6C34878D82A}">
+                    <a16:rowId xmlns:a16="http://schemas.microsoft.com/office/drawing/2014/main" val="3590576635"/>
+                  </a:ext>
+                </a:extLst>
+              </a:tr>
+              <a:tr h="363101">
+                <a:tc>
+                  <a:txBody>
+                    <a:bodyPr/>
+                    <a:lstStyle/>
+                    <a:p>
+                      <a:pPr algn="r" fontAlgn="ctr">
+                        <a:spcBef>
+                          <a:spcPts val="0"/>
+                        </a:spcBef>
+                        <a:spcAft>
+                          <a:spcPts val="0"/>
+                        </a:spcAft>
+                      </a:pPr>
+                      <a:r>
+                        <a:rPr lang="en-US" sz="1600" b="1" i="0" u="none" strike="noStrike">
+                          <a:effectLst/>
+                          <a:latin typeface="Arial" panose="020B0604020202020204" pitchFamily="34" charset="0"/>
+                        </a:rPr>
+                        <a:t>8</a:t>
+                      </a:r>
+                      <a:endParaRPr lang="en-US" sz="1600" b="0" i="0" u="none" strike="noStrike">
+                        <a:effectLst/>
+                        <a:latin typeface="Arial" panose="020B0604020202020204" pitchFamily="34" charset="0"/>
+                      </a:endParaRPr>
+                    </a:p>
+                  </a:txBody>
+                  <a:tcPr marL="82523" marR="82523" marT="41261" marB="41261" anchor="ctr">
+                    <a:lnL>
+                      <a:noFill/>
+                    </a:lnL>
+                    <a:lnR>
+                      <a:noFill/>
+                    </a:lnR>
+                    <a:lnT>
+                      <a:noFill/>
+                    </a:lnT>
+                    <a:lnB>
+                      <a:noFill/>
+                    </a:lnB>
+                  </a:tcPr>
+                </a:tc>
+                <a:tc>
+                  <a:txBody>
+                    <a:bodyPr/>
+                    <a:lstStyle/>
+                    <a:p>
+                      <a:pPr algn="r" fontAlgn="ctr">
+                        <a:spcBef>
+                          <a:spcPts val="0"/>
+                        </a:spcBef>
+                        <a:spcAft>
+                          <a:spcPts val="0"/>
+                        </a:spcAft>
+                      </a:pPr>
+                      <a:r>
+                        <a:rPr lang="en-US" sz="1600" b="0" i="0" u="none" strike="noStrike">
+                          <a:effectLst/>
+                          <a:latin typeface="Arial" panose="020B0604020202020204" pitchFamily="34" charset="0"/>
+                        </a:rPr>
+                        <a:t>(0, 50]</a:t>
+                      </a:r>
+                    </a:p>
+                  </a:txBody>
+                  <a:tcPr marL="82523" marR="82523" marT="41261" marB="41261" anchor="ctr">
+                    <a:lnL>
+                      <a:noFill/>
+                    </a:lnL>
+                    <a:lnR>
+                      <a:noFill/>
+                    </a:lnR>
+                    <a:lnT>
+                      <a:noFill/>
+                    </a:lnT>
+                    <a:lnB>
+                      <a:noFill/>
+                    </a:lnB>
+                  </a:tcPr>
+                </a:tc>
+                <a:tc>
+                  <a:txBody>
+                    <a:bodyPr/>
+                    <a:lstStyle/>
+                    <a:p>
+                      <a:pPr algn="r" fontAlgn="ctr">
+                        <a:spcBef>
+                          <a:spcPts val="0"/>
+                        </a:spcBef>
+                        <a:spcAft>
+                          <a:spcPts val="0"/>
+                        </a:spcAft>
+                      </a:pPr>
+                      <a:r>
+                        <a:rPr lang="en-US" sz="1600" b="0" i="0" u="none" strike="noStrike">
+                          <a:effectLst/>
+                          <a:latin typeface="Arial" panose="020B0604020202020204" pitchFamily="34" charset="0"/>
+                        </a:rPr>
+                        <a:t>0.096699</a:t>
+                      </a:r>
+                    </a:p>
+                  </a:txBody>
+                  <a:tcPr marL="82523" marR="82523" marT="41261" marB="41261" anchor="ctr">
+                    <a:lnL>
+                      <a:noFill/>
+                    </a:lnL>
+                    <a:lnR>
+                      <a:noFill/>
+                    </a:lnR>
+                    <a:lnT>
+                      <a:noFill/>
+                    </a:lnT>
+                    <a:lnB>
+                      <a:noFill/>
+                    </a:lnB>
+                  </a:tcPr>
+                </a:tc>
+                <a:extLst>
+                  <a:ext uri="{0D108BD9-81ED-4DB2-BD59-A6C34878D82A}">
+                    <a16:rowId xmlns:a16="http://schemas.microsoft.com/office/drawing/2014/main" val="3691354510"/>
+                  </a:ext>
+                </a:extLst>
+              </a:tr>
+              <a:tr h="363101">
+                <a:tc>
+                  <a:txBody>
+                    <a:bodyPr/>
+                    <a:lstStyle/>
+                    <a:p>
+                      <a:pPr algn="r" fontAlgn="ctr">
+                        <a:spcBef>
+                          <a:spcPts val="0"/>
+                        </a:spcBef>
+                        <a:spcAft>
+                          <a:spcPts val="0"/>
+                        </a:spcAft>
+                      </a:pPr>
+                      <a:r>
+                        <a:rPr lang="en-US" sz="1600" b="1" i="0" u="none" strike="noStrike">
+                          <a:effectLst/>
+                          <a:latin typeface="Arial" panose="020B0604020202020204" pitchFamily="34" charset="0"/>
+                        </a:rPr>
+                        <a:t>5</a:t>
+                      </a:r>
+                      <a:endParaRPr lang="en-US" sz="1600" b="0" i="0" u="none" strike="noStrike">
+                        <a:effectLst/>
+                        <a:latin typeface="Arial" panose="020B0604020202020204" pitchFamily="34" charset="0"/>
+                      </a:endParaRPr>
+                    </a:p>
+                  </a:txBody>
+                  <a:tcPr marL="82523" marR="82523" marT="41261" marB="41261" anchor="ctr">
+                    <a:lnL>
+                      <a:noFill/>
+                    </a:lnL>
+                    <a:lnR>
+                      <a:noFill/>
+                    </a:lnR>
+                    <a:lnT>
+                      <a:noFill/>
+                    </a:lnT>
+                    <a:lnB>
+                      <a:noFill/>
+                    </a:lnB>
+                  </a:tcPr>
+                </a:tc>
+                <a:tc>
+                  <a:txBody>
+                    <a:bodyPr/>
+                    <a:lstStyle/>
+                    <a:p>
+                      <a:pPr algn="r" fontAlgn="ctr">
+                        <a:spcBef>
+                          <a:spcPts val="0"/>
+                        </a:spcBef>
+                        <a:spcAft>
+                          <a:spcPts val="0"/>
+                        </a:spcAft>
+                      </a:pPr>
+                      <a:r>
+                        <a:rPr lang="en-US" sz="1600" b="0" i="0" u="none" strike="noStrike">
+                          <a:effectLst/>
+                          <a:latin typeface="Arial" panose="020B0604020202020204" pitchFamily="34" charset="0"/>
+                        </a:rPr>
+                        <a:t>(50, 100]</a:t>
+                      </a:r>
+                    </a:p>
+                  </a:txBody>
+                  <a:tcPr marL="82523" marR="82523" marT="41261" marB="41261" anchor="ctr">
+                    <a:lnL>
+                      <a:noFill/>
+                    </a:lnL>
+                    <a:lnR>
+                      <a:noFill/>
+                    </a:lnR>
+                    <a:lnT>
+                      <a:noFill/>
+                    </a:lnT>
+                    <a:lnB>
+                      <a:noFill/>
+                    </a:lnB>
+                  </a:tcPr>
+                </a:tc>
+                <a:tc>
+                  <a:txBody>
+                    <a:bodyPr/>
+                    <a:lstStyle/>
+                    <a:p>
+                      <a:pPr algn="r" fontAlgn="ctr">
+                        <a:spcBef>
+                          <a:spcPts val="0"/>
+                        </a:spcBef>
+                        <a:spcAft>
+                          <a:spcPts val="0"/>
+                        </a:spcAft>
+                      </a:pPr>
+                      <a:r>
+                        <a:rPr lang="en-US" sz="1600" b="0" i="0" u="none" strike="noStrike">
+                          <a:effectLst/>
+                          <a:latin typeface="Arial" panose="020B0604020202020204" pitchFamily="34" charset="0"/>
+                        </a:rPr>
+                        <a:t>5.883149</a:t>
+                      </a:r>
+                    </a:p>
+                  </a:txBody>
+                  <a:tcPr marL="82523" marR="82523" marT="41261" marB="41261" anchor="ctr">
+                    <a:lnL>
+                      <a:noFill/>
+                    </a:lnL>
+                    <a:lnR>
+                      <a:noFill/>
+                    </a:lnR>
+                    <a:lnT>
+                      <a:noFill/>
+                    </a:lnT>
+                    <a:lnB>
+                      <a:noFill/>
+                    </a:lnB>
+                  </a:tcPr>
+                </a:tc>
+                <a:extLst>
+                  <a:ext uri="{0D108BD9-81ED-4DB2-BD59-A6C34878D82A}">
+                    <a16:rowId xmlns:a16="http://schemas.microsoft.com/office/drawing/2014/main" val="159544481"/>
+                  </a:ext>
+                </a:extLst>
+              </a:tr>
+              <a:tr h="363101">
+                <a:tc>
+                  <a:txBody>
+                    <a:bodyPr/>
+                    <a:lstStyle/>
+                    <a:p>
+                      <a:pPr algn="r" fontAlgn="ctr">
+                        <a:spcBef>
+                          <a:spcPts val="0"/>
+                        </a:spcBef>
+                        <a:spcAft>
+                          <a:spcPts val="0"/>
+                        </a:spcAft>
+                      </a:pPr>
+                      <a:r>
+                        <a:rPr lang="en-US" sz="1600" b="1" i="0" u="none" strike="noStrike">
+                          <a:effectLst/>
+                          <a:latin typeface="Arial" panose="020B0604020202020204" pitchFamily="34" charset="0"/>
+                        </a:rPr>
+                        <a:t>2</a:t>
+                      </a:r>
+                      <a:endParaRPr lang="en-US" sz="1600" b="0" i="0" u="none" strike="noStrike">
+                        <a:effectLst/>
+                        <a:latin typeface="Arial" panose="020B0604020202020204" pitchFamily="34" charset="0"/>
+                      </a:endParaRPr>
+                    </a:p>
+                  </a:txBody>
+                  <a:tcPr marL="82523" marR="82523" marT="41261" marB="41261" anchor="ctr">
+                    <a:lnL>
+                      <a:noFill/>
+                    </a:lnL>
+                    <a:lnR>
+                      <a:noFill/>
+                    </a:lnR>
+                    <a:lnT>
+                      <a:noFill/>
+                    </a:lnT>
+                    <a:lnB>
+                      <a:noFill/>
+                    </a:lnB>
+                  </a:tcPr>
+                </a:tc>
+                <a:tc>
+                  <a:txBody>
+                    <a:bodyPr/>
+                    <a:lstStyle/>
+                    <a:p>
+                      <a:pPr algn="r" fontAlgn="ctr">
+                        <a:spcBef>
+                          <a:spcPts val="0"/>
+                        </a:spcBef>
+                        <a:spcAft>
+                          <a:spcPts val="0"/>
+                        </a:spcAft>
+                      </a:pPr>
+                      <a:r>
+                        <a:rPr lang="en-US" sz="1600" b="0" i="0" u="none" strike="noStrike">
+                          <a:effectLst/>
+                          <a:latin typeface="Arial" panose="020B0604020202020204" pitchFamily="34" charset="0"/>
+                        </a:rPr>
+                        <a:t>(100, 150]</a:t>
+                      </a:r>
+                    </a:p>
+                  </a:txBody>
+                  <a:tcPr marL="82523" marR="82523" marT="41261" marB="41261" anchor="ctr">
+                    <a:lnL>
+                      <a:noFill/>
+                    </a:lnL>
+                    <a:lnR>
+                      <a:noFill/>
+                    </a:lnR>
+                    <a:lnT>
+                      <a:noFill/>
+                    </a:lnT>
+                    <a:lnB>
+                      <a:noFill/>
+                    </a:lnB>
+                  </a:tcPr>
+                </a:tc>
+                <a:tc>
+                  <a:txBody>
+                    <a:bodyPr/>
+                    <a:lstStyle/>
+                    <a:p>
+                      <a:pPr algn="r" fontAlgn="ctr">
+                        <a:spcBef>
+                          <a:spcPts val="0"/>
+                        </a:spcBef>
+                        <a:spcAft>
+                          <a:spcPts val="0"/>
+                        </a:spcAft>
+                      </a:pPr>
+                      <a:r>
+                        <a:rPr lang="en-US" sz="1600" b="0" i="0" u="none" strike="noStrike">
+                          <a:effectLst/>
+                          <a:latin typeface="Arial" panose="020B0604020202020204" pitchFamily="34" charset="0"/>
+                        </a:rPr>
+                        <a:t>19.589224</a:t>
+                      </a:r>
+                    </a:p>
+                  </a:txBody>
+                  <a:tcPr marL="82523" marR="82523" marT="41261" marB="41261" anchor="ctr">
+                    <a:lnL>
+                      <a:noFill/>
+                    </a:lnL>
+                    <a:lnR>
+                      <a:noFill/>
+                    </a:lnR>
+                    <a:lnT>
+                      <a:noFill/>
+                    </a:lnT>
+                    <a:lnB>
+                      <a:noFill/>
+                    </a:lnB>
+                  </a:tcPr>
+                </a:tc>
+                <a:extLst>
+                  <a:ext uri="{0D108BD9-81ED-4DB2-BD59-A6C34878D82A}">
+                    <a16:rowId xmlns:a16="http://schemas.microsoft.com/office/drawing/2014/main" val="242635722"/>
+                  </a:ext>
+                </a:extLst>
+              </a:tr>
+              <a:tr h="363101">
+                <a:tc>
+                  <a:txBody>
+                    <a:bodyPr/>
+                    <a:lstStyle/>
+                    <a:p>
+                      <a:pPr algn="r" fontAlgn="ctr">
+                        <a:spcBef>
+                          <a:spcPts val="0"/>
+                        </a:spcBef>
+                        <a:spcAft>
+                          <a:spcPts val="0"/>
+                        </a:spcAft>
+                      </a:pPr>
+                      <a:r>
+                        <a:rPr lang="en-US" sz="1600" b="1" i="0" u="none" strike="noStrike">
+                          <a:effectLst/>
+                          <a:latin typeface="Arial" panose="020B0604020202020204" pitchFamily="34" charset="0"/>
+                        </a:rPr>
+                        <a:t>1</a:t>
+                      </a:r>
+                      <a:endParaRPr lang="en-US" sz="1600" b="0" i="0" u="none" strike="noStrike">
+                        <a:effectLst/>
+                        <a:latin typeface="Arial" panose="020B0604020202020204" pitchFamily="34" charset="0"/>
+                      </a:endParaRPr>
+                    </a:p>
+                  </a:txBody>
+                  <a:tcPr marL="82523" marR="82523" marT="41261" marB="41261" anchor="ctr">
+                    <a:lnL>
+                      <a:noFill/>
+                    </a:lnL>
+                    <a:lnR>
+                      <a:noFill/>
+                    </a:lnR>
+                    <a:lnT>
+                      <a:noFill/>
+                    </a:lnT>
+                    <a:lnB>
+                      <a:noFill/>
+                    </a:lnB>
+                  </a:tcPr>
+                </a:tc>
+                <a:tc>
+                  <a:txBody>
+                    <a:bodyPr/>
+                    <a:lstStyle/>
+                    <a:p>
+                      <a:pPr algn="r" fontAlgn="ctr">
+                        <a:spcBef>
+                          <a:spcPts val="0"/>
+                        </a:spcBef>
+                        <a:spcAft>
+                          <a:spcPts val="0"/>
+                        </a:spcAft>
+                      </a:pPr>
+                      <a:r>
+                        <a:rPr lang="en-US" sz="1600" b="0" i="0" u="none" strike="noStrike">
+                          <a:effectLst/>
+                          <a:latin typeface="Arial" panose="020B0604020202020204" pitchFamily="34" charset="0"/>
+                        </a:rPr>
+                        <a:t>(150, 200]</a:t>
+                      </a:r>
+                    </a:p>
+                  </a:txBody>
+                  <a:tcPr marL="82523" marR="82523" marT="41261" marB="41261" anchor="ctr">
+                    <a:lnL>
+                      <a:noFill/>
+                    </a:lnL>
+                    <a:lnR>
+                      <a:noFill/>
+                    </a:lnR>
+                    <a:lnT>
+                      <a:noFill/>
+                    </a:lnT>
+                    <a:lnB>
+                      <a:noFill/>
+                    </a:lnB>
+                  </a:tcPr>
+                </a:tc>
+                <a:tc>
+                  <a:txBody>
+                    <a:bodyPr/>
+                    <a:lstStyle/>
+                    <a:p>
+                      <a:pPr algn="r" fontAlgn="ctr">
+                        <a:spcBef>
+                          <a:spcPts val="0"/>
+                        </a:spcBef>
+                        <a:spcAft>
+                          <a:spcPts val="0"/>
+                        </a:spcAft>
+                      </a:pPr>
+                      <a:r>
+                        <a:rPr lang="en-US" sz="1600" b="0" i="0" u="none" strike="noStrike">
+                          <a:effectLst/>
+                          <a:latin typeface="Arial" panose="020B0604020202020204" pitchFamily="34" charset="0"/>
+                        </a:rPr>
+                        <a:t>20.521399</a:t>
+                      </a:r>
+                    </a:p>
+                  </a:txBody>
+                  <a:tcPr marL="82523" marR="82523" marT="41261" marB="41261" anchor="ctr">
+                    <a:lnL>
+                      <a:noFill/>
+                    </a:lnL>
+                    <a:lnR>
+                      <a:noFill/>
+                    </a:lnR>
+                    <a:lnT>
+                      <a:noFill/>
+                    </a:lnT>
+                    <a:lnB>
+                      <a:noFill/>
+                    </a:lnB>
+                  </a:tcPr>
+                </a:tc>
+                <a:extLst>
+                  <a:ext uri="{0D108BD9-81ED-4DB2-BD59-A6C34878D82A}">
+                    <a16:rowId xmlns:a16="http://schemas.microsoft.com/office/drawing/2014/main" val="2419140065"/>
+                  </a:ext>
+                </a:extLst>
+              </a:tr>
+              <a:tr h="363101">
+                <a:tc>
+                  <a:txBody>
+                    <a:bodyPr/>
+                    <a:lstStyle/>
+                    <a:p>
+                      <a:pPr algn="r" fontAlgn="ctr">
+                        <a:spcBef>
+                          <a:spcPts val="0"/>
+                        </a:spcBef>
+                        <a:spcAft>
+                          <a:spcPts val="0"/>
+                        </a:spcAft>
+                      </a:pPr>
+                      <a:r>
+                        <a:rPr lang="en-US" sz="1600" b="1" i="0" u="none" strike="noStrike">
+                          <a:effectLst/>
+                          <a:latin typeface="Arial" panose="020B0604020202020204" pitchFamily="34" charset="0"/>
+                        </a:rPr>
+                        <a:t>0</a:t>
+                      </a:r>
+                      <a:endParaRPr lang="en-US" sz="1600" b="0" i="0" u="none" strike="noStrike">
+                        <a:effectLst/>
+                        <a:latin typeface="Arial" panose="020B0604020202020204" pitchFamily="34" charset="0"/>
+                      </a:endParaRPr>
+                    </a:p>
+                  </a:txBody>
+                  <a:tcPr marL="82523" marR="82523" marT="41261" marB="41261" anchor="ctr">
+                    <a:lnL>
+                      <a:noFill/>
+                    </a:lnL>
+                    <a:lnR>
+                      <a:noFill/>
+                    </a:lnR>
+                    <a:lnT>
+                      <a:noFill/>
+                    </a:lnT>
+                    <a:lnB>
+                      <a:noFill/>
+                    </a:lnB>
+                  </a:tcPr>
+                </a:tc>
+                <a:tc>
+                  <a:txBody>
+                    <a:bodyPr/>
+                    <a:lstStyle/>
+                    <a:p>
+                      <a:pPr algn="r" fontAlgn="ctr">
+                        <a:spcBef>
+                          <a:spcPts val="0"/>
+                        </a:spcBef>
+                        <a:spcAft>
+                          <a:spcPts val="0"/>
+                        </a:spcAft>
+                      </a:pPr>
+                      <a:r>
+                        <a:rPr lang="en-US" sz="1600" b="0" i="0" u="none" strike="noStrike">
+                          <a:effectLst/>
+                          <a:latin typeface="Arial" panose="020B0604020202020204" pitchFamily="34" charset="0"/>
+                        </a:rPr>
+                        <a:t>(200, 350]</a:t>
+                      </a:r>
+                    </a:p>
+                  </a:txBody>
+                  <a:tcPr marL="82523" marR="82523" marT="41261" marB="41261" anchor="ctr">
+                    <a:lnL>
+                      <a:noFill/>
+                    </a:lnL>
+                    <a:lnR>
+                      <a:noFill/>
+                    </a:lnR>
+                    <a:lnT>
+                      <a:noFill/>
+                    </a:lnT>
+                    <a:lnB>
+                      <a:noFill/>
+                    </a:lnB>
+                  </a:tcPr>
+                </a:tc>
+                <a:tc>
+                  <a:txBody>
+                    <a:bodyPr/>
+                    <a:lstStyle/>
+                    <a:p>
+                      <a:pPr algn="r" fontAlgn="ctr">
+                        <a:spcBef>
+                          <a:spcPts val="0"/>
+                        </a:spcBef>
+                        <a:spcAft>
+                          <a:spcPts val="0"/>
+                        </a:spcAft>
+                      </a:pPr>
+                      <a:r>
+                        <a:rPr lang="en-US" sz="1600" b="0" i="0" u="none" strike="noStrike">
+                          <a:effectLst/>
+                          <a:latin typeface="Arial" panose="020B0604020202020204" pitchFamily="34" charset="0"/>
+                        </a:rPr>
+                        <a:t>32.889164</a:t>
+                      </a:r>
+                    </a:p>
+                  </a:txBody>
+                  <a:tcPr marL="82523" marR="82523" marT="41261" marB="41261" anchor="ctr">
+                    <a:lnL>
+                      <a:noFill/>
+                    </a:lnL>
+                    <a:lnR>
+                      <a:noFill/>
+                    </a:lnR>
+                    <a:lnT>
+                      <a:noFill/>
+                    </a:lnT>
+                    <a:lnB>
+                      <a:noFill/>
+                    </a:lnB>
+                  </a:tcPr>
+                </a:tc>
+                <a:extLst>
+                  <a:ext uri="{0D108BD9-81ED-4DB2-BD59-A6C34878D82A}">
+                    <a16:rowId xmlns:a16="http://schemas.microsoft.com/office/drawing/2014/main" val="4177882705"/>
+                  </a:ext>
+                </a:extLst>
+              </a:tr>
+              <a:tr h="363101">
+                <a:tc>
+                  <a:txBody>
+                    <a:bodyPr/>
+                    <a:lstStyle/>
+                    <a:p>
+                      <a:pPr algn="r" fontAlgn="ctr">
+                        <a:spcBef>
+                          <a:spcPts val="0"/>
+                        </a:spcBef>
+                        <a:spcAft>
+                          <a:spcPts val="0"/>
+                        </a:spcAft>
+                      </a:pPr>
+                      <a:r>
+                        <a:rPr lang="en-US" sz="1600" b="1" i="0" u="none" strike="noStrike">
+                          <a:effectLst/>
+                          <a:latin typeface="Arial" panose="020B0604020202020204" pitchFamily="34" charset="0"/>
+                        </a:rPr>
+                        <a:t>3</a:t>
+                      </a:r>
+                      <a:endParaRPr lang="en-US" sz="1600" b="0" i="0" u="none" strike="noStrike">
+                        <a:effectLst/>
+                        <a:latin typeface="Arial" panose="020B0604020202020204" pitchFamily="34" charset="0"/>
+                      </a:endParaRPr>
+                    </a:p>
+                  </a:txBody>
+                  <a:tcPr marL="82523" marR="82523" marT="41261" marB="41261" anchor="ctr">
+                    <a:lnL>
+                      <a:noFill/>
+                    </a:lnL>
+                    <a:lnR>
+                      <a:noFill/>
+                    </a:lnR>
+                    <a:lnT>
+                      <a:noFill/>
+                    </a:lnT>
+                    <a:lnB>
+                      <a:noFill/>
+                    </a:lnB>
+                  </a:tcPr>
+                </a:tc>
+                <a:tc>
+                  <a:txBody>
+                    <a:bodyPr/>
+                    <a:lstStyle/>
+                    <a:p>
+                      <a:pPr algn="r" fontAlgn="ctr">
+                        <a:spcBef>
+                          <a:spcPts val="0"/>
+                        </a:spcBef>
+                        <a:spcAft>
+                          <a:spcPts val="0"/>
+                        </a:spcAft>
+                      </a:pPr>
+                      <a:r>
+                        <a:rPr lang="en-US" sz="1600" b="0" i="0" u="none" strike="noStrike">
+                          <a:effectLst/>
+                          <a:latin typeface="Arial" panose="020B0604020202020204" pitchFamily="34" charset="0"/>
+                        </a:rPr>
+                        <a:t>(350, 500]</a:t>
+                      </a:r>
+                    </a:p>
+                  </a:txBody>
+                  <a:tcPr marL="82523" marR="82523" marT="41261" marB="41261" anchor="ctr">
+                    <a:lnL>
+                      <a:noFill/>
+                    </a:lnL>
+                    <a:lnR>
+                      <a:noFill/>
+                    </a:lnR>
+                    <a:lnT>
+                      <a:noFill/>
+                    </a:lnT>
+                    <a:lnB>
+                      <a:noFill/>
+                    </a:lnB>
+                  </a:tcPr>
+                </a:tc>
+                <a:tc>
+                  <a:txBody>
+                    <a:bodyPr/>
+                    <a:lstStyle/>
+                    <a:p>
+                      <a:pPr algn="r" fontAlgn="ctr">
+                        <a:spcBef>
+                          <a:spcPts val="0"/>
+                        </a:spcBef>
+                        <a:spcAft>
+                          <a:spcPts val="0"/>
+                        </a:spcAft>
+                      </a:pPr>
+                      <a:r>
+                        <a:rPr lang="en-US" sz="1600" b="0" i="0" u="none" strike="noStrike">
+                          <a:effectLst/>
+                          <a:latin typeface="Arial" panose="020B0604020202020204" pitchFamily="34" charset="0"/>
+                        </a:rPr>
+                        <a:t>10.990775</a:t>
+                      </a:r>
+                    </a:p>
+                  </a:txBody>
+                  <a:tcPr marL="82523" marR="82523" marT="41261" marB="41261" anchor="ctr">
+                    <a:lnL>
+                      <a:noFill/>
+                    </a:lnL>
+                    <a:lnR>
+                      <a:noFill/>
+                    </a:lnR>
+                    <a:lnT>
+                      <a:noFill/>
+                    </a:lnT>
+                    <a:lnB>
+                      <a:noFill/>
+                    </a:lnB>
+                  </a:tcPr>
+                </a:tc>
+                <a:extLst>
+                  <a:ext uri="{0D108BD9-81ED-4DB2-BD59-A6C34878D82A}">
+                    <a16:rowId xmlns:a16="http://schemas.microsoft.com/office/drawing/2014/main" val="3576498905"/>
+                  </a:ext>
+                </a:extLst>
+              </a:tr>
+              <a:tr h="363101">
+                <a:tc>
+                  <a:txBody>
+                    <a:bodyPr/>
+                    <a:lstStyle/>
+                    <a:p>
+                      <a:pPr algn="r" fontAlgn="ctr">
+                        <a:spcBef>
+                          <a:spcPts val="0"/>
+                        </a:spcBef>
+                        <a:spcAft>
+                          <a:spcPts val="0"/>
+                        </a:spcAft>
+                      </a:pPr>
+                      <a:r>
+                        <a:rPr lang="en-US" sz="1600" b="1" i="0" u="none" strike="noStrike">
+                          <a:effectLst/>
+                          <a:latin typeface="Arial" panose="020B0604020202020204" pitchFamily="34" charset="0"/>
+                        </a:rPr>
+                        <a:t>4</a:t>
+                      </a:r>
+                      <a:endParaRPr lang="en-US" sz="1600" b="0" i="0" u="none" strike="noStrike">
+                        <a:effectLst/>
+                        <a:latin typeface="Arial" panose="020B0604020202020204" pitchFamily="34" charset="0"/>
+                      </a:endParaRPr>
+                    </a:p>
+                  </a:txBody>
+                  <a:tcPr marL="82523" marR="82523" marT="41261" marB="41261" anchor="ctr">
+                    <a:lnL>
+                      <a:noFill/>
+                    </a:lnL>
+                    <a:lnR>
+                      <a:noFill/>
+                    </a:lnR>
+                    <a:lnT>
+                      <a:noFill/>
+                    </a:lnT>
+                    <a:lnB>
+                      <a:noFill/>
+                    </a:lnB>
+                  </a:tcPr>
+                </a:tc>
+                <a:tc>
+                  <a:txBody>
+                    <a:bodyPr/>
+                    <a:lstStyle/>
+                    <a:p>
+                      <a:pPr algn="r" fontAlgn="ctr">
+                        <a:spcBef>
+                          <a:spcPts val="0"/>
+                        </a:spcBef>
+                        <a:spcAft>
+                          <a:spcPts val="0"/>
+                        </a:spcAft>
+                      </a:pPr>
+                      <a:r>
+                        <a:rPr lang="en-US" sz="1600" b="0" i="0" u="none" strike="noStrike">
+                          <a:effectLst/>
+                          <a:latin typeface="Arial" panose="020B0604020202020204" pitchFamily="34" charset="0"/>
+                        </a:rPr>
+                        <a:t>(500, 1000]</a:t>
+                      </a:r>
+                    </a:p>
+                  </a:txBody>
+                  <a:tcPr marL="82523" marR="82523" marT="41261" marB="41261" anchor="ctr">
+                    <a:lnL>
+                      <a:noFill/>
+                    </a:lnL>
+                    <a:lnR>
+                      <a:noFill/>
+                    </a:lnR>
+                    <a:lnT>
+                      <a:noFill/>
+                    </a:lnT>
+                    <a:lnB>
+                      <a:noFill/>
+                    </a:lnB>
+                  </a:tcPr>
+                </a:tc>
+                <a:tc>
+                  <a:txBody>
+                    <a:bodyPr/>
+                    <a:lstStyle/>
+                    <a:p>
+                      <a:pPr algn="r" fontAlgn="ctr">
+                        <a:spcBef>
+                          <a:spcPts val="0"/>
+                        </a:spcBef>
+                        <a:spcAft>
+                          <a:spcPts val="0"/>
+                        </a:spcAft>
+                      </a:pPr>
+                      <a:r>
+                        <a:rPr lang="en-US" sz="1600" b="0" i="0" u="none" strike="noStrike">
+                          <a:effectLst/>
+                          <a:latin typeface="Arial" panose="020B0604020202020204" pitchFamily="34" charset="0"/>
+                        </a:rPr>
+                        <a:t>8.538496</a:t>
+                      </a:r>
+                    </a:p>
+                  </a:txBody>
+                  <a:tcPr marL="82523" marR="82523" marT="41261" marB="41261" anchor="ctr">
+                    <a:lnL>
+                      <a:noFill/>
+                    </a:lnL>
+                    <a:lnR>
+                      <a:noFill/>
+                    </a:lnR>
+                    <a:lnT>
+                      <a:noFill/>
+                    </a:lnT>
+                    <a:lnB>
+                      <a:noFill/>
+                    </a:lnB>
+                  </a:tcPr>
+                </a:tc>
+                <a:extLst>
+                  <a:ext uri="{0D108BD9-81ED-4DB2-BD59-A6C34878D82A}">
+                    <a16:rowId xmlns:a16="http://schemas.microsoft.com/office/drawing/2014/main" val="1515584676"/>
+                  </a:ext>
+                </a:extLst>
+              </a:tr>
+              <a:tr h="363101">
+                <a:tc>
+                  <a:txBody>
+                    <a:bodyPr/>
+                    <a:lstStyle/>
+                    <a:p>
+                      <a:pPr algn="r" fontAlgn="ctr">
+                        <a:spcBef>
+                          <a:spcPts val="0"/>
+                        </a:spcBef>
+                        <a:spcAft>
+                          <a:spcPts val="0"/>
+                        </a:spcAft>
+                      </a:pPr>
+                      <a:r>
+                        <a:rPr lang="en-US" sz="1600" b="1" i="0" u="none" strike="noStrike">
+                          <a:effectLst/>
+                          <a:latin typeface="Arial" panose="020B0604020202020204" pitchFamily="34" charset="0"/>
+                        </a:rPr>
+                        <a:t>6</a:t>
+                      </a:r>
+                      <a:endParaRPr lang="en-US" sz="1600" b="0" i="0" u="none" strike="noStrike">
+                        <a:effectLst/>
+                        <a:latin typeface="Arial" panose="020B0604020202020204" pitchFamily="34" charset="0"/>
+                      </a:endParaRPr>
+                    </a:p>
+                  </a:txBody>
+                  <a:tcPr marL="82523" marR="82523" marT="41261" marB="41261" anchor="ctr">
+                    <a:lnL>
+                      <a:noFill/>
+                    </a:lnL>
+                    <a:lnR>
+                      <a:noFill/>
+                    </a:lnR>
+                    <a:lnT>
+                      <a:noFill/>
+                    </a:lnT>
+                    <a:lnB>
+                      <a:noFill/>
+                    </a:lnB>
+                  </a:tcPr>
+                </a:tc>
+                <a:tc>
+                  <a:txBody>
+                    <a:bodyPr/>
+                    <a:lstStyle/>
+                    <a:p>
+                      <a:pPr algn="r" fontAlgn="ctr">
+                        <a:spcBef>
+                          <a:spcPts val="0"/>
+                        </a:spcBef>
+                        <a:spcAft>
+                          <a:spcPts val="0"/>
+                        </a:spcAft>
+                      </a:pPr>
+                      <a:r>
+                        <a:rPr lang="en-US" sz="1600" b="0" i="0" u="none" strike="noStrike">
+                          <a:effectLst/>
+                          <a:latin typeface="Arial" panose="020B0604020202020204" pitchFamily="34" charset="0"/>
+                        </a:rPr>
+                        <a:t>(1000, 1500]</a:t>
+                      </a:r>
+                    </a:p>
+                  </a:txBody>
+                  <a:tcPr marL="82523" marR="82523" marT="41261" marB="41261" anchor="ctr">
+                    <a:lnL>
+                      <a:noFill/>
+                    </a:lnL>
+                    <a:lnR>
+                      <a:noFill/>
+                    </a:lnR>
+                    <a:lnT>
+                      <a:noFill/>
+                    </a:lnT>
+                    <a:lnB>
+                      <a:noFill/>
+                    </a:lnB>
+                  </a:tcPr>
+                </a:tc>
+                <a:tc>
+                  <a:txBody>
+                    <a:bodyPr/>
+                    <a:lstStyle/>
+                    <a:p>
+                      <a:pPr algn="r" fontAlgn="ctr">
+                        <a:spcBef>
+                          <a:spcPts val="0"/>
+                        </a:spcBef>
+                        <a:spcAft>
+                          <a:spcPts val="0"/>
+                        </a:spcAft>
+                      </a:pPr>
+                      <a:r>
+                        <a:rPr lang="en-US" sz="1600" b="0" i="0" u="none" strike="noStrike">
+                          <a:effectLst/>
+                          <a:latin typeface="Arial" panose="020B0604020202020204" pitchFamily="34" charset="0"/>
+                        </a:rPr>
+                        <a:t>0.992129</a:t>
+                      </a:r>
+                    </a:p>
+                  </a:txBody>
+                  <a:tcPr marL="82523" marR="82523" marT="41261" marB="41261" anchor="ctr">
+                    <a:lnL>
+                      <a:noFill/>
+                    </a:lnL>
+                    <a:lnR>
+                      <a:noFill/>
+                    </a:lnR>
+                    <a:lnT>
+                      <a:noFill/>
+                    </a:lnT>
+                    <a:lnB>
+                      <a:noFill/>
+                    </a:lnB>
+                  </a:tcPr>
+                </a:tc>
+                <a:extLst>
+                  <a:ext uri="{0D108BD9-81ED-4DB2-BD59-A6C34878D82A}">
+                    <a16:rowId xmlns:a16="http://schemas.microsoft.com/office/drawing/2014/main" val="2615010086"/>
+                  </a:ext>
+                </a:extLst>
+              </a:tr>
+              <a:tr h="363101">
+                <a:tc>
+                  <a:txBody>
+                    <a:bodyPr/>
+                    <a:lstStyle/>
+                    <a:p>
+                      <a:pPr algn="r" fontAlgn="ctr">
+                        <a:spcBef>
+                          <a:spcPts val="0"/>
+                        </a:spcBef>
+                        <a:spcAft>
+                          <a:spcPts val="0"/>
+                        </a:spcAft>
+                      </a:pPr>
+                      <a:r>
+                        <a:rPr lang="en-US" sz="1600" b="1" i="0" u="none" strike="noStrike">
+                          <a:effectLst/>
+                          <a:latin typeface="Arial" panose="020B0604020202020204" pitchFamily="34" charset="0"/>
+                        </a:rPr>
+                        <a:t>7</a:t>
+                      </a:r>
+                      <a:endParaRPr lang="en-US" sz="1600" b="0" i="0" u="none" strike="noStrike">
+                        <a:effectLst/>
+                        <a:latin typeface="Arial" panose="020B0604020202020204" pitchFamily="34" charset="0"/>
+                      </a:endParaRPr>
+                    </a:p>
+                  </a:txBody>
+                  <a:tcPr marL="82523" marR="82523" marT="41261" marB="41261" anchor="ctr">
+                    <a:lnL>
+                      <a:noFill/>
+                    </a:lnL>
+                    <a:lnR>
+                      <a:noFill/>
+                    </a:lnR>
+                    <a:lnT>
+                      <a:noFill/>
+                    </a:lnT>
+                    <a:lnB>
+                      <a:noFill/>
+                    </a:lnB>
+                  </a:tcPr>
+                </a:tc>
+                <a:tc>
+                  <a:txBody>
+                    <a:bodyPr/>
+                    <a:lstStyle/>
+                    <a:p>
+                      <a:pPr algn="r" fontAlgn="ctr">
+                        <a:spcBef>
+                          <a:spcPts val="0"/>
+                        </a:spcBef>
+                        <a:spcAft>
+                          <a:spcPts val="0"/>
+                        </a:spcAft>
+                      </a:pPr>
+                      <a:r>
+                        <a:rPr lang="en-US" sz="1600" b="0" i="0" u="none" strike="noStrike">
+                          <a:effectLst/>
+                          <a:latin typeface="Arial" panose="020B0604020202020204" pitchFamily="34" charset="0"/>
+                        </a:rPr>
+                        <a:t>(1500, 2500]</a:t>
+                      </a:r>
+                    </a:p>
+                  </a:txBody>
+                  <a:tcPr marL="82523" marR="82523" marT="41261" marB="41261" anchor="ctr">
+                    <a:lnL>
+                      <a:noFill/>
+                    </a:lnL>
+                    <a:lnR>
+                      <a:noFill/>
+                    </a:lnR>
+                    <a:lnT>
+                      <a:noFill/>
+                    </a:lnT>
+                    <a:lnB>
+                      <a:noFill/>
+                    </a:lnB>
+                  </a:tcPr>
+                </a:tc>
+                <a:tc>
+                  <a:txBody>
+                    <a:bodyPr/>
+                    <a:lstStyle/>
+                    <a:p>
+                      <a:pPr algn="r" fontAlgn="ctr">
+                        <a:spcBef>
+                          <a:spcPts val="0"/>
+                        </a:spcBef>
+                        <a:spcAft>
+                          <a:spcPts val="0"/>
+                        </a:spcAft>
+                      </a:pPr>
+                      <a:r>
+                        <a:rPr lang="en-US" sz="1600" b="0" i="0" u="none" strike="noStrike">
+                          <a:effectLst/>
+                          <a:latin typeface="Arial" panose="020B0604020202020204" pitchFamily="34" charset="0"/>
+                        </a:rPr>
+                        <a:t>0.348115</a:t>
+                      </a:r>
+                    </a:p>
+                  </a:txBody>
+                  <a:tcPr marL="82523" marR="82523" marT="41261" marB="41261" anchor="ctr">
+                    <a:lnL>
+                      <a:noFill/>
+                    </a:lnL>
+                    <a:lnR>
+                      <a:noFill/>
+                    </a:lnR>
+                    <a:lnT>
+                      <a:noFill/>
+                    </a:lnT>
+                    <a:lnB>
+                      <a:noFill/>
+                    </a:lnB>
+                  </a:tcPr>
+                </a:tc>
+                <a:extLst>
+                  <a:ext uri="{0D108BD9-81ED-4DB2-BD59-A6C34878D82A}">
+                    <a16:rowId xmlns:a16="http://schemas.microsoft.com/office/drawing/2014/main" val="2981385891"/>
+                  </a:ext>
+                </a:extLst>
+              </a:tr>
+              <a:tr h="363101">
+                <a:tc>
+                  <a:txBody>
+                    <a:bodyPr/>
+                    <a:lstStyle/>
+                    <a:p>
+                      <a:pPr algn="r" fontAlgn="ctr">
+                        <a:spcBef>
+                          <a:spcPts val="0"/>
+                        </a:spcBef>
+                        <a:spcAft>
+                          <a:spcPts val="0"/>
+                        </a:spcAft>
+                      </a:pPr>
+                      <a:r>
+                        <a:rPr lang="en-US" sz="1600" b="1" i="0" u="none" strike="noStrike">
+                          <a:effectLst/>
+                          <a:latin typeface="Arial" panose="020B0604020202020204" pitchFamily="34" charset="0"/>
+                        </a:rPr>
+                        <a:t>10</a:t>
+                      </a:r>
+                      <a:endParaRPr lang="en-US" sz="1600" b="0" i="0" u="none" strike="noStrike">
+                        <a:effectLst/>
+                        <a:latin typeface="Arial" panose="020B0604020202020204" pitchFamily="34" charset="0"/>
+                      </a:endParaRPr>
+                    </a:p>
+                  </a:txBody>
+                  <a:tcPr marL="82523" marR="82523" marT="41261" marB="41261" anchor="ctr">
+                    <a:lnL>
+                      <a:noFill/>
+                    </a:lnL>
+                    <a:lnR>
+                      <a:noFill/>
+                    </a:lnR>
+                    <a:lnT>
+                      <a:noFill/>
+                    </a:lnT>
+                    <a:lnB>
+                      <a:noFill/>
+                    </a:lnB>
+                  </a:tcPr>
+                </a:tc>
+                <a:tc>
+                  <a:txBody>
+                    <a:bodyPr/>
+                    <a:lstStyle/>
+                    <a:p>
+                      <a:pPr algn="r" fontAlgn="ctr">
+                        <a:spcBef>
+                          <a:spcPts val="0"/>
+                        </a:spcBef>
+                        <a:spcAft>
+                          <a:spcPts val="0"/>
+                        </a:spcAft>
+                      </a:pPr>
+                      <a:r>
+                        <a:rPr lang="en-US" sz="1600" b="0" i="0" u="none" strike="noStrike">
+                          <a:effectLst/>
+                          <a:latin typeface="Arial" panose="020B0604020202020204" pitchFamily="34" charset="0"/>
+                        </a:rPr>
+                        <a:t>(2500, 3000]</a:t>
+                      </a:r>
+                    </a:p>
+                  </a:txBody>
+                  <a:tcPr marL="82523" marR="82523" marT="41261" marB="41261" anchor="ctr">
+                    <a:lnL>
+                      <a:noFill/>
+                    </a:lnL>
+                    <a:lnR>
+                      <a:noFill/>
+                    </a:lnR>
+                    <a:lnT>
+                      <a:noFill/>
+                    </a:lnT>
+                    <a:lnB>
+                      <a:noFill/>
+                    </a:lnB>
+                  </a:tcPr>
+                </a:tc>
+                <a:tc>
+                  <a:txBody>
+                    <a:bodyPr/>
+                    <a:lstStyle/>
+                    <a:p>
+                      <a:pPr algn="r" fontAlgn="ctr">
+                        <a:spcBef>
+                          <a:spcPts val="0"/>
+                        </a:spcBef>
+                        <a:spcAft>
+                          <a:spcPts val="0"/>
+                        </a:spcAft>
+                      </a:pPr>
+                      <a:r>
+                        <a:rPr lang="en-US" sz="1600" b="0" i="0" u="none" strike="noStrike">
+                          <a:effectLst/>
+                          <a:latin typeface="Arial" panose="020B0604020202020204" pitchFamily="34" charset="0"/>
+                        </a:rPr>
+                        <a:t>0.048349</a:t>
+                      </a:r>
+                    </a:p>
+                  </a:txBody>
+                  <a:tcPr marL="82523" marR="82523" marT="41261" marB="41261" anchor="ctr">
+                    <a:lnL>
+                      <a:noFill/>
+                    </a:lnL>
+                    <a:lnR>
+                      <a:noFill/>
+                    </a:lnR>
+                    <a:lnT>
+                      <a:noFill/>
+                    </a:lnT>
+                    <a:lnB>
+                      <a:noFill/>
+                    </a:lnB>
+                  </a:tcPr>
+                </a:tc>
+                <a:extLst>
+                  <a:ext uri="{0D108BD9-81ED-4DB2-BD59-A6C34878D82A}">
+                    <a16:rowId xmlns:a16="http://schemas.microsoft.com/office/drawing/2014/main" val="187655672"/>
+                  </a:ext>
+                </a:extLst>
+              </a:tr>
+              <a:tr h="363101">
+                <a:tc>
+                  <a:txBody>
+                    <a:bodyPr/>
+                    <a:lstStyle/>
+                    <a:p>
+                      <a:pPr algn="r" fontAlgn="ctr">
+                        <a:spcBef>
+                          <a:spcPts val="0"/>
+                        </a:spcBef>
+                        <a:spcAft>
+                          <a:spcPts val="0"/>
+                        </a:spcAft>
+                      </a:pPr>
+                      <a:r>
+                        <a:rPr lang="en-US" sz="1600" b="1" i="0" u="none" strike="noStrike">
+                          <a:effectLst/>
+                          <a:latin typeface="Arial" panose="020B0604020202020204" pitchFamily="34" charset="0"/>
+                        </a:rPr>
+                        <a:t>11</a:t>
+                      </a:r>
+                      <a:endParaRPr lang="en-US" sz="1600" b="0" i="0" u="none" strike="noStrike">
+                        <a:effectLst/>
+                        <a:latin typeface="Arial" panose="020B0604020202020204" pitchFamily="34" charset="0"/>
+                      </a:endParaRPr>
+                    </a:p>
+                  </a:txBody>
+                  <a:tcPr marL="82523" marR="82523" marT="41261" marB="41261" anchor="ctr">
+                    <a:lnL>
+                      <a:noFill/>
+                    </a:lnL>
+                    <a:lnR>
+                      <a:noFill/>
+                    </a:lnR>
+                    <a:lnT>
+                      <a:noFill/>
+                    </a:lnT>
+                    <a:lnB>
+                      <a:noFill/>
+                    </a:lnB>
+                  </a:tcPr>
+                </a:tc>
+                <a:tc>
+                  <a:txBody>
+                    <a:bodyPr/>
+                    <a:lstStyle/>
+                    <a:p>
+                      <a:pPr algn="r" fontAlgn="ctr">
+                        <a:spcBef>
+                          <a:spcPts val="0"/>
+                        </a:spcBef>
+                        <a:spcAft>
+                          <a:spcPts val="0"/>
+                        </a:spcAft>
+                      </a:pPr>
+                      <a:r>
+                        <a:rPr lang="en-US" sz="1600" b="0" i="0" u="none" strike="noStrike">
+                          <a:effectLst/>
+                          <a:latin typeface="Arial" panose="020B0604020202020204" pitchFamily="34" charset="0"/>
+                        </a:rPr>
+                        <a:t>(3000, 3500]</a:t>
+                      </a:r>
+                    </a:p>
+                  </a:txBody>
+                  <a:tcPr marL="82523" marR="82523" marT="41261" marB="41261" anchor="ctr">
+                    <a:lnL>
+                      <a:noFill/>
+                    </a:lnL>
+                    <a:lnR>
+                      <a:noFill/>
+                    </a:lnR>
+                    <a:lnT>
+                      <a:noFill/>
+                    </a:lnT>
+                    <a:lnB>
+                      <a:noFill/>
+                    </a:lnB>
+                  </a:tcPr>
+                </a:tc>
+                <a:tc>
+                  <a:txBody>
+                    <a:bodyPr/>
+                    <a:lstStyle/>
+                    <a:p>
+                      <a:pPr algn="r" fontAlgn="ctr">
+                        <a:spcBef>
+                          <a:spcPts val="0"/>
+                        </a:spcBef>
+                        <a:spcAft>
+                          <a:spcPts val="0"/>
+                        </a:spcAft>
+                      </a:pPr>
+                      <a:r>
+                        <a:rPr lang="en-US" sz="1600" b="0" i="0" u="none" strike="noStrike">
+                          <a:effectLst/>
+                          <a:latin typeface="Arial" panose="020B0604020202020204" pitchFamily="34" charset="0"/>
+                        </a:rPr>
+                        <a:t>0.027076</a:t>
+                      </a:r>
+                    </a:p>
+                  </a:txBody>
+                  <a:tcPr marL="82523" marR="82523" marT="41261" marB="41261" anchor="ctr">
+                    <a:lnL>
+                      <a:noFill/>
+                    </a:lnL>
+                    <a:lnR>
+                      <a:noFill/>
+                    </a:lnR>
+                    <a:lnT>
+                      <a:noFill/>
+                    </a:lnT>
+                    <a:lnB>
+                      <a:noFill/>
+                    </a:lnB>
+                  </a:tcPr>
+                </a:tc>
+                <a:extLst>
+                  <a:ext uri="{0D108BD9-81ED-4DB2-BD59-A6C34878D82A}">
+                    <a16:rowId xmlns:a16="http://schemas.microsoft.com/office/drawing/2014/main" val="613171482"/>
+                  </a:ext>
+                </a:extLst>
+              </a:tr>
+              <a:tr h="363101">
+                <a:tc>
+                  <a:txBody>
+                    <a:bodyPr/>
+                    <a:lstStyle/>
+                    <a:p>
+                      <a:pPr algn="r" fontAlgn="ctr">
+                        <a:spcBef>
+                          <a:spcPts val="0"/>
+                        </a:spcBef>
+                        <a:spcAft>
+                          <a:spcPts val="0"/>
+                        </a:spcAft>
+                      </a:pPr>
+                      <a:r>
+                        <a:rPr lang="en-US" sz="1600" b="1" i="0" u="none" strike="noStrike">
+                          <a:effectLst/>
+                          <a:latin typeface="Arial" panose="020B0604020202020204" pitchFamily="34" charset="0"/>
+                        </a:rPr>
+                        <a:t>9</a:t>
+                      </a:r>
+                      <a:endParaRPr lang="en-US" sz="1600" b="0" i="0" u="none" strike="noStrike">
+                        <a:effectLst/>
+                        <a:latin typeface="Arial" panose="020B0604020202020204" pitchFamily="34" charset="0"/>
+                      </a:endParaRPr>
+                    </a:p>
+                  </a:txBody>
+                  <a:tcPr marL="82523" marR="82523" marT="41261" marB="41261" anchor="ctr">
+                    <a:lnL>
+                      <a:noFill/>
+                    </a:lnL>
+                    <a:lnR>
+                      <a:noFill/>
+                    </a:lnR>
+                    <a:lnT>
+                      <a:noFill/>
+                    </a:lnT>
+                    <a:lnB>
+                      <a:noFill/>
+                    </a:lnB>
+                  </a:tcPr>
+                </a:tc>
+                <a:tc>
+                  <a:txBody>
+                    <a:bodyPr/>
+                    <a:lstStyle/>
+                    <a:p>
+                      <a:pPr algn="r" fontAlgn="ctr">
+                        <a:spcBef>
+                          <a:spcPts val="0"/>
+                        </a:spcBef>
+                        <a:spcAft>
+                          <a:spcPts val="0"/>
+                        </a:spcAft>
+                      </a:pPr>
+                      <a:r>
+                        <a:rPr lang="en-US" sz="1600" b="0" i="0" u="none" strike="noStrike">
+                          <a:effectLst/>
+                          <a:latin typeface="Arial" panose="020B0604020202020204" pitchFamily="34" charset="0"/>
+                        </a:rPr>
+                        <a:t>(3500, 18545]</a:t>
+                      </a:r>
+                    </a:p>
+                  </a:txBody>
+                  <a:tcPr marL="82523" marR="82523" marT="41261" marB="41261" anchor="ctr">
+                    <a:lnL>
+                      <a:noFill/>
+                    </a:lnL>
+                    <a:lnR>
+                      <a:noFill/>
+                    </a:lnR>
+                    <a:lnT>
+                      <a:noFill/>
+                    </a:lnT>
+                    <a:lnB>
+                      <a:noFill/>
+                    </a:lnB>
+                  </a:tcPr>
+                </a:tc>
+                <a:tc>
+                  <a:txBody>
+                    <a:bodyPr/>
+                    <a:lstStyle/>
+                    <a:p>
+                      <a:pPr algn="r" fontAlgn="ctr">
+                        <a:spcBef>
+                          <a:spcPts val="0"/>
+                        </a:spcBef>
+                        <a:spcAft>
+                          <a:spcPts val="0"/>
+                        </a:spcAft>
+                      </a:pPr>
+                      <a:r>
+                        <a:rPr lang="en-US" sz="1600" b="0" i="0" u="none" strike="noStrike" dirty="0">
+                          <a:effectLst/>
+                          <a:latin typeface="Arial" panose="020B0604020202020204" pitchFamily="34" charset="0"/>
+                        </a:rPr>
+                        <a:t>0.073491</a:t>
+                      </a:r>
+                    </a:p>
+                  </a:txBody>
+                  <a:tcPr marL="82523" marR="82523" marT="41261" marB="41261" anchor="ctr">
+                    <a:lnL>
+                      <a:noFill/>
+                    </a:lnL>
+                    <a:lnR>
+                      <a:noFill/>
+                    </a:lnR>
+                    <a:lnT>
+                      <a:noFill/>
+                    </a:lnT>
+                    <a:lnB>
+                      <a:noFill/>
+                    </a:lnB>
+                  </a:tcPr>
+                </a:tc>
+                <a:extLst>
+                  <a:ext uri="{0D108BD9-81ED-4DB2-BD59-A6C34878D82A}">
+                    <a16:rowId xmlns:a16="http://schemas.microsoft.com/office/drawing/2014/main" val="3232703096"/>
+                  </a:ext>
+                </a:extLst>
+              </a:tr>
+            </a:tbl>
+          </a:graphicData>
+        </a:graphic>
+      </p:graphicFrame>
+    </p:spTree>
+    <p:extLst>
+      <p:ext uri="{BB962C8B-B14F-4D97-AF65-F5344CB8AC3E}">
+        <p14:creationId xmlns:p14="http://schemas.microsoft.com/office/powerpoint/2010/main" val="2246338247"/>
+      </p:ext>
+    </p:extLst>
+  </p:cSld>
+  <p:clrMapOvr>
+    <a:masterClrMapping/>
+  </p:clrMapOvr>
+</p:sld>
+</file>
+
 <file path=ppt/theme/theme1.xml><?xml version="1.0" encoding="utf-8"?>
 <a:theme xmlns:a="http://schemas.openxmlformats.org/drawingml/2006/main" name="HeadlinesVTI">
   <a:themeElements>

</xml_diff>

<commit_message>
Final push before submission
</commit_message>
<xml_diff>
--- a/Airbnb prices analysis powerpoint.pptx
+++ b/Airbnb prices analysis powerpoint.pptx
@@ -8,21 +8,19 @@
     <p:sldId id="256" r:id="rId2"/>
     <p:sldId id="257" r:id="rId3"/>
     <p:sldId id="258" r:id="rId4"/>
-    <p:sldId id="259" r:id="rId5"/>
-    <p:sldId id="260" r:id="rId6"/>
-    <p:sldId id="261" r:id="rId7"/>
-    <p:sldId id="262" r:id="rId8"/>
-    <p:sldId id="263" r:id="rId9"/>
-    <p:sldId id="264" r:id="rId10"/>
-    <p:sldId id="265" r:id="rId11"/>
-    <p:sldId id="266" r:id="rId12"/>
-    <p:sldId id="267" r:id="rId13"/>
-    <p:sldId id="268" r:id="rId14"/>
-    <p:sldId id="269" r:id="rId15"/>
-    <p:sldId id="270" r:id="rId16"/>
-    <p:sldId id="271" r:id="rId17"/>
-    <p:sldId id="272" r:id="rId18"/>
-    <p:sldId id="273" r:id="rId19"/>
+    <p:sldId id="274" r:id="rId5"/>
+    <p:sldId id="259" r:id="rId6"/>
+    <p:sldId id="260" r:id="rId7"/>
+    <p:sldId id="261" r:id="rId8"/>
+    <p:sldId id="262" r:id="rId9"/>
+    <p:sldId id="263" r:id="rId10"/>
+    <p:sldId id="264" r:id="rId11"/>
+    <p:sldId id="265" r:id="rId12"/>
+    <p:sldId id="266" r:id="rId13"/>
+    <p:sldId id="267" r:id="rId14"/>
+    <p:sldId id="268" r:id="rId15"/>
+    <p:sldId id="269" r:id="rId16"/>
+    <p:sldId id="270" r:id="rId17"/>
   </p:sldIdLst>
   <p:sldSz cx="12192000" cy="6858000"/>
   <p:notesSz cx="6858000" cy="9144000"/>
@@ -4461,6 +4459,256 @@
           <p:cNvPr id="2" name="Title 1">
             <a:extLst>
               <a:ext uri="{FF2B5EF4-FFF2-40B4-BE49-F238E27FC236}">
+                <a16:creationId xmlns:a16="http://schemas.microsoft.com/office/drawing/2014/main" id="{55D80D2B-EE06-2A33-106B-AB429EAD87EB}"/>
+              </a:ext>
+            </a:extLst>
+          </p:cNvPr>
+          <p:cNvSpPr>
+            <a:spLocks noGrp="1"/>
+          </p:cNvSpPr>
+          <p:nvPr>
+            <p:ph type="title"/>
+          </p:nvPr>
+        </p:nvSpPr>
+        <p:spPr>
+          <a:xfrm>
+            <a:off x="873251" y="1051560"/>
+            <a:ext cx="10656761" cy="4754880"/>
+          </a:xfrm>
+        </p:spPr>
+        <p:txBody>
+          <a:bodyPr anchor="ctr" anchorCtr="0">
+            <a:normAutofit/>
+          </a:bodyPr>
+          <a:lstStyle/>
+          <a:p>
+            <a:pPr marL="0" marR="0">
+              <a:spcBef>
+                <a:spcPts val="0"/>
+              </a:spcBef>
+              <a:spcAft>
+                <a:spcPts val="0"/>
+              </a:spcAft>
+            </a:pPr>
+            <a:r>
+              <a:rPr lang="en-US" sz="2400" b="1" kern="100" dirty="0" err="1">
+                <a:solidFill>
+                  <a:srgbClr val="000000"/>
+                </a:solidFill>
+                <a:effectLst/>
+                <a:latin typeface="Calibri" panose="020F0502020204030204" pitchFamily="34" charset="0"/>
+                <a:ea typeface="Calibri" panose="020F0502020204030204" pitchFamily="34" charset="0"/>
+                <a:cs typeface="Arial" panose="020B0604020202020204" pitchFamily="34" charset="0"/>
+              </a:rPr>
+              <a:t>Attractions_rating</a:t>
+            </a:r>
+            <a:r>
+              <a:rPr lang="en-US" sz="2400" b="1" kern="100" dirty="0">
+                <a:solidFill>
+                  <a:srgbClr val="000000"/>
+                </a:solidFill>
+                <a:effectLst/>
+                <a:latin typeface="Calibri" panose="020F0502020204030204" pitchFamily="34" charset="0"/>
+                <a:ea typeface="Calibri" panose="020F0502020204030204" pitchFamily="34" charset="0"/>
+                <a:cs typeface="Arial" panose="020B0604020202020204" pitchFamily="34" charset="0"/>
+              </a:rPr>
+              <a:t>: </a:t>
+            </a:r>
+            <a:r>
+              <a:rPr lang="en-US" sz="2400" kern="100" dirty="0">
+                <a:solidFill>
+                  <a:srgbClr val="000000"/>
+                </a:solidFill>
+                <a:effectLst/>
+                <a:latin typeface="Calibri" panose="020F0502020204030204" pitchFamily="34" charset="0"/>
+                <a:ea typeface="Calibri" panose="020F0502020204030204" pitchFamily="34" charset="0"/>
+                <a:cs typeface="Arial" panose="020B0604020202020204" pitchFamily="34" charset="0"/>
+              </a:rPr>
+              <a:t>The histogram shows a normal distribution with no outliers.</a:t>
+            </a:r>
+            <a:br>
+              <a:rPr lang="en-US" sz="2400" kern="100" dirty="0">
+                <a:effectLst/>
+                <a:latin typeface="Calibri" panose="020F0502020204030204" pitchFamily="34" charset="0"/>
+                <a:ea typeface="Calibri" panose="020F0502020204030204" pitchFamily="34" charset="0"/>
+                <a:cs typeface="Arial" panose="020B0604020202020204" pitchFamily="34" charset="0"/>
+              </a:rPr>
+            </a:br>
+            <a:br>
+              <a:rPr lang="en-US" sz="2400" kern="100" dirty="0">
+                <a:effectLst/>
+                <a:latin typeface="Calibri" panose="020F0502020204030204" pitchFamily="34" charset="0"/>
+                <a:ea typeface="Calibri" panose="020F0502020204030204" pitchFamily="34" charset="0"/>
+                <a:cs typeface="Arial" panose="020B0604020202020204" pitchFamily="34" charset="0"/>
+              </a:rPr>
+            </a:br>
+            <a:r>
+              <a:rPr lang="en-US" sz="2400" b="1" kern="100" dirty="0" err="1">
+                <a:solidFill>
+                  <a:srgbClr val="000000"/>
+                </a:solidFill>
+                <a:effectLst/>
+                <a:latin typeface="Calibri" panose="020F0502020204030204" pitchFamily="34" charset="0"/>
+                <a:ea typeface="Calibri" panose="020F0502020204030204" pitchFamily="34" charset="0"/>
+                <a:cs typeface="Arial" panose="020B0604020202020204" pitchFamily="34" charset="0"/>
+              </a:rPr>
+              <a:t>City_dist</a:t>
+            </a:r>
+            <a:r>
+              <a:rPr lang="en-US" sz="2400" b="1" kern="100" dirty="0">
+                <a:solidFill>
+                  <a:srgbClr val="000000"/>
+                </a:solidFill>
+                <a:effectLst/>
+                <a:latin typeface="Calibri" panose="020F0502020204030204" pitchFamily="34" charset="0"/>
+                <a:ea typeface="Calibri" panose="020F0502020204030204" pitchFamily="34" charset="0"/>
+                <a:cs typeface="Arial" panose="020B0604020202020204" pitchFamily="34" charset="0"/>
+              </a:rPr>
+              <a:t>: </a:t>
+            </a:r>
+            <a:r>
+              <a:rPr lang="en-US" sz="2400" kern="100" dirty="0">
+                <a:solidFill>
+                  <a:srgbClr val="000000"/>
+                </a:solidFill>
+                <a:effectLst/>
+                <a:latin typeface="Calibri" panose="020F0502020204030204" pitchFamily="34" charset="0"/>
+                <a:ea typeface="Calibri" panose="020F0502020204030204" pitchFamily="34" charset="0"/>
+                <a:cs typeface="Arial" panose="020B0604020202020204" pitchFamily="34" charset="0"/>
+              </a:rPr>
+              <a:t>The histogram shows a left-skewed distribution with no outliers.</a:t>
+            </a:r>
+            <a:br>
+              <a:rPr lang="en-US" sz="2400" kern="100" dirty="0">
+                <a:effectLst/>
+                <a:latin typeface="Calibri" panose="020F0502020204030204" pitchFamily="34" charset="0"/>
+                <a:ea typeface="Calibri" panose="020F0502020204030204" pitchFamily="34" charset="0"/>
+                <a:cs typeface="Arial" panose="020B0604020202020204" pitchFamily="34" charset="0"/>
+              </a:rPr>
+            </a:br>
+            <a:br>
+              <a:rPr lang="en-US" sz="2400" kern="100" dirty="0">
+                <a:effectLst/>
+                <a:latin typeface="Calibri" panose="020F0502020204030204" pitchFamily="34" charset="0"/>
+                <a:ea typeface="Calibri" panose="020F0502020204030204" pitchFamily="34" charset="0"/>
+                <a:cs typeface="Arial" panose="020B0604020202020204" pitchFamily="34" charset="0"/>
+              </a:rPr>
+            </a:br>
+            <a:r>
+              <a:rPr lang="en-US" sz="2400" b="1" kern="100" dirty="0" err="1">
+                <a:solidFill>
+                  <a:srgbClr val="000000"/>
+                </a:solidFill>
+                <a:effectLst/>
+                <a:latin typeface="Calibri" panose="020F0502020204030204" pitchFamily="34" charset="0"/>
+                <a:ea typeface="Calibri" panose="020F0502020204030204" pitchFamily="34" charset="0"/>
+                <a:cs typeface="Arial" panose="020B0604020202020204" pitchFamily="34" charset="0"/>
+              </a:rPr>
+              <a:t>Satisfaction_rating</a:t>
+            </a:r>
+            <a:r>
+              <a:rPr lang="en-US" sz="2400" b="1" kern="100" dirty="0">
+                <a:solidFill>
+                  <a:srgbClr val="000000"/>
+                </a:solidFill>
+                <a:effectLst/>
+                <a:latin typeface="Calibri" panose="020F0502020204030204" pitchFamily="34" charset="0"/>
+                <a:ea typeface="Calibri" panose="020F0502020204030204" pitchFamily="34" charset="0"/>
+                <a:cs typeface="Arial" panose="020B0604020202020204" pitchFamily="34" charset="0"/>
+              </a:rPr>
+              <a:t>: </a:t>
+            </a:r>
+            <a:r>
+              <a:rPr lang="en-US" sz="2400" kern="100" dirty="0">
+                <a:solidFill>
+                  <a:srgbClr val="000000"/>
+                </a:solidFill>
+                <a:effectLst/>
+                <a:latin typeface="Calibri" panose="020F0502020204030204" pitchFamily="34" charset="0"/>
+                <a:ea typeface="Calibri" panose="020F0502020204030204" pitchFamily="34" charset="0"/>
+                <a:cs typeface="Arial" panose="020B0604020202020204" pitchFamily="34" charset="0"/>
+              </a:rPr>
+              <a:t>The histogram shows a left-skewed distribution with no outliers.</a:t>
+            </a:r>
+            <a:br>
+              <a:rPr lang="en-US" sz="2400" kern="100" dirty="0">
+                <a:effectLst/>
+                <a:latin typeface="Calibri" panose="020F0502020204030204" pitchFamily="34" charset="0"/>
+                <a:ea typeface="Calibri" panose="020F0502020204030204" pitchFamily="34" charset="0"/>
+                <a:cs typeface="Arial" panose="020B0604020202020204" pitchFamily="34" charset="0"/>
+              </a:rPr>
+            </a:br>
+            <a:br>
+              <a:rPr lang="en-US" sz="2400" kern="100" dirty="0">
+                <a:effectLst/>
+                <a:latin typeface="Calibri" panose="020F0502020204030204" pitchFamily="34" charset="0"/>
+                <a:ea typeface="Calibri" panose="020F0502020204030204" pitchFamily="34" charset="0"/>
+                <a:cs typeface="Arial" panose="020B0604020202020204" pitchFamily="34" charset="0"/>
+              </a:rPr>
+            </a:br>
+            <a:r>
+              <a:rPr lang="en-US" sz="2400" b="1" kern="100" dirty="0">
+                <a:solidFill>
+                  <a:srgbClr val="000000"/>
+                </a:solidFill>
+                <a:effectLst/>
+                <a:latin typeface="Calibri" panose="020F0502020204030204" pitchFamily="34" charset="0"/>
+                <a:ea typeface="Calibri" panose="020F0502020204030204" pitchFamily="34" charset="0"/>
+                <a:cs typeface="Arial" panose="020B0604020202020204" pitchFamily="34" charset="0"/>
+              </a:rPr>
+              <a:t>Bedrooms: </a:t>
+            </a:r>
+            <a:r>
+              <a:rPr lang="en-US" sz="2400" kern="100" dirty="0">
+                <a:solidFill>
+                  <a:srgbClr val="000000"/>
+                </a:solidFill>
+                <a:effectLst/>
+                <a:latin typeface="Calibri" panose="020F0502020204030204" pitchFamily="34" charset="0"/>
+                <a:ea typeface="Calibri" panose="020F0502020204030204" pitchFamily="34" charset="0"/>
+                <a:cs typeface="Arial" panose="020B0604020202020204" pitchFamily="34" charset="0"/>
+              </a:rPr>
+              <a:t>The histogram shows a left-skewed distribution with outliers on the lower end of the number of bedrooms.</a:t>
+            </a:r>
+            <a:endParaRPr lang="en-US" sz="7200" dirty="0"/>
+          </a:p>
+        </p:txBody>
+      </p:sp>
+    </p:spTree>
+    <p:extLst>
+      <p:ext uri="{BB962C8B-B14F-4D97-AF65-F5344CB8AC3E}">
+        <p14:creationId xmlns:p14="http://schemas.microsoft.com/office/powerpoint/2010/main" val="3098079624"/>
+      </p:ext>
+    </p:extLst>
+  </p:cSld>
+  <p:clrMapOvr>
+    <a:masterClrMapping/>
+  </p:clrMapOvr>
+</p:sld>
+</file>
+
+<file path=ppt/slides/slide11.xml><?xml version="1.0" encoding="utf-8"?>
+<p:sld xmlns:a="http://schemas.openxmlformats.org/drawingml/2006/main" xmlns:r="http://schemas.openxmlformats.org/officeDocument/2006/relationships" xmlns:p="http://schemas.openxmlformats.org/presentationml/2006/main">
+  <p:cSld>
+    <p:spTree>
+      <p:nvGrpSpPr>
+        <p:cNvPr id="1" name=""/>
+        <p:cNvGrpSpPr/>
+        <p:nvPr/>
+      </p:nvGrpSpPr>
+      <p:grpSpPr>
+        <a:xfrm>
+          <a:off x="0" y="0"/>
+          <a:ext cx="0" cy="0"/>
+          <a:chOff x="0" y="0"/>
+          <a:chExt cx="0" cy="0"/>
+        </a:xfrm>
+      </p:grpSpPr>
+      <p:sp>
+        <p:nvSpPr>
+          <p:cNvPr id="2" name="Title 1">
+            <a:extLst>
+              <a:ext uri="{FF2B5EF4-FFF2-40B4-BE49-F238E27FC236}">
                 <a16:creationId xmlns:a16="http://schemas.microsoft.com/office/drawing/2014/main" id="{3F8F1309-2ED3-1254-5F8E-45D3DDDF0F66}"/>
               </a:ext>
             </a:extLst>
@@ -4731,7 +4979,7 @@
 </p:sld>
 </file>
 
-<file path=ppt/slides/slide11.xml><?xml version="1.0" encoding="utf-8"?>
+<file path=ppt/slides/slide12.xml><?xml version="1.0" encoding="utf-8"?>
 <p:sld xmlns:a="http://schemas.openxmlformats.org/drawingml/2006/main" xmlns:r="http://schemas.openxmlformats.org/officeDocument/2006/relationships" xmlns:p="http://schemas.openxmlformats.org/presentationml/2006/main">
   <p:cSld>
     <p:bg>
@@ -5647,7 +5895,7 @@
 </p:sld>
 </file>
 
-<file path=ppt/slides/slide12.xml><?xml version="1.0" encoding="utf-8"?>
+<file path=ppt/slides/slide13.xml><?xml version="1.0" encoding="utf-8"?>
 <p:sld xmlns:a="http://schemas.openxmlformats.org/drawingml/2006/main" xmlns:r="http://schemas.openxmlformats.org/officeDocument/2006/relationships" xmlns:p="http://schemas.openxmlformats.org/presentationml/2006/main">
   <p:cSld>
     <p:spTree>
@@ -5792,7 +6040,7 @@
                 <a:ea typeface="Calibri" panose="020F0502020204030204" pitchFamily="34" charset="0"/>
                 <a:cs typeface="Arial" panose="020B0604020202020204" pitchFamily="34" charset="0"/>
               </a:rPr>
-              <a:t>A normal distribution was applied to the price variable to show how the data fits the normal distribution curve.</a:t>
+              <a:t>A normal analytical distribution was applied to the price variable to show how the data fits the normal distribution curve.</a:t>
             </a:r>
             <a:br>
               <a:rPr lang="en-US" sz="1800" kern="100" dirty="0">
@@ -5837,7 +6085,7 @@
         </p:blipFill>
         <p:spPr bwMode="auto">
           <a:xfrm>
-            <a:off x="1511943" y="2328863"/>
+            <a:off x="561975" y="2328863"/>
             <a:ext cx="4264879" cy="3258326"/>
           </a:xfrm>
           <a:prstGeom prst="rect">
@@ -5884,7 +6132,7 @@
         </p:blipFill>
         <p:spPr bwMode="auto">
           <a:xfrm>
-            <a:off x="6980227" y="2328863"/>
+            <a:off x="7676995" y="2328863"/>
             <a:ext cx="4076946" cy="3258326"/>
           </a:xfrm>
           <a:prstGeom prst="rect">
@@ -5911,13 +6159,15 @@
               </a:ext>
             </a:extLst>
           </p:cNvPr>
-          <p:cNvCxnSpPr/>
+          <p:cNvCxnSpPr>
+            <a:cxnSpLocks/>
+          </p:cNvCxnSpPr>
           <p:nvPr/>
         </p:nvCxnSpPr>
         <p:spPr>
           <a:xfrm>
-            <a:off x="5776822" y="4357688"/>
-            <a:ext cx="1152706" cy="0"/>
+            <a:off x="4986338" y="4357688"/>
+            <a:ext cx="2528887" cy="0"/>
           </a:xfrm>
           <a:prstGeom prst="straightConnector1">
             <a:avLst/>
@@ -5982,109 +6232,12 @@
           </a:p>
         </p:txBody>
       </p:sp>
-    </p:spTree>
-    <p:extLst>
-      <p:ext uri="{BB962C8B-B14F-4D97-AF65-F5344CB8AC3E}">
-        <p14:creationId xmlns:p14="http://schemas.microsoft.com/office/powerpoint/2010/main" val="788484283"/>
-      </p:ext>
-    </p:extLst>
-  </p:cSld>
-  <p:clrMapOvr>
-    <a:masterClrMapping/>
-  </p:clrMapOvr>
-</p:sld>
-</file>
-
-<file path=ppt/slides/slide13.xml><?xml version="1.0" encoding="utf-8"?>
-<p:sld xmlns:a="http://schemas.openxmlformats.org/drawingml/2006/main" xmlns:r="http://schemas.openxmlformats.org/officeDocument/2006/relationships" xmlns:p="http://schemas.openxmlformats.org/presentationml/2006/main">
-  <p:cSld>
-    <p:spTree>
-      <p:nvGrpSpPr>
-        <p:cNvPr id="1" name=""/>
-        <p:cNvGrpSpPr/>
-        <p:nvPr/>
-      </p:nvGrpSpPr>
-      <p:grpSpPr>
-        <a:xfrm>
-          <a:off x="0" y="0"/>
-          <a:ext cx="0" cy="0"/>
-          <a:chOff x="0" y="0"/>
-          <a:chExt cx="0" cy="0"/>
-        </a:xfrm>
-      </p:grpSpPr>
       <p:sp>
         <p:nvSpPr>
-          <p:cNvPr id="2" name="Title 1">
-            <a:extLst>
-              <a:ext uri="{FF2B5EF4-FFF2-40B4-BE49-F238E27FC236}">
-                <a16:creationId xmlns:a16="http://schemas.microsoft.com/office/drawing/2014/main" id="{2486FB48-F5C5-4E6D-DF7C-3B532E9E68E0}"/>
-              </a:ext>
-            </a:extLst>
-          </p:cNvPr>
-          <p:cNvSpPr>
-            <a:spLocks noGrp="1"/>
-          </p:cNvSpPr>
-          <p:nvPr>
-            <p:ph type="title"/>
-          </p:nvPr>
-        </p:nvSpPr>
-        <p:spPr>
-          <a:xfrm>
-            <a:off x="758952" y="758952"/>
-            <a:ext cx="2712911" cy="926973"/>
-          </a:xfrm>
-        </p:spPr>
-        <p:txBody>
-          <a:bodyPr>
-            <a:normAutofit fontScale="90000"/>
-          </a:bodyPr>
-          <a:lstStyle/>
-          <a:p>
-            <a:r>
-              <a:rPr lang="en-US" dirty="0"/>
-              <a:t>Outliers</a:t>
-            </a:r>
-          </a:p>
-        </p:txBody>
-      </p:sp>
-      <p:pic>
-        <p:nvPicPr>
-          <p:cNvPr id="4" name="Content Placeholder 3">
-            <a:extLst>
-              <a:ext uri="{FF2B5EF4-FFF2-40B4-BE49-F238E27FC236}">
-                <a16:creationId xmlns:a16="http://schemas.microsoft.com/office/drawing/2014/main" id="{96375BEA-9D5F-2666-2C4B-322A389C761A}"/>
-              </a:ext>
-            </a:extLst>
-          </p:cNvPr>
-          <p:cNvPicPr>
-            <a:picLocks noGrp="1" noChangeAspect="1"/>
-          </p:cNvPicPr>
-          <p:nvPr>
-            <p:ph idx="1"/>
-          </p:nvPr>
-        </p:nvPicPr>
-        <p:blipFill>
-          <a:blip r:embed="rId2"/>
-          <a:stretch>
-            <a:fillRect/>
-          </a:stretch>
-        </p:blipFill>
-        <p:spPr>
-          <a:xfrm>
-            <a:off x="758952" y="3953173"/>
-            <a:ext cx="10756600" cy="1036780"/>
-          </a:xfrm>
-          <a:prstGeom prst="rect">
-            <a:avLst/>
-          </a:prstGeom>
-        </p:spPr>
-      </p:pic>
-      <p:sp>
-        <p:nvSpPr>
-          <p:cNvPr id="5" name="TextBox 4">
-            <a:extLst>
-              <a:ext uri="{FF2B5EF4-FFF2-40B4-BE49-F238E27FC236}">
-                <a16:creationId xmlns:a16="http://schemas.microsoft.com/office/drawing/2014/main" id="{D3B9C948-B821-A766-8018-891EC2A4954A}"/>
+          <p:cNvPr id="8" name="TextBox 7">
+            <a:extLst>
+              <a:ext uri="{FF2B5EF4-FFF2-40B4-BE49-F238E27FC236}">
+                <a16:creationId xmlns:a16="http://schemas.microsoft.com/office/drawing/2014/main" id="{0D7CC0EF-5818-6667-5045-A972781B2CCA}"/>
               </a:ext>
             </a:extLst>
           </p:cNvPr>
@@ -6093,8 +6246,8 @@
         </p:nvSpPr>
         <p:spPr>
           <a:xfrm>
-            <a:off x="1109662" y="1644849"/>
-            <a:ext cx="9972675" cy="2308324"/>
+            <a:off x="4986338" y="3800475"/>
+            <a:ext cx="2528887" cy="369332"/>
           </a:xfrm>
           <a:prstGeom prst="rect">
             <a:avLst/>
@@ -6108,85 +6261,22 @@
           <a:lstStyle/>
           <a:p>
             <a:r>
-              <a:rPr lang="en-US" sz="2400" i="1" spc="100" dirty="0">
+              <a:rPr lang="en-US" i="1" kern="100" spc="100" dirty="0">
                 <a:solidFill>
-                  <a:schemeClr val="tx1">
-                    <a:lumMod val="85000"/>
-                    <a:lumOff val="15000"/>
-                  </a:schemeClr>
+                  <a:srgbClr val="000000"/>
                 </a:solidFill>
-                <a:latin typeface="+mj-lt"/>
-                <a:ea typeface="+mj-ea"/>
-                <a:cs typeface="+mj-cs"/>
+                <a:latin typeface="Calibri" panose="020F0502020204030204" pitchFamily="34" charset="0"/>
+                <a:cs typeface="Arial" panose="020B0604020202020204" pitchFamily="34" charset="0"/>
               </a:rPr>
-              <a:t>We calculated outliers of the prices in my data using z-scores. Using 3 standard deviation above and below the mean, we found that the minimum outlier price is at 1263.9 pounds in our listings.</a:t>
-            </a:r>
-          </a:p>
-          <a:p>
-            <a:endParaRPr lang="en-US" sz="2400" i="1" spc="100" dirty="0">
-              <a:solidFill>
-                <a:schemeClr val="tx1">
-                  <a:lumMod val="85000"/>
-                  <a:lumOff val="15000"/>
-                </a:schemeClr>
-              </a:solidFill>
-              <a:latin typeface="+mj-lt"/>
-              <a:ea typeface="+mj-ea"/>
-              <a:cs typeface="+mj-cs"/>
-            </a:endParaRPr>
-          </a:p>
-          <a:p>
-            <a:r>
-              <a:rPr lang="en-US" sz="2400" i="1" spc="100" dirty="0">
-                <a:solidFill>
-                  <a:schemeClr val="tx1">
-                    <a:lumMod val="85000"/>
-                    <a:lumOff val="15000"/>
-                  </a:schemeClr>
-                </a:solidFill>
-                <a:latin typeface="+mj-lt"/>
-                <a:ea typeface="+mj-ea"/>
-                <a:cs typeface="+mj-cs"/>
-              </a:rPr>
-              <a:t>We then removed the outliers of the price so they wont affect our distribution.</a:t>
+              <a:t>Analytical distribution</a:t>
             </a:r>
           </a:p>
         </p:txBody>
       </p:sp>
-      <p:pic>
-        <p:nvPicPr>
-          <p:cNvPr id="6" name="Picture 5">
-            <a:extLst>
-              <a:ext uri="{FF2B5EF4-FFF2-40B4-BE49-F238E27FC236}">
-                <a16:creationId xmlns:a16="http://schemas.microsoft.com/office/drawing/2014/main" id="{2323C4B5-8649-CEF3-F8CE-605B23B8BA56}"/>
-              </a:ext>
-            </a:extLst>
-          </p:cNvPr>
-          <p:cNvPicPr>
-            <a:picLocks noChangeAspect="1"/>
-          </p:cNvPicPr>
-          <p:nvPr/>
-        </p:nvPicPr>
-        <p:blipFill>
-          <a:blip r:embed="rId3"/>
-          <a:stretch>
-            <a:fillRect/>
-          </a:stretch>
-        </p:blipFill>
-        <p:spPr>
-          <a:xfrm>
-            <a:off x="758951" y="5156001"/>
-            <a:ext cx="10756599" cy="1135354"/>
-          </a:xfrm>
-          <a:prstGeom prst="rect">
-            <a:avLst/>
-          </a:prstGeom>
-        </p:spPr>
-      </p:pic>
     </p:spTree>
     <p:extLst>
       <p:ext uri="{BB962C8B-B14F-4D97-AF65-F5344CB8AC3E}">
-        <p14:creationId xmlns:p14="http://schemas.microsoft.com/office/powerpoint/2010/main" val="3127444743"/>
+        <p14:creationId xmlns:p14="http://schemas.microsoft.com/office/powerpoint/2010/main" val="788484283"/>
       </p:ext>
     </p:extLst>
   </p:cSld>
@@ -6218,7 +6308,7 @@
           <p:cNvPr id="2" name="Title 1">
             <a:extLst>
               <a:ext uri="{FF2B5EF4-FFF2-40B4-BE49-F238E27FC236}">
-                <a16:creationId xmlns:a16="http://schemas.microsoft.com/office/drawing/2014/main" id="{74D34391-70C9-9D2F-B423-A6A4388E0348}"/>
+                <a16:creationId xmlns:a16="http://schemas.microsoft.com/office/drawing/2014/main" id="{2486FB48-F5C5-4E6D-DF7C-3B532E9E68E0}"/>
               </a:ext>
             </a:extLst>
           </p:cNvPr>
@@ -6229,21 +6319,447 @@
             <p:ph type="title"/>
           </p:nvPr>
         </p:nvSpPr>
-        <p:spPr/>
+        <p:spPr>
+          <a:xfrm>
+            <a:off x="758951" y="385780"/>
+            <a:ext cx="2712911" cy="926973"/>
+          </a:xfrm>
+        </p:spPr>
         <p:txBody>
-          <a:bodyPr/>
+          <a:bodyPr>
+            <a:normAutofit fontScale="90000"/>
+          </a:bodyPr>
           <a:lstStyle/>
           <a:p>
+            <a:r>
+              <a:rPr lang="en-US" dirty="0"/>
+              <a:t>Outliers</a:t>
+            </a:r>
+          </a:p>
+        </p:txBody>
+      </p:sp>
+      <p:pic>
+        <p:nvPicPr>
+          <p:cNvPr id="4" name="Content Placeholder 3">
+            <a:extLst>
+              <a:ext uri="{FF2B5EF4-FFF2-40B4-BE49-F238E27FC236}">
+                <a16:creationId xmlns:a16="http://schemas.microsoft.com/office/drawing/2014/main" id="{96375BEA-9D5F-2666-2C4B-322A389C761A}"/>
+              </a:ext>
+            </a:extLst>
+          </p:cNvPr>
+          <p:cNvPicPr>
+            <a:picLocks noGrp="1" noChangeAspect="1"/>
+          </p:cNvPicPr>
+          <p:nvPr>
+            <p:ph idx="1"/>
+          </p:nvPr>
+        </p:nvPicPr>
+        <p:blipFill>
+          <a:blip r:embed="rId2"/>
+          <a:stretch>
+            <a:fillRect/>
+          </a:stretch>
+        </p:blipFill>
+        <p:spPr>
+          <a:xfrm>
+            <a:off x="758952" y="3787125"/>
+            <a:ext cx="10756600" cy="1036780"/>
+          </a:xfrm>
+          <a:prstGeom prst="rect">
+            <a:avLst/>
+          </a:prstGeom>
+        </p:spPr>
+      </p:pic>
+      <p:sp>
+        <p:nvSpPr>
+          <p:cNvPr id="5" name="TextBox 4">
+            <a:extLst>
+              <a:ext uri="{FF2B5EF4-FFF2-40B4-BE49-F238E27FC236}">
+                <a16:creationId xmlns:a16="http://schemas.microsoft.com/office/drawing/2014/main" id="{D3B9C948-B821-A766-8018-891EC2A4954A}"/>
+              </a:ext>
+            </a:extLst>
+          </p:cNvPr>
+          <p:cNvSpPr txBox="1"/>
+          <p:nvPr/>
+        </p:nvSpPr>
+        <p:spPr>
+          <a:xfrm>
+            <a:off x="1150912" y="1312753"/>
+            <a:ext cx="9972675" cy="2308324"/>
+          </a:xfrm>
+          <a:prstGeom prst="rect">
+            <a:avLst/>
+          </a:prstGeom>
+          <a:noFill/>
+        </p:spPr>
+        <p:txBody>
+          <a:bodyPr wrap="square" rtlCol="0">
+            <a:spAutoFit/>
+          </a:bodyPr>
+          <a:lstStyle/>
+          <a:p>
+            <a:r>
+              <a:rPr lang="en-US" sz="2400" i="1" spc="100" dirty="0">
+                <a:solidFill>
+                  <a:schemeClr val="tx1">
+                    <a:lumMod val="85000"/>
+                    <a:lumOff val="15000"/>
+                  </a:schemeClr>
+                </a:solidFill>
+                <a:latin typeface="+mj-lt"/>
+                <a:ea typeface="+mj-ea"/>
+                <a:cs typeface="+mj-cs"/>
+              </a:rPr>
+              <a:t>We calculated outliers of the prices in my data using z-scores. Using 3 standard deviation above and below the mean, we found that the minimum outlier price is at 1263.9 pounds in our listings.</a:t>
+            </a:r>
+          </a:p>
+          <a:p>
+            <a:endParaRPr lang="en-US" sz="2400" i="1" spc="100" dirty="0">
+              <a:solidFill>
+                <a:schemeClr val="tx1">
+                  <a:lumMod val="85000"/>
+                  <a:lumOff val="15000"/>
+                </a:schemeClr>
+              </a:solidFill>
+              <a:latin typeface="+mj-lt"/>
+              <a:ea typeface="+mj-ea"/>
+              <a:cs typeface="+mj-cs"/>
+            </a:endParaRPr>
+          </a:p>
+          <a:p>
+            <a:r>
+              <a:rPr lang="en-US" sz="2400" i="1" spc="100" dirty="0">
+                <a:solidFill>
+                  <a:schemeClr val="tx1">
+                    <a:lumMod val="85000"/>
+                    <a:lumOff val="15000"/>
+                  </a:schemeClr>
+                </a:solidFill>
+                <a:latin typeface="+mj-lt"/>
+                <a:ea typeface="+mj-ea"/>
+                <a:cs typeface="+mj-cs"/>
+              </a:rPr>
+              <a:t>We then removed the outliers of the price so they won't affect our distribution.</a:t>
+            </a:r>
+          </a:p>
+        </p:txBody>
+      </p:sp>
+      <p:pic>
+        <p:nvPicPr>
+          <p:cNvPr id="6" name="Picture 5">
+            <a:extLst>
+              <a:ext uri="{FF2B5EF4-FFF2-40B4-BE49-F238E27FC236}">
+                <a16:creationId xmlns:a16="http://schemas.microsoft.com/office/drawing/2014/main" id="{2323C4B5-8649-CEF3-F8CE-605B23B8BA56}"/>
+              </a:ext>
+            </a:extLst>
+          </p:cNvPr>
+          <p:cNvPicPr>
+            <a:picLocks noChangeAspect="1"/>
+          </p:cNvPicPr>
+          <p:nvPr/>
+        </p:nvPicPr>
+        <p:blipFill>
+          <a:blip r:embed="rId3"/>
+          <a:stretch>
+            <a:fillRect/>
+          </a:stretch>
+        </p:blipFill>
+        <p:spPr>
+          <a:xfrm>
+            <a:off x="758951" y="4989953"/>
+            <a:ext cx="10756599" cy="1135354"/>
+          </a:xfrm>
+          <a:prstGeom prst="rect">
+            <a:avLst/>
+          </a:prstGeom>
+        </p:spPr>
+      </p:pic>
+    </p:spTree>
+    <p:extLst>
+      <p:ext uri="{BB962C8B-B14F-4D97-AF65-F5344CB8AC3E}">
+        <p14:creationId xmlns:p14="http://schemas.microsoft.com/office/powerpoint/2010/main" val="3127444743"/>
+      </p:ext>
+    </p:extLst>
+  </p:cSld>
+  <p:clrMapOvr>
+    <a:masterClrMapping/>
+  </p:clrMapOvr>
+</p:sld>
+</file>
+
+<file path=ppt/slides/slide15.xml><?xml version="1.0" encoding="utf-8"?>
+<p:sld xmlns:a="http://schemas.openxmlformats.org/drawingml/2006/main" xmlns:r="http://schemas.openxmlformats.org/officeDocument/2006/relationships" xmlns:p="http://schemas.openxmlformats.org/presentationml/2006/main">
+  <p:cSld>
+    <p:bg>
+      <p:bgPr>
+        <a:solidFill>
+          <a:schemeClr val="bg2"/>
+        </a:solidFill>
+        <a:effectLst/>
+      </p:bgPr>
+    </p:bg>
+    <p:spTree>
+      <p:nvGrpSpPr>
+        <p:cNvPr id="1" name=""/>
+        <p:cNvGrpSpPr/>
+        <p:nvPr/>
+      </p:nvGrpSpPr>
+      <p:grpSpPr>
+        <a:xfrm>
+          <a:off x="0" y="0"/>
+          <a:ext cx="0" cy="0"/>
+          <a:chOff x="0" y="0"/>
+          <a:chExt cx="0" cy="0"/>
+        </a:xfrm>
+      </p:grpSpPr>
+      <p:sp useBgFill="1">
+        <p:nvSpPr>
+          <p:cNvPr id="9238" name="Rectangle 9237">
+            <a:extLst>
+              <a:ext uri="{FF2B5EF4-FFF2-40B4-BE49-F238E27FC236}">
+                <a16:creationId xmlns:a16="http://schemas.microsoft.com/office/drawing/2014/main" id="{C5176844-69C3-4F79-BE38-EA5BDDF4FEA4}"/>
+              </a:ext>
+              <a:ext uri="{C183D7F6-B498-43B3-948B-1728B52AA6E4}">
+                <adec:decorative xmlns:adec="http://schemas.microsoft.com/office/drawing/2017/decorative" val="1"/>
+              </a:ext>
+            </a:extLst>
+          </p:cNvPr>
+          <p:cNvSpPr>
+            <a:spLocks noGrp="1" noRot="1" noChangeAspect="1" noMove="1" noResize="1" noEditPoints="1" noAdjustHandles="1" noChangeArrowheads="1" noChangeShapeType="1" noTextEdit="1"/>
+          </p:cNvSpPr>
+          <p:nvPr>
+            <p:extLst>
+              <p:ext uri="{386F3935-93C4-4BCD-93E2-E3B085C9AB24}">
+                <p16:designElem xmlns:p16="http://schemas.microsoft.com/office/powerpoint/2015/main" val="1"/>
+              </p:ext>
+            </p:extLst>
+          </p:nvPr>
+        </p:nvSpPr>
+        <p:spPr>
+          <a:xfrm>
+            <a:off x="0" y="0"/>
+            <a:ext cx="12192000" cy="6858000"/>
+          </a:xfrm>
+          <a:prstGeom prst="rect">
+            <a:avLst/>
+          </a:prstGeom>
+          <a:ln>
+            <a:noFill/>
+          </a:ln>
+        </p:spPr>
+        <p:style>
+          <a:lnRef idx="2">
+            <a:schemeClr val="accent1">
+              <a:shade val="50000"/>
+            </a:schemeClr>
+          </a:lnRef>
+          <a:fillRef idx="1">
+            <a:schemeClr val="accent1"/>
+          </a:fillRef>
+          <a:effectRef idx="0">
+            <a:schemeClr val="accent1"/>
+          </a:effectRef>
+          <a:fontRef idx="minor">
+            <a:schemeClr val="lt1"/>
+          </a:fontRef>
+        </p:style>
+        <p:txBody>
+          <a:bodyPr rtlCol="0" anchor="ctr"/>
+          <a:lstStyle/>
+          <a:p>
+            <a:pPr algn="ctr"/>
             <a:endParaRPr lang="en-US"/>
           </a:p>
         </p:txBody>
       </p:sp>
       <p:sp>
         <p:nvSpPr>
-          <p:cNvPr id="3" name="Content Placeholder 2">
-            <a:extLst>
-              <a:ext uri="{FF2B5EF4-FFF2-40B4-BE49-F238E27FC236}">
-                <a16:creationId xmlns:a16="http://schemas.microsoft.com/office/drawing/2014/main" id="{0C069FF9-CD0F-8C2C-359E-EBEA29316D9E}"/>
+          <p:cNvPr id="2" name="Title 1">
+            <a:extLst>
+              <a:ext uri="{FF2B5EF4-FFF2-40B4-BE49-F238E27FC236}">
+                <a16:creationId xmlns:a16="http://schemas.microsoft.com/office/drawing/2014/main" id="{74D34391-70C9-9D2F-B423-A6A4388E0348}"/>
+              </a:ext>
+            </a:extLst>
+          </p:cNvPr>
+          <p:cNvSpPr>
+            <a:spLocks noGrp="1"/>
+          </p:cNvSpPr>
+          <p:nvPr>
+            <p:ph type="title"/>
+          </p:nvPr>
+        </p:nvSpPr>
+        <p:spPr>
+          <a:xfrm>
+            <a:off x="758952" y="420625"/>
+            <a:ext cx="10667998" cy="1326814"/>
+          </a:xfrm>
+        </p:spPr>
+        <p:txBody>
+          <a:bodyPr anchor="ctr">
+            <a:normAutofit/>
+          </a:bodyPr>
+          <a:lstStyle/>
+          <a:p>
+            <a:r>
+              <a:rPr lang="en-US" dirty="0"/>
+              <a:t>Scatter plots</a:t>
+            </a:r>
+          </a:p>
+        </p:txBody>
+      </p:sp>
+      <p:cxnSp>
+        <p:nvCxnSpPr>
+          <p:cNvPr id="9240" name="Straight Connector 9239">
+            <a:extLst>
+              <a:ext uri="{FF2B5EF4-FFF2-40B4-BE49-F238E27FC236}">
+                <a16:creationId xmlns:a16="http://schemas.microsoft.com/office/drawing/2014/main" id="{4D5E13B1-3A31-47C7-8474-7A3DE600680D}"/>
+              </a:ext>
+              <a:ext uri="{C183D7F6-B498-43B3-948B-1728B52AA6E4}">
+                <adec:decorative xmlns:adec="http://schemas.microsoft.com/office/drawing/2017/decorative" val="1"/>
+              </a:ext>
+            </a:extLst>
+          </p:cNvPr>
+          <p:cNvCxnSpPr>
+            <a:cxnSpLocks noGrp="1" noRot="1" noChangeAspect="1" noMove="1" noResize="1" noEditPoints="1" noAdjustHandles="1" noChangeArrowheads="1" noChangeShapeType="1"/>
+          </p:cNvCxnSpPr>
+          <p:nvPr>
+            <p:extLst>
+              <p:ext uri="{386F3935-93C4-4BCD-93E2-E3B085C9AB24}">
+                <p16:designElem xmlns:p16="http://schemas.microsoft.com/office/powerpoint/2015/main" val="1"/>
+              </p:ext>
+            </p:extLst>
+          </p:nvPr>
+        </p:nvCxnSpPr>
+        <p:spPr>
+          <a:xfrm flipH="1">
+            <a:off x="843888" y="1976039"/>
+            <a:ext cx="10515600" cy="0"/>
+          </a:xfrm>
+          <a:prstGeom prst="line">
+            <a:avLst/>
+          </a:prstGeom>
+          <a:ln w="19050">
+            <a:solidFill>
+              <a:schemeClr val="tx1">
+                <a:lumMod val="85000"/>
+                <a:lumOff val="15000"/>
+              </a:schemeClr>
+            </a:solidFill>
+          </a:ln>
+        </p:spPr>
+        <p:style>
+          <a:lnRef idx="1">
+            <a:schemeClr val="accent1"/>
+          </a:lnRef>
+          <a:fillRef idx="0">
+            <a:schemeClr val="accent1"/>
+          </a:fillRef>
+          <a:effectRef idx="0">
+            <a:schemeClr val="accent1"/>
+          </a:effectRef>
+          <a:fontRef idx="minor">
+            <a:schemeClr val="tx1"/>
+          </a:fontRef>
+        </p:style>
+      </p:cxnSp>
+      <p:pic>
+        <p:nvPicPr>
+          <p:cNvPr id="9220" name="Picture 4">
+            <a:extLst>
+              <a:ext uri="{FF2B5EF4-FFF2-40B4-BE49-F238E27FC236}">
+                <a16:creationId xmlns:a16="http://schemas.microsoft.com/office/drawing/2014/main" id="{77836945-B7F8-C05A-3DEB-E4F106795C52}"/>
+              </a:ext>
+            </a:extLst>
+          </p:cNvPr>
+          <p:cNvPicPr>
+            <a:picLocks noChangeAspect="1" noChangeArrowheads="1"/>
+          </p:cNvPicPr>
+          <p:nvPr/>
+        </p:nvPicPr>
+        <p:blipFill>
+          <a:blip r:embed="rId2">
+            <a:extLst>
+              <a:ext uri="{28A0092B-C50C-407E-A947-70E740481C1C}">
+                <a14:useLocalDpi xmlns:a14="http://schemas.microsoft.com/office/drawing/2010/main" val="0"/>
+              </a:ext>
+            </a:extLst>
+          </a:blip>
+          <a:stretch>
+            <a:fillRect/>
+          </a:stretch>
+        </p:blipFill>
+        <p:spPr bwMode="auto">
+          <a:xfrm>
+            <a:off x="244602" y="2395410"/>
+            <a:ext cx="3218345" cy="3352442"/>
+          </a:xfrm>
+          <a:prstGeom prst="rect">
+            <a:avLst/>
+          </a:prstGeom>
+          <a:noFill/>
+          <a:extLst>
+            <a:ext uri="{909E8E84-426E-40DD-AFC4-6F175D3DCCD1}">
+              <a14:hiddenFill xmlns:a14="http://schemas.microsoft.com/office/drawing/2010/main">
+                <a:solidFill>
+                  <a:srgbClr val="FFFFFF"/>
+                </a:solidFill>
+              </a14:hiddenFill>
+            </a:ext>
+          </a:extLst>
+        </p:spPr>
+      </p:pic>
+      <p:pic>
+        <p:nvPicPr>
+          <p:cNvPr id="9218" name="Picture 2">
+            <a:extLst>
+              <a:ext uri="{FF2B5EF4-FFF2-40B4-BE49-F238E27FC236}">
+                <a16:creationId xmlns:a16="http://schemas.microsoft.com/office/drawing/2014/main" id="{9370E47A-FBA3-ACE0-A433-DE2E4EB15ED4}"/>
+              </a:ext>
+            </a:extLst>
+          </p:cNvPr>
+          <p:cNvPicPr>
+            <a:picLocks noChangeAspect="1" noChangeArrowheads="1"/>
+          </p:cNvPicPr>
+          <p:nvPr/>
+        </p:nvPicPr>
+        <p:blipFill>
+          <a:blip r:embed="rId3">
+            <a:extLst>
+              <a:ext uri="{28A0092B-C50C-407E-A947-70E740481C1C}">
+                <a14:useLocalDpi xmlns:a14="http://schemas.microsoft.com/office/drawing/2010/main" val="0"/>
+              </a:ext>
+            </a:extLst>
+          </a:blip>
+          <a:stretch>
+            <a:fillRect/>
+          </a:stretch>
+        </p:blipFill>
+        <p:spPr bwMode="auto">
+          <a:xfrm>
+            <a:off x="3707549" y="2395410"/>
+            <a:ext cx="3218345" cy="3352442"/>
+          </a:xfrm>
+          <a:prstGeom prst="rect">
+            <a:avLst/>
+          </a:prstGeom>
+          <a:noFill/>
+          <a:extLst>
+            <a:ext uri="{909E8E84-426E-40DD-AFC4-6F175D3DCCD1}">
+              <a14:hiddenFill xmlns:a14="http://schemas.microsoft.com/office/drawing/2010/main">
+                <a:solidFill>
+                  <a:srgbClr val="FFFFFF"/>
+                </a:solidFill>
+              </a14:hiddenFill>
+            </a:ext>
+          </a:extLst>
+        </p:spPr>
+      </p:pic>
+      <p:sp>
+        <p:nvSpPr>
+          <p:cNvPr id="9224" name="Content Placeholder 9223">
+            <a:extLst>
+              <a:ext uri="{FF2B5EF4-FFF2-40B4-BE49-F238E27FC236}">
+                <a16:creationId xmlns:a16="http://schemas.microsoft.com/office/drawing/2014/main" id="{E657308B-59C7-0988-2D00-2BF09C9874AD}"/>
               </a:ext>
             </a:extLst>
           </p:cNvPr>
@@ -6254,9 +6770,278 @@
             <p:ph idx="1"/>
           </p:nvPr>
         </p:nvSpPr>
-        <p:spPr/>
+        <p:spPr>
+          <a:xfrm>
+            <a:off x="7007109" y="2164428"/>
+            <a:ext cx="4776901" cy="4434641"/>
+          </a:xfrm>
+        </p:spPr>
         <p:txBody>
-          <a:bodyPr/>
+          <a:bodyPr>
+            <a:normAutofit/>
+          </a:bodyPr>
+          <a:lstStyle/>
+          <a:p>
+            <a:pPr marL="0" indent="0">
+              <a:buNone/>
+            </a:pPr>
+            <a:r>
+              <a:rPr lang="en-US" sz="1800" i="1" spc="100" dirty="0">
+                <a:latin typeface="+mj-lt"/>
+                <a:ea typeface="+mj-ea"/>
+                <a:cs typeface="+mj-cs"/>
+              </a:rPr>
+              <a:t>Two scatter plots are created to compare the correlation and causation between two variables:</a:t>
+            </a:r>
+          </a:p>
+          <a:p>
+            <a:pPr marL="342900" indent="-342900">
+              <a:buFont typeface="+mj-lt"/>
+              <a:buAutoNum type="arabicPeriod"/>
+            </a:pPr>
+            <a:r>
+              <a:rPr lang="en-US" sz="1800" i="1" spc="100" dirty="0">
+                <a:latin typeface="+mj-lt"/>
+                <a:ea typeface="+mj-ea"/>
+                <a:cs typeface="+mj-cs"/>
+              </a:rPr>
+              <a:t>Price vs distance from the city center: A negative correlation between the 2 variables can be seen and this can be because as we step away from the center of the city, there is less demand for temporary stay for tourists.</a:t>
+            </a:r>
+          </a:p>
+          <a:p>
+            <a:pPr marL="342900" indent="-342900">
+              <a:buFont typeface="+mj-lt"/>
+              <a:buAutoNum type="arabicPeriod"/>
+            </a:pPr>
+            <a:r>
+              <a:rPr lang="en-US" sz="1800" i="1" spc="100" dirty="0">
+                <a:latin typeface="+mj-lt"/>
+                <a:ea typeface="+mj-ea"/>
+                <a:cs typeface="+mj-cs"/>
+              </a:rPr>
+              <a:t>Price vs attractions rating: A positive correlation between the two can be seen as the attractions near the listings are rated higher, the demand for stay can be higher.</a:t>
+            </a:r>
+          </a:p>
+        </p:txBody>
+      </p:sp>
+      <p:sp>
+        <p:nvSpPr>
+          <p:cNvPr id="9242" name="Freeform 6">
+            <a:extLst>
+              <a:ext uri="{FF2B5EF4-FFF2-40B4-BE49-F238E27FC236}">
+                <a16:creationId xmlns:a16="http://schemas.microsoft.com/office/drawing/2014/main" id="{A101E513-AF74-4E9D-A31F-99664250722D}"/>
+              </a:ext>
+              <a:ext uri="{C183D7F6-B498-43B3-948B-1728B52AA6E4}">
+                <adec:decorative xmlns:adec="http://schemas.microsoft.com/office/drawing/2017/decorative" val="1"/>
+              </a:ext>
+            </a:extLst>
+          </p:cNvPr>
+          <p:cNvSpPr>
+            <a:spLocks noGrp="1" noRot="1" noChangeAspect="1" noMove="1" noResize="1" noEditPoints="1" noAdjustHandles="1" noChangeArrowheads="1" noChangeShapeType="1" noTextEdit="1"/>
+          </p:cNvSpPr>
+          <p:nvPr>
+            <p:extLst>
+              <p:ext uri="{386F3935-93C4-4BCD-93E2-E3B085C9AB24}">
+                <p16:designElem xmlns:p16="http://schemas.microsoft.com/office/powerpoint/2015/main" val="1"/>
+              </p:ext>
+            </p:extLst>
+          </p:nvPr>
+        </p:nvSpPr>
+        <p:spPr bwMode="auto">
+          <a:xfrm>
+            <a:off x="11784011" y="5783564"/>
+            <a:ext cx="407988" cy="819150"/>
+          </a:xfrm>
+          <a:custGeom>
+            <a:avLst/>
+            <a:gdLst/>
+            <a:ahLst/>
+            <a:cxnLst/>
+            <a:rect l="0" t="0" r="r" b="b"/>
+            <a:pathLst>
+              <a:path w="1799" h="3612">
+                <a:moveTo>
+                  <a:pt x="1799" y="0"/>
+                </a:moveTo>
+                <a:lnTo>
+                  <a:pt x="1799" y="3612"/>
+                </a:lnTo>
+                <a:lnTo>
+                  <a:pt x="1686" y="3609"/>
+                </a:lnTo>
+                <a:lnTo>
+                  <a:pt x="1574" y="3598"/>
+                </a:lnTo>
+                <a:lnTo>
+                  <a:pt x="1464" y="3581"/>
+                </a:lnTo>
+                <a:lnTo>
+                  <a:pt x="1357" y="3557"/>
+                </a:lnTo>
+                <a:lnTo>
+                  <a:pt x="1251" y="3527"/>
+                </a:lnTo>
+                <a:lnTo>
+                  <a:pt x="1150" y="3490"/>
+                </a:lnTo>
+                <a:lnTo>
+                  <a:pt x="1050" y="3448"/>
+                </a:lnTo>
+                <a:lnTo>
+                  <a:pt x="953" y="3401"/>
+                </a:lnTo>
+                <a:lnTo>
+                  <a:pt x="860" y="3347"/>
+                </a:lnTo>
+                <a:lnTo>
+                  <a:pt x="771" y="3289"/>
+                </a:lnTo>
+                <a:lnTo>
+                  <a:pt x="686" y="3224"/>
+                </a:lnTo>
+                <a:lnTo>
+                  <a:pt x="604" y="3156"/>
+                </a:lnTo>
+                <a:lnTo>
+                  <a:pt x="527" y="3083"/>
+                </a:lnTo>
+                <a:lnTo>
+                  <a:pt x="454" y="3005"/>
+                </a:lnTo>
+                <a:lnTo>
+                  <a:pt x="386" y="2923"/>
+                </a:lnTo>
+                <a:lnTo>
+                  <a:pt x="323" y="2838"/>
+                </a:lnTo>
+                <a:lnTo>
+                  <a:pt x="265" y="2748"/>
+                </a:lnTo>
+                <a:lnTo>
+                  <a:pt x="211" y="2655"/>
+                </a:lnTo>
+                <a:lnTo>
+                  <a:pt x="163" y="2559"/>
+                </a:lnTo>
+                <a:lnTo>
+                  <a:pt x="121" y="2459"/>
+                </a:lnTo>
+                <a:lnTo>
+                  <a:pt x="85" y="2356"/>
+                </a:lnTo>
+                <a:lnTo>
+                  <a:pt x="55" y="2251"/>
+                </a:lnTo>
+                <a:lnTo>
+                  <a:pt x="32" y="2143"/>
+                </a:lnTo>
+                <a:lnTo>
+                  <a:pt x="14" y="2033"/>
+                </a:lnTo>
+                <a:lnTo>
+                  <a:pt x="4" y="1920"/>
+                </a:lnTo>
+                <a:lnTo>
+                  <a:pt x="0" y="1806"/>
+                </a:lnTo>
+                <a:lnTo>
+                  <a:pt x="4" y="1692"/>
+                </a:lnTo>
+                <a:lnTo>
+                  <a:pt x="14" y="1580"/>
+                </a:lnTo>
+                <a:lnTo>
+                  <a:pt x="32" y="1469"/>
+                </a:lnTo>
+                <a:lnTo>
+                  <a:pt x="55" y="1362"/>
+                </a:lnTo>
+                <a:lnTo>
+                  <a:pt x="85" y="1256"/>
+                </a:lnTo>
+                <a:lnTo>
+                  <a:pt x="121" y="1154"/>
+                </a:lnTo>
+                <a:lnTo>
+                  <a:pt x="163" y="1054"/>
+                </a:lnTo>
+                <a:lnTo>
+                  <a:pt x="211" y="958"/>
+                </a:lnTo>
+                <a:lnTo>
+                  <a:pt x="265" y="864"/>
+                </a:lnTo>
+                <a:lnTo>
+                  <a:pt x="323" y="774"/>
+                </a:lnTo>
+                <a:lnTo>
+                  <a:pt x="386" y="689"/>
+                </a:lnTo>
+                <a:lnTo>
+                  <a:pt x="454" y="607"/>
+                </a:lnTo>
+                <a:lnTo>
+                  <a:pt x="527" y="529"/>
+                </a:lnTo>
+                <a:lnTo>
+                  <a:pt x="604" y="456"/>
+                </a:lnTo>
+                <a:lnTo>
+                  <a:pt x="686" y="388"/>
+                </a:lnTo>
+                <a:lnTo>
+                  <a:pt x="771" y="325"/>
+                </a:lnTo>
+                <a:lnTo>
+                  <a:pt x="860" y="266"/>
+                </a:lnTo>
+                <a:lnTo>
+                  <a:pt x="953" y="212"/>
+                </a:lnTo>
+                <a:lnTo>
+                  <a:pt x="1050" y="164"/>
+                </a:lnTo>
+                <a:lnTo>
+                  <a:pt x="1150" y="122"/>
+                </a:lnTo>
+                <a:lnTo>
+                  <a:pt x="1251" y="85"/>
+                </a:lnTo>
+                <a:lnTo>
+                  <a:pt x="1357" y="55"/>
+                </a:lnTo>
+                <a:lnTo>
+                  <a:pt x="1464" y="32"/>
+                </a:lnTo>
+                <a:lnTo>
+                  <a:pt x="1574" y="14"/>
+                </a:lnTo>
+                <a:lnTo>
+                  <a:pt x="1686" y="5"/>
+                </a:lnTo>
+                <a:lnTo>
+                  <a:pt x="1799" y="0"/>
+                </a:lnTo>
+                <a:close/>
+              </a:path>
+            </a:pathLst>
+          </a:custGeom>
+          <a:solidFill>
+            <a:schemeClr val="tx1">
+              <a:lumMod val="85000"/>
+              <a:lumOff val="15000"/>
+            </a:schemeClr>
+          </a:solidFill>
+          <a:ln w="0">
+            <a:noFill/>
+            <a:prstDash val="solid"/>
+            <a:round/>
+            <a:headEnd/>
+            <a:tailEnd/>
+          </a:ln>
+        </p:spPr>
+        <p:txBody>
+          <a:bodyPr anchor="ctr"/>
           <a:lstStyle/>
           <a:p>
             <a:endParaRPr lang="en-US"/>
@@ -6276,9 +7061,17 @@
 </p:sld>
 </file>
 
-<file path=ppt/slides/slide15.xml><?xml version="1.0" encoding="utf-8"?>
+<file path=ppt/slides/slide16.xml><?xml version="1.0" encoding="utf-8"?>
 <p:sld xmlns:a="http://schemas.openxmlformats.org/drawingml/2006/main" xmlns:r="http://schemas.openxmlformats.org/officeDocument/2006/relationships" xmlns:p="http://schemas.openxmlformats.org/presentationml/2006/main">
   <p:cSld>
+    <p:bg>
+      <p:bgPr>
+        <a:solidFill>
+          <a:schemeClr val="bg2"/>
+        </a:solidFill>
+        <a:effectLst/>
+      </p:bgPr>
+    </p:bg>
     <p:spTree>
       <p:nvGrpSpPr>
         <p:cNvPr id="1" name=""/>
@@ -6295,6 +7088,481 @@
       </p:grpSpPr>
       <p:sp>
         <p:nvSpPr>
+          <p:cNvPr id="9" name="Freeform 6">
+            <a:extLst>
+              <a:ext uri="{FF2B5EF4-FFF2-40B4-BE49-F238E27FC236}">
+                <a16:creationId xmlns:a16="http://schemas.microsoft.com/office/drawing/2014/main" id="{DD4C4B28-6B4B-4445-8535-F516D74E4AA9}"/>
+              </a:ext>
+              <a:ext uri="{C183D7F6-B498-43B3-948B-1728B52AA6E4}">
+                <adec:decorative xmlns:adec="http://schemas.microsoft.com/office/drawing/2017/decorative" val="1"/>
+              </a:ext>
+            </a:extLst>
+          </p:cNvPr>
+          <p:cNvSpPr>
+            <a:spLocks noGrp="1" noRot="1" noChangeAspect="1" noMove="1" noResize="1" noEditPoints="1" noAdjustHandles="1" noChangeArrowheads="1" noChangeShapeType="1" noTextEdit="1"/>
+          </p:cNvSpPr>
+          <p:nvPr>
+            <p:extLst>
+              <p:ext uri="{386F3935-93C4-4BCD-93E2-E3B085C9AB24}">
+                <p16:designElem xmlns:p16="http://schemas.microsoft.com/office/powerpoint/2015/main" val="1"/>
+              </p:ext>
+            </p:extLst>
+          </p:nvPr>
+        </p:nvSpPr>
+        <p:spPr bwMode="auto">
+          <a:xfrm>
+            <a:off x="11784011" y="5783564"/>
+            <a:ext cx="407988" cy="819150"/>
+          </a:xfrm>
+          <a:custGeom>
+            <a:avLst/>
+            <a:gdLst/>
+            <a:ahLst/>
+            <a:cxnLst/>
+            <a:rect l="0" t="0" r="r" b="b"/>
+            <a:pathLst>
+              <a:path w="1799" h="3612">
+                <a:moveTo>
+                  <a:pt x="1799" y="0"/>
+                </a:moveTo>
+                <a:lnTo>
+                  <a:pt x="1799" y="3612"/>
+                </a:lnTo>
+                <a:lnTo>
+                  <a:pt x="1686" y="3609"/>
+                </a:lnTo>
+                <a:lnTo>
+                  <a:pt x="1574" y="3598"/>
+                </a:lnTo>
+                <a:lnTo>
+                  <a:pt x="1464" y="3581"/>
+                </a:lnTo>
+                <a:lnTo>
+                  <a:pt x="1357" y="3557"/>
+                </a:lnTo>
+                <a:lnTo>
+                  <a:pt x="1251" y="3527"/>
+                </a:lnTo>
+                <a:lnTo>
+                  <a:pt x="1150" y="3490"/>
+                </a:lnTo>
+                <a:lnTo>
+                  <a:pt x="1050" y="3448"/>
+                </a:lnTo>
+                <a:lnTo>
+                  <a:pt x="953" y="3401"/>
+                </a:lnTo>
+                <a:lnTo>
+                  <a:pt x="860" y="3347"/>
+                </a:lnTo>
+                <a:lnTo>
+                  <a:pt x="771" y="3289"/>
+                </a:lnTo>
+                <a:lnTo>
+                  <a:pt x="686" y="3224"/>
+                </a:lnTo>
+                <a:lnTo>
+                  <a:pt x="604" y="3156"/>
+                </a:lnTo>
+                <a:lnTo>
+                  <a:pt x="527" y="3083"/>
+                </a:lnTo>
+                <a:lnTo>
+                  <a:pt x="454" y="3005"/>
+                </a:lnTo>
+                <a:lnTo>
+                  <a:pt x="386" y="2923"/>
+                </a:lnTo>
+                <a:lnTo>
+                  <a:pt x="323" y="2838"/>
+                </a:lnTo>
+                <a:lnTo>
+                  <a:pt x="265" y="2748"/>
+                </a:lnTo>
+                <a:lnTo>
+                  <a:pt x="211" y="2655"/>
+                </a:lnTo>
+                <a:lnTo>
+                  <a:pt x="163" y="2559"/>
+                </a:lnTo>
+                <a:lnTo>
+                  <a:pt x="121" y="2459"/>
+                </a:lnTo>
+                <a:lnTo>
+                  <a:pt x="85" y="2356"/>
+                </a:lnTo>
+                <a:lnTo>
+                  <a:pt x="55" y="2251"/>
+                </a:lnTo>
+                <a:lnTo>
+                  <a:pt x="32" y="2143"/>
+                </a:lnTo>
+                <a:lnTo>
+                  <a:pt x="14" y="2033"/>
+                </a:lnTo>
+                <a:lnTo>
+                  <a:pt x="4" y="1920"/>
+                </a:lnTo>
+                <a:lnTo>
+                  <a:pt x="0" y="1806"/>
+                </a:lnTo>
+                <a:lnTo>
+                  <a:pt x="4" y="1692"/>
+                </a:lnTo>
+                <a:lnTo>
+                  <a:pt x="14" y="1580"/>
+                </a:lnTo>
+                <a:lnTo>
+                  <a:pt x="32" y="1469"/>
+                </a:lnTo>
+                <a:lnTo>
+                  <a:pt x="55" y="1362"/>
+                </a:lnTo>
+                <a:lnTo>
+                  <a:pt x="85" y="1256"/>
+                </a:lnTo>
+                <a:lnTo>
+                  <a:pt x="121" y="1154"/>
+                </a:lnTo>
+                <a:lnTo>
+                  <a:pt x="163" y="1054"/>
+                </a:lnTo>
+                <a:lnTo>
+                  <a:pt x="211" y="958"/>
+                </a:lnTo>
+                <a:lnTo>
+                  <a:pt x="265" y="864"/>
+                </a:lnTo>
+                <a:lnTo>
+                  <a:pt x="323" y="774"/>
+                </a:lnTo>
+                <a:lnTo>
+                  <a:pt x="386" y="689"/>
+                </a:lnTo>
+                <a:lnTo>
+                  <a:pt x="454" y="607"/>
+                </a:lnTo>
+                <a:lnTo>
+                  <a:pt x="527" y="529"/>
+                </a:lnTo>
+                <a:lnTo>
+                  <a:pt x="604" y="456"/>
+                </a:lnTo>
+                <a:lnTo>
+                  <a:pt x="686" y="388"/>
+                </a:lnTo>
+                <a:lnTo>
+                  <a:pt x="771" y="325"/>
+                </a:lnTo>
+                <a:lnTo>
+                  <a:pt x="860" y="266"/>
+                </a:lnTo>
+                <a:lnTo>
+                  <a:pt x="953" y="212"/>
+                </a:lnTo>
+                <a:lnTo>
+                  <a:pt x="1050" y="164"/>
+                </a:lnTo>
+                <a:lnTo>
+                  <a:pt x="1150" y="122"/>
+                </a:lnTo>
+                <a:lnTo>
+                  <a:pt x="1251" y="85"/>
+                </a:lnTo>
+                <a:lnTo>
+                  <a:pt x="1357" y="55"/>
+                </a:lnTo>
+                <a:lnTo>
+                  <a:pt x="1464" y="32"/>
+                </a:lnTo>
+                <a:lnTo>
+                  <a:pt x="1574" y="14"/>
+                </a:lnTo>
+                <a:lnTo>
+                  <a:pt x="1686" y="5"/>
+                </a:lnTo>
+                <a:lnTo>
+                  <a:pt x="1799" y="0"/>
+                </a:lnTo>
+                <a:close/>
+              </a:path>
+            </a:pathLst>
+          </a:custGeom>
+          <a:solidFill>
+            <a:schemeClr val="tx1">
+              <a:lumMod val="85000"/>
+              <a:lumOff val="15000"/>
+            </a:schemeClr>
+          </a:solidFill>
+          <a:ln w="0">
+            <a:noFill/>
+            <a:prstDash val="solid"/>
+            <a:round/>
+            <a:headEnd/>
+            <a:tailEnd/>
+          </a:ln>
+        </p:spPr>
+        <p:txBody>
+          <a:bodyPr anchor="ctr"/>
+          <a:lstStyle/>
+          <a:p>
+            <a:endParaRPr lang="en-US"/>
+          </a:p>
+        </p:txBody>
+      </p:sp>
+      <p:cxnSp>
+        <p:nvCxnSpPr>
+          <p:cNvPr id="11" name="Straight Connector 10">
+            <a:extLst>
+              <a:ext uri="{FF2B5EF4-FFF2-40B4-BE49-F238E27FC236}">
+                <a16:creationId xmlns:a16="http://schemas.microsoft.com/office/drawing/2014/main" id="{0CB1C732-7193-4253-8746-850D090A6B4E}"/>
+              </a:ext>
+              <a:ext uri="{C183D7F6-B498-43B3-948B-1728B52AA6E4}">
+                <adec:decorative xmlns:adec="http://schemas.microsoft.com/office/drawing/2017/decorative" val="1"/>
+              </a:ext>
+            </a:extLst>
+          </p:cNvPr>
+          <p:cNvCxnSpPr>
+            <a:cxnSpLocks noGrp="1" noRot="1" noChangeAspect="1" noMove="1" noResize="1" noEditPoints="1" noAdjustHandles="1" noChangeArrowheads="1" noChangeShapeType="1"/>
+          </p:cNvCxnSpPr>
+          <p:nvPr>
+            <p:extLst>
+              <p:ext uri="{386F3935-93C4-4BCD-93E2-E3B085C9AB24}">
+                <p16:designElem xmlns:p16="http://schemas.microsoft.com/office/powerpoint/2015/main" val="1"/>
+              </p:ext>
+            </p:extLst>
+          </p:nvPr>
+        </p:nvCxnSpPr>
+        <p:spPr>
+          <a:xfrm>
+            <a:off x="758952" y="1280160"/>
+            <a:ext cx="0" cy="5577840"/>
+          </a:xfrm>
+          <a:prstGeom prst="line">
+            <a:avLst/>
+          </a:prstGeom>
+          <a:ln w="19050">
+            <a:solidFill>
+              <a:schemeClr val="tx2"/>
+            </a:solidFill>
+          </a:ln>
+        </p:spPr>
+        <p:style>
+          <a:lnRef idx="1">
+            <a:schemeClr val="accent1"/>
+          </a:lnRef>
+          <a:fillRef idx="0">
+            <a:schemeClr val="accent1"/>
+          </a:fillRef>
+          <a:effectRef idx="0">
+            <a:schemeClr val="accent1"/>
+          </a:effectRef>
+          <a:fontRef idx="minor">
+            <a:schemeClr val="tx1"/>
+          </a:fontRef>
+        </p:style>
+      </p:cxnSp>
+      <p:sp useBgFill="1">
+        <p:nvSpPr>
+          <p:cNvPr id="13" name="Rectangle 12">
+            <a:extLst>
+              <a:ext uri="{FF2B5EF4-FFF2-40B4-BE49-F238E27FC236}">
+                <a16:creationId xmlns:a16="http://schemas.microsoft.com/office/drawing/2014/main" id="{55B419A7-F817-4767-8CCB-FB0E189C4ACD}"/>
+              </a:ext>
+              <a:ext uri="{C183D7F6-B498-43B3-948B-1728B52AA6E4}">
+                <adec:decorative xmlns:adec="http://schemas.microsoft.com/office/drawing/2017/decorative" val="1"/>
+              </a:ext>
+            </a:extLst>
+          </p:cNvPr>
+          <p:cNvSpPr>
+            <a:spLocks noGrp="1" noRot="1" noChangeAspect="1" noMove="1" noResize="1" noEditPoints="1" noAdjustHandles="1" noChangeArrowheads="1" noChangeShapeType="1" noTextEdit="1"/>
+          </p:cNvSpPr>
+          <p:nvPr>
+            <p:extLst>
+              <p:ext uri="{386F3935-93C4-4BCD-93E2-E3B085C9AB24}">
+                <p16:designElem xmlns:p16="http://schemas.microsoft.com/office/powerpoint/2015/main" val="1"/>
+              </p:ext>
+            </p:extLst>
+          </p:nvPr>
+        </p:nvSpPr>
+        <p:spPr>
+          <a:xfrm>
+            <a:off x="0" y="0"/>
+            <a:ext cx="12192000" cy="6858000"/>
+          </a:xfrm>
+          <a:prstGeom prst="rect">
+            <a:avLst/>
+          </a:prstGeom>
+          <a:ln>
+            <a:noFill/>
+          </a:ln>
+        </p:spPr>
+        <p:style>
+          <a:lnRef idx="2">
+            <a:schemeClr val="accent1">
+              <a:shade val="50000"/>
+            </a:schemeClr>
+          </a:lnRef>
+          <a:fillRef idx="1">
+            <a:schemeClr val="accent1"/>
+          </a:fillRef>
+          <a:effectRef idx="0">
+            <a:schemeClr val="accent1"/>
+          </a:effectRef>
+          <a:fontRef idx="minor">
+            <a:schemeClr val="lt1"/>
+          </a:fontRef>
+        </p:style>
+        <p:txBody>
+          <a:bodyPr rtlCol="0" anchor="ctr"/>
+          <a:lstStyle/>
+          <a:p>
+            <a:pPr algn="ctr"/>
+            <a:endParaRPr lang="en-US"/>
+          </a:p>
+        </p:txBody>
+      </p:sp>
+      <p:sp>
+        <p:nvSpPr>
+          <p:cNvPr id="15" name="Freeform: Shape 14">
+            <a:extLst>
+              <a:ext uri="{FF2B5EF4-FFF2-40B4-BE49-F238E27FC236}">
+                <a16:creationId xmlns:a16="http://schemas.microsoft.com/office/drawing/2014/main" id="{7AF9319C-2D9B-4868-AEAE-37298EA0F4B9}"/>
+              </a:ext>
+              <a:ext uri="{C183D7F6-B498-43B3-948B-1728B52AA6E4}">
+                <adec:decorative xmlns:adec="http://schemas.microsoft.com/office/drawing/2017/decorative" val="1"/>
+              </a:ext>
+            </a:extLst>
+          </p:cNvPr>
+          <p:cNvSpPr>
+            <a:spLocks noGrp="1" noRot="1" noChangeAspect="1" noMove="1" noResize="1" noEditPoints="1" noAdjustHandles="1" noChangeArrowheads="1" noChangeShapeType="1" noTextEdit="1"/>
+          </p:cNvSpPr>
+          <p:nvPr>
+            <p:extLst>
+              <p:ext uri="{386F3935-93C4-4BCD-93E2-E3B085C9AB24}">
+                <p16:designElem xmlns:p16="http://schemas.microsoft.com/office/powerpoint/2015/main" val="1"/>
+              </p:ext>
+            </p:extLst>
+          </p:nvPr>
+        </p:nvSpPr>
+        <p:spPr>
+          <a:xfrm>
+            <a:off x="0" y="0"/>
+            <a:ext cx="5215066" cy="6858000"/>
+          </a:xfrm>
+          <a:custGeom>
+            <a:avLst/>
+            <a:gdLst>
+              <a:gd name="connsiteX0" fmla="*/ 0 w 5215066"/>
+              <a:gd name="connsiteY0" fmla="*/ 0 h 6858000"/>
+              <a:gd name="connsiteX1" fmla="*/ 3197713 w 5215066"/>
+              <a:gd name="connsiteY1" fmla="*/ 0 h 6858000"/>
+              <a:gd name="connsiteX2" fmla="*/ 3259787 w 5215066"/>
+              <a:gd name="connsiteY2" fmla="*/ 39865 h 6858000"/>
+              <a:gd name="connsiteX3" fmla="*/ 5215066 w 5215066"/>
+              <a:gd name="connsiteY3" fmla="*/ 3723759 h 6858000"/>
+              <a:gd name="connsiteX4" fmla="*/ 4202364 w 5215066"/>
+              <a:gd name="connsiteY4" fmla="*/ 6549681 h 6858000"/>
+              <a:gd name="connsiteX5" fmla="*/ 3922635 w 5215066"/>
+              <a:gd name="connsiteY5" fmla="*/ 6858000 h 6858000"/>
+              <a:gd name="connsiteX6" fmla="*/ 0 w 5215066"/>
+              <a:gd name="connsiteY6" fmla="*/ 6858000 h 6858000"/>
+            </a:gdLst>
+            <a:ahLst/>
+            <a:cxnLst>
+              <a:cxn ang="0">
+                <a:pos x="connsiteX0" y="connsiteY0"/>
+              </a:cxn>
+              <a:cxn ang="0">
+                <a:pos x="connsiteX1" y="connsiteY1"/>
+              </a:cxn>
+              <a:cxn ang="0">
+                <a:pos x="connsiteX2" y="connsiteY2"/>
+              </a:cxn>
+              <a:cxn ang="0">
+                <a:pos x="connsiteX3" y="connsiteY3"/>
+              </a:cxn>
+              <a:cxn ang="0">
+                <a:pos x="connsiteX4" y="connsiteY4"/>
+              </a:cxn>
+              <a:cxn ang="0">
+                <a:pos x="connsiteX5" y="connsiteY5"/>
+              </a:cxn>
+              <a:cxn ang="0">
+                <a:pos x="connsiteX6" y="connsiteY6"/>
+              </a:cxn>
+            </a:cxnLst>
+            <a:rect l="l" t="t" r="r" b="b"/>
+            <a:pathLst>
+              <a:path w="5215066" h="6858000">
+                <a:moveTo>
+                  <a:pt x="0" y="0"/>
+                </a:moveTo>
+                <a:lnTo>
+                  <a:pt x="3197713" y="0"/>
+                </a:lnTo>
+                <a:lnTo>
+                  <a:pt x="3259787" y="39865"/>
+                </a:lnTo>
+                <a:cubicBezTo>
+                  <a:pt x="4439462" y="838237"/>
+                  <a:pt x="5215066" y="2190263"/>
+                  <a:pt x="5215066" y="3723759"/>
+                </a:cubicBezTo>
+                <a:cubicBezTo>
+                  <a:pt x="5215066" y="4797206"/>
+                  <a:pt x="4835020" y="5781733"/>
+                  <a:pt x="4202364" y="6549681"/>
+                </a:cubicBezTo>
+                <a:lnTo>
+                  <a:pt x="3922635" y="6858000"/>
+                </a:lnTo>
+                <a:lnTo>
+                  <a:pt x="0" y="6858000"/>
+                </a:lnTo>
+                <a:close/>
+              </a:path>
+            </a:pathLst>
+          </a:custGeom>
+          <a:solidFill>
+            <a:schemeClr val="tx1">
+              <a:lumMod val="85000"/>
+              <a:lumOff val="15000"/>
+            </a:schemeClr>
+          </a:solidFill>
+          <a:ln>
+            <a:noFill/>
+          </a:ln>
+        </p:spPr>
+        <p:style>
+          <a:lnRef idx="2">
+            <a:schemeClr val="accent1">
+              <a:shade val="50000"/>
+            </a:schemeClr>
+          </a:lnRef>
+          <a:fillRef idx="1">
+            <a:schemeClr val="accent1"/>
+          </a:fillRef>
+          <a:effectRef idx="0">
+            <a:schemeClr val="accent1"/>
+          </a:effectRef>
+          <a:fontRef idx="minor">
+            <a:schemeClr val="lt1"/>
+          </a:fontRef>
+        </p:style>
+        <p:txBody>
+          <a:bodyPr wrap="square" rtlCol="0" anchor="ctr">
+            <a:noAutofit/>
+          </a:bodyPr>
+          <a:lstStyle/>
+          <a:p>
+            <a:pPr algn="ctr"/>
+            <a:endParaRPr lang="en-US"/>
+          </a:p>
+        </p:txBody>
+      </p:sp>
+      <p:sp>
+        <p:nvSpPr>
           <p:cNvPr id="2" name="Title 1">
             <a:extLst>
               <a:ext uri="{FF2B5EF4-FFF2-40B4-BE49-F238E27FC236}">
@@ -6309,9 +7577,501 @@
             <p:ph type="title"/>
           </p:nvPr>
         </p:nvSpPr>
-        <p:spPr/>
+        <p:spPr>
+          <a:xfrm>
+            <a:off x="142289" y="517209"/>
+            <a:ext cx="4757738" cy="5577840"/>
+          </a:xfrm>
+        </p:spPr>
         <p:txBody>
-          <a:bodyPr/>
+          <a:bodyPr vert="horz" lIns="91440" tIns="45720" rIns="91440" bIns="45720" rtlCol="0" anchor="ctr" anchorCtr="0">
+            <a:normAutofit/>
+          </a:bodyPr>
+          <a:lstStyle/>
+          <a:p>
+            <a:pPr marL="0" marR="0">
+              <a:spcAft>
+                <a:spcPts val="0"/>
+              </a:spcAft>
+            </a:pPr>
+            <a:r>
+              <a:rPr lang="en-US" sz="2800" b="1" i="1" kern="1200" spc="100" baseline="0" dirty="0">
+                <a:solidFill>
+                  <a:schemeClr val="bg1"/>
+                </a:solidFill>
+                <a:effectLst/>
+                <a:latin typeface="+mj-lt"/>
+                <a:ea typeface="+mj-ea"/>
+                <a:cs typeface="+mj-cs"/>
+              </a:rPr>
+              <a:t>Regression Analysis:</a:t>
+            </a:r>
+            <a:br>
+              <a:rPr lang="en-US" sz="1800" i="1" kern="1200" spc="100" baseline="0" dirty="0">
+                <a:solidFill>
+                  <a:schemeClr val="bg1"/>
+                </a:solidFill>
+                <a:effectLst/>
+                <a:latin typeface="+mj-lt"/>
+                <a:ea typeface="+mj-ea"/>
+                <a:cs typeface="+mj-cs"/>
+              </a:rPr>
+            </a:br>
+            <a:br>
+              <a:rPr lang="en-US" sz="1800" i="1" kern="1200" spc="100" baseline="0" dirty="0">
+                <a:solidFill>
+                  <a:schemeClr val="bg1"/>
+                </a:solidFill>
+                <a:effectLst/>
+                <a:latin typeface="+mj-lt"/>
+                <a:ea typeface="+mj-ea"/>
+                <a:cs typeface="+mj-cs"/>
+              </a:rPr>
+            </a:br>
+            <a:r>
+              <a:rPr lang="en-US" sz="1800" i="1" kern="1200" spc="100" baseline="0" dirty="0">
+                <a:solidFill>
+                  <a:schemeClr val="bg1"/>
+                </a:solidFill>
+                <a:effectLst/>
+                <a:latin typeface="+mj-lt"/>
+                <a:ea typeface="+mj-ea"/>
+                <a:cs typeface="+mj-cs"/>
+              </a:rPr>
+              <a:t>A regression analysis was conducted on the dependent variable, price, and all the explanatory variables. </a:t>
+            </a:r>
+            <a:br>
+              <a:rPr lang="en-US" sz="1800" i="1" kern="1200" spc="100" baseline="0" dirty="0">
+                <a:solidFill>
+                  <a:schemeClr val="bg1"/>
+                </a:solidFill>
+                <a:effectLst/>
+                <a:latin typeface="+mj-lt"/>
+                <a:ea typeface="+mj-ea"/>
+                <a:cs typeface="+mj-cs"/>
+              </a:rPr>
+            </a:br>
+            <a:br>
+              <a:rPr lang="en-US" sz="1800" i="1" kern="1200" spc="100" baseline="0" dirty="0">
+                <a:solidFill>
+                  <a:schemeClr val="bg1"/>
+                </a:solidFill>
+                <a:effectLst/>
+                <a:latin typeface="+mj-lt"/>
+                <a:ea typeface="+mj-ea"/>
+                <a:cs typeface="+mj-cs"/>
+              </a:rPr>
+            </a:br>
+            <a:r>
+              <a:rPr lang="en-US" sz="1800" i="1" kern="1200" spc="100" baseline="0" dirty="0">
+                <a:solidFill>
+                  <a:schemeClr val="bg1"/>
+                </a:solidFill>
+                <a:effectLst/>
+                <a:latin typeface="+mj-lt"/>
+                <a:ea typeface="+mj-ea"/>
+                <a:cs typeface="+mj-cs"/>
+              </a:rPr>
+              <a:t>The analysis shows that all variables are statistically significant in predicting the rental prices in Europe. </a:t>
+            </a:r>
+            <a:br>
+              <a:rPr lang="en-US" sz="1800" i="1" kern="1200" spc="100" baseline="0" dirty="0">
+                <a:solidFill>
+                  <a:schemeClr val="bg1"/>
+                </a:solidFill>
+                <a:effectLst/>
+                <a:latin typeface="+mj-lt"/>
+                <a:ea typeface="+mj-ea"/>
+                <a:cs typeface="+mj-cs"/>
+              </a:rPr>
+            </a:br>
+            <a:br>
+              <a:rPr lang="en-US" sz="1800" i="1" kern="1200" spc="100" baseline="0" dirty="0">
+                <a:solidFill>
+                  <a:schemeClr val="bg1"/>
+                </a:solidFill>
+                <a:effectLst/>
+                <a:latin typeface="+mj-lt"/>
+                <a:ea typeface="+mj-ea"/>
+                <a:cs typeface="+mj-cs"/>
+              </a:rPr>
+            </a:br>
+            <a:r>
+              <a:rPr lang="en-US" sz="1800" i="1" kern="1200" spc="100" baseline="0" dirty="0">
+                <a:solidFill>
+                  <a:schemeClr val="bg1"/>
+                </a:solidFill>
+                <a:effectLst/>
+                <a:latin typeface="+mj-lt"/>
+                <a:ea typeface="+mj-ea"/>
+                <a:cs typeface="+mj-cs"/>
+              </a:rPr>
+              <a:t>The coefficients of determination (R-squared) are 0.31, 0.46, 0.52 and 0.55 respectively for our </a:t>
+            </a:r>
+            <a:r>
+              <a:rPr lang="en-US" sz="1800" dirty="0">
+                <a:solidFill>
+                  <a:schemeClr val="bg1"/>
+                </a:solidFill>
+              </a:rPr>
+              <a:t>l</a:t>
+            </a:r>
+            <a:r>
+              <a:rPr lang="en-US" sz="1800" i="1" kern="1200" spc="100" baseline="0" dirty="0">
+                <a:solidFill>
+                  <a:schemeClr val="bg1"/>
+                </a:solidFill>
+                <a:effectLst/>
+                <a:latin typeface="+mj-lt"/>
+                <a:ea typeface="+mj-ea"/>
+                <a:cs typeface="+mj-cs"/>
+              </a:rPr>
+              <a:t>inear regression model, 2</a:t>
+            </a:r>
+            <a:r>
+              <a:rPr lang="en-US" sz="1800" i="1" kern="1200" spc="100" baseline="30000" dirty="0">
+                <a:solidFill>
+                  <a:schemeClr val="bg1"/>
+                </a:solidFill>
+                <a:effectLst/>
+                <a:latin typeface="+mj-lt"/>
+                <a:ea typeface="+mj-ea"/>
+                <a:cs typeface="+mj-cs"/>
+              </a:rPr>
+              <a:t>nd</a:t>
+            </a:r>
+            <a:r>
+              <a:rPr lang="en-US" sz="1800" i="1" kern="1200" spc="100" baseline="0" dirty="0">
+                <a:solidFill>
+                  <a:schemeClr val="bg1"/>
+                </a:solidFill>
+                <a:effectLst/>
+                <a:latin typeface="+mj-lt"/>
+                <a:ea typeface="+mj-ea"/>
+                <a:cs typeface="+mj-cs"/>
+              </a:rPr>
+              <a:t> , 3</a:t>
+            </a:r>
+            <a:r>
+              <a:rPr lang="en-US" sz="1800" i="1" kern="1200" spc="100" baseline="30000" dirty="0">
+                <a:solidFill>
+                  <a:schemeClr val="bg1"/>
+                </a:solidFill>
+                <a:effectLst/>
+                <a:latin typeface="+mj-lt"/>
+                <a:ea typeface="+mj-ea"/>
+                <a:cs typeface="+mj-cs"/>
+              </a:rPr>
+              <a:t>rd</a:t>
+            </a:r>
+            <a:r>
+              <a:rPr lang="en-US" sz="1800" i="1" kern="1200" spc="100" baseline="0" dirty="0">
+                <a:solidFill>
+                  <a:schemeClr val="bg1"/>
+                </a:solidFill>
+                <a:effectLst/>
+                <a:latin typeface="+mj-lt"/>
+                <a:ea typeface="+mj-ea"/>
+                <a:cs typeface="+mj-cs"/>
+              </a:rPr>
+              <a:t>  and 4</a:t>
+            </a:r>
+            <a:r>
+              <a:rPr lang="en-US" sz="1800" i="1" kern="1200" spc="100" baseline="30000" dirty="0">
+                <a:solidFill>
+                  <a:schemeClr val="bg1"/>
+                </a:solidFill>
+                <a:effectLst/>
+                <a:latin typeface="+mj-lt"/>
+                <a:ea typeface="+mj-ea"/>
+                <a:cs typeface="+mj-cs"/>
+              </a:rPr>
+              <a:t>th</a:t>
+            </a:r>
+            <a:r>
+              <a:rPr lang="en-US" sz="1800" i="1" kern="1200" spc="100" baseline="0" dirty="0">
+                <a:solidFill>
+                  <a:schemeClr val="bg1"/>
+                </a:solidFill>
+                <a:effectLst/>
+                <a:latin typeface="+mj-lt"/>
+                <a:ea typeface="+mj-ea"/>
+                <a:cs typeface="+mj-cs"/>
+              </a:rPr>
+              <a:t>  degree polynomial regressions, which means that our best model being the 4th degree Polynomial regression explains 55% of the variability in rental prices can be explained by the model.</a:t>
+            </a:r>
+            <a:br>
+              <a:rPr lang="en-US" sz="1800" i="1" kern="1200" spc="100" baseline="0" dirty="0">
+                <a:solidFill>
+                  <a:schemeClr val="bg1"/>
+                </a:solidFill>
+                <a:effectLst/>
+                <a:latin typeface="+mj-lt"/>
+                <a:ea typeface="+mj-ea"/>
+                <a:cs typeface="+mj-cs"/>
+              </a:rPr>
+            </a:br>
+            <a:endParaRPr lang="en-US" sz="1800" i="1" kern="1200" spc="100" baseline="0" dirty="0">
+              <a:solidFill>
+                <a:schemeClr val="bg1"/>
+              </a:solidFill>
+              <a:latin typeface="+mj-lt"/>
+              <a:ea typeface="+mj-ea"/>
+              <a:cs typeface="+mj-cs"/>
+            </a:endParaRPr>
+          </a:p>
+        </p:txBody>
+      </p:sp>
+      <p:pic>
+        <p:nvPicPr>
+          <p:cNvPr id="4" name="Content Placeholder 3">
+            <a:extLst>
+              <a:ext uri="{FF2B5EF4-FFF2-40B4-BE49-F238E27FC236}">
+                <a16:creationId xmlns:a16="http://schemas.microsoft.com/office/drawing/2014/main" id="{B42F6A27-1943-EC39-19AE-34BE89137517}"/>
+              </a:ext>
+            </a:extLst>
+          </p:cNvPr>
+          <p:cNvPicPr>
+            <a:picLocks noGrp="1" noChangeAspect="1"/>
+          </p:cNvPicPr>
+          <p:nvPr>
+            <p:ph idx="1"/>
+          </p:nvPr>
+        </p:nvPicPr>
+        <p:blipFill>
+          <a:blip r:embed="rId2"/>
+          <a:stretch>
+            <a:fillRect/>
+          </a:stretch>
+        </p:blipFill>
+        <p:spPr>
+          <a:xfrm>
+            <a:off x="5363012" y="1635919"/>
+            <a:ext cx="6686699" cy="3586162"/>
+          </a:xfrm>
+          <a:prstGeom prst="rect">
+            <a:avLst/>
+          </a:prstGeom>
+        </p:spPr>
+      </p:pic>
+      <p:sp>
+        <p:nvSpPr>
+          <p:cNvPr id="17" name="Freeform 6">
+            <a:extLst>
+              <a:ext uri="{FF2B5EF4-FFF2-40B4-BE49-F238E27FC236}">
+                <a16:creationId xmlns:a16="http://schemas.microsoft.com/office/drawing/2014/main" id="{ADA271CD-3011-4A05-B4A3-80F1794684F2}"/>
+              </a:ext>
+              <a:ext uri="{C183D7F6-B498-43B3-948B-1728B52AA6E4}">
+                <adec:decorative xmlns:adec="http://schemas.microsoft.com/office/drawing/2017/decorative" val="1"/>
+              </a:ext>
+            </a:extLst>
+          </p:cNvPr>
+          <p:cNvSpPr>
+            <a:spLocks noGrp="1" noRot="1" noChangeAspect="1" noMove="1" noResize="1" noEditPoints="1" noAdjustHandles="1" noChangeArrowheads="1" noChangeShapeType="1" noTextEdit="1"/>
+          </p:cNvSpPr>
+          <p:nvPr>
+            <p:extLst>
+              <p:ext uri="{386F3935-93C4-4BCD-93E2-E3B085C9AB24}">
+                <p16:designElem xmlns:p16="http://schemas.microsoft.com/office/powerpoint/2015/main" val="1"/>
+              </p:ext>
+            </p:extLst>
+          </p:nvPr>
+        </p:nvSpPr>
+        <p:spPr bwMode="auto">
+          <a:xfrm>
+            <a:off x="11784011" y="5788152"/>
+            <a:ext cx="407988" cy="819150"/>
+          </a:xfrm>
+          <a:custGeom>
+            <a:avLst/>
+            <a:gdLst/>
+            <a:ahLst/>
+            <a:cxnLst/>
+            <a:rect l="0" t="0" r="r" b="b"/>
+            <a:pathLst>
+              <a:path w="1799" h="3612">
+                <a:moveTo>
+                  <a:pt x="1799" y="0"/>
+                </a:moveTo>
+                <a:lnTo>
+                  <a:pt x="1799" y="3612"/>
+                </a:lnTo>
+                <a:lnTo>
+                  <a:pt x="1686" y="3609"/>
+                </a:lnTo>
+                <a:lnTo>
+                  <a:pt x="1574" y="3598"/>
+                </a:lnTo>
+                <a:lnTo>
+                  <a:pt x="1464" y="3581"/>
+                </a:lnTo>
+                <a:lnTo>
+                  <a:pt x="1357" y="3557"/>
+                </a:lnTo>
+                <a:lnTo>
+                  <a:pt x="1251" y="3527"/>
+                </a:lnTo>
+                <a:lnTo>
+                  <a:pt x="1150" y="3490"/>
+                </a:lnTo>
+                <a:lnTo>
+                  <a:pt x="1050" y="3448"/>
+                </a:lnTo>
+                <a:lnTo>
+                  <a:pt x="953" y="3401"/>
+                </a:lnTo>
+                <a:lnTo>
+                  <a:pt x="860" y="3347"/>
+                </a:lnTo>
+                <a:lnTo>
+                  <a:pt x="771" y="3289"/>
+                </a:lnTo>
+                <a:lnTo>
+                  <a:pt x="686" y="3224"/>
+                </a:lnTo>
+                <a:lnTo>
+                  <a:pt x="604" y="3156"/>
+                </a:lnTo>
+                <a:lnTo>
+                  <a:pt x="527" y="3083"/>
+                </a:lnTo>
+                <a:lnTo>
+                  <a:pt x="454" y="3005"/>
+                </a:lnTo>
+                <a:lnTo>
+                  <a:pt x="386" y="2923"/>
+                </a:lnTo>
+                <a:lnTo>
+                  <a:pt x="323" y="2838"/>
+                </a:lnTo>
+                <a:lnTo>
+                  <a:pt x="265" y="2748"/>
+                </a:lnTo>
+                <a:lnTo>
+                  <a:pt x="211" y="2655"/>
+                </a:lnTo>
+                <a:lnTo>
+                  <a:pt x="163" y="2559"/>
+                </a:lnTo>
+                <a:lnTo>
+                  <a:pt x="121" y="2459"/>
+                </a:lnTo>
+                <a:lnTo>
+                  <a:pt x="85" y="2356"/>
+                </a:lnTo>
+                <a:lnTo>
+                  <a:pt x="55" y="2251"/>
+                </a:lnTo>
+                <a:lnTo>
+                  <a:pt x="32" y="2143"/>
+                </a:lnTo>
+                <a:lnTo>
+                  <a:pt x="14" y="2033"/>
+                </a:lnTo>
+                <a:lnTo>
+                  <a:pt x="4" y="1920"/>
+                </a:lnTo>
+                <a:lnTo>
+                  <a:pt x="0" y="1806"/>
+                </a:lnTo>
+                <a:lnTo>
+                  <a:pt x="4" y="1692"/>
+                </a:lnTo>
+                <a:lnTo>
+                  <a:pt x="14" y="1580"/>
+                </a:lnTo>
+                <a:lnTo>
+                  <a:pt x="32" y="1469"/>
+                </a:lnTo>
+                <a:lnTo>
+                  <a:pt x="55" y="1362"/>
+                </a:lnTo>
+                <a:lnTo>
+                  <a:pt x="85" y="1256"/>
+                </a:lnTo>
+                <a:lnTo>
+                  <a:pt x="121" y="1154"/>
+                </a:lnTo>
+                <a:lnTo>
+                  <a:pt x="163" y="1054"/>
+                </a:lnTo>
+                <a:lnTo>
+                  <a:pt x="211" y="958"/>
+                </a:lnTo>
+                <a:lnTo>
+                  <a:pt x="265" y="864"/>
+                </a:lnTo>
+                <a:lnTo>
+                  <a:pt x="323" y="774"/>
+                </a:lnTo>
+                <a:lnTo>
+                  <a:pt x="386" y="689"/>
+                </a:lnTo>
+                <a:lnTo>
+                  <a:pt x="454" y="607"/>
+                </a:lnTo>
+                <a:lnTo>
+                  <a:pt x="527" y="529"/>
+                </a:lnTo>
+                <a:lnTo>
+                  <a:pt x="604" y="456"/>
+                </a:lnTo>
+                <a:lnTo>
+                  <a:pt x="686" y="388"/>
+                </a:lnTo>
+                <a:lnTo>
+                  <a:pt x="771" y="325"/>
+                </a:lnTo>
+                <a:lnTo>
+                  <a:pt x="860" y="266"/>
+                </a:lnTo>
+                <a:lnTo>
+                  <a:pt x="953" y="212"/>
+                </a:lnTo>
+                <a:lnTo>
+                  <a:pt x="1050" y="164"/>
+                </a:lnTo>
+                <a:lnTo>
+                  <a:pt x="1150" y="122"/>
+                </a:lnTo>
+                <a:lnTo>
+                  <a:pt x="1251" y="85"/>
+                </a:lnTo>
+                <a:lnTo>
+                  <a:pt x="1357" y="55"/>
+                </a:lnTo>
+                <a:lnTo>
+                  <a:pt x="1464" y="32"/>
+                </a:lnTo>
+                <a:lnTo>
+                  <a:pt x="1574" y="14"/>
+                </a:lnTo>
+                <a:lnTo>
+                  <a:pt x="1686" y="5"/>
+                </a:lnTo>
+                <a:lnTo>
+                  <a:pt x="1799" y="0"/>
+                </a:lnTo>
+                <a:close/>
+              </a:path>
+            </a:pathLst>
+          </a:custGeom>
+          <a:solidFill>
+            <a:schemeClr val="tx1">
+              <a:lumMod val="85000"/>
+              <a:lumOff val="15000"/>
+            </a:schemeClr>
+          </a:solidFill>
+          <a:ln w="0">
+            <a:noFill/>
+            <a:prstDash val="solid"/>
+            <a:round/>
+            <a:headEnd/>
+            <a:tailEnd/>
+          </a:ln>
+        </p:spPr>
+        <p:txBody>
+          <a:bodyPr anchor="ctr"/>
           <a:lstStyle/>
           <a:p>
             <a:endParaRPr lang="en-US"/>
@@ -6320,26 +8080,40 @@
       </p:sp>
       <p:sp>
         <p:nvSpPr>
-          <p:cNvPr id="3" name="Content Placeholder 2">
-            <a:extLst>
-              <a:ext uri="{FF2B5EF4-FFF2-40B4-BE49-F238E27FC236}">
-                <a16:creationId xmlns:a16="http://schemas.microsoft.com/office/drawing/2014/main" id="{FDD6B648-F998-E0F8-852E-630E40BC1510}"/>
-              </a:ext>
-            </a:extLst>
-          </p:cNvPr>
-          <p:cNvSpPr>
-            <a:spLocks noGrp="1"/>
-          </p:cNvSpPr>
-          <p:nvPr>
-            <p:ph idx="1"/>
-          </p:nvPr>
+          <p:cNvPr id="5" name="TextBox 4">
+            <a:extLst>
+              <a:ext uri="{FF2B5EF4-FFF2-40B4-BE49-F238E27FC236}">
+                <a16:creationId xmlns:a16="http://schemas.microsoft.com/office/drawing/2014/main" id="{CC2B674C-57F5-DFB6-7C90-C85565D5A86A}"/>
+              </a:ext>
+            </a:extLst>
+          </p:cNvPr>
+          <p:cNvSpPr txBox="1"/>
+          <p:nvPr/>
         </p:nvSpPr>
-        <p:spPr/>
+        <p:spPr>
+          <a:xfrm>
+            <a:off x="7718298" y="987772"/>
+            <a:ext cx="3714750" cy="584775"/>
+          </a:xfrm>
+          <a:prstGeom prst="rect">
+            <a:avLst/>
+          </a:prstGeom>
+          <a:noFill/>
+        </p:spPr>
         <p:txBody>
-          <a:bodyPr/>
+          <a:bodyPr wrap="square" rtlCol="0">
+            <a:spAutoFit/>
+          </a:bodyPr>
           <a:lstStyle/>
           <a:p>
-            <a:endParaRPr lang="en-US"/>
+            <a:r>
+              <a:rPr lang="en-US" sz="3200" i="1" spc="100" dirty="0">
+                <a:latin typeface="+mj-lt"/>
+                <a:ea typeface="+mj-ea"/>
+                <a:cs typeface="+mj-cs"/>
+              </a:rPr>
+              <a:t>P-values</a:t>
+            </a:r>
           </a:p>
         </p:txBody>
       </p:sp>
@@ -6347,246 +8121,6 @@
     <p:extLst>
       <p:ext uri="{BB962C8B-B14F-4D97-AF65-F5344CB8AC3E}">
         <p14:creationId xmlns:p14="http://schemas.microsoft.com/office/powerpoint/2010/main" val="534530771"/>
-      </p:ext>
-    </p:extLst>
-  </p:cSld>
-  <p:clrMapOvr>
-    <a:masterClrMapping/>
-  </p:clrMapOvr>
-</p:sld>
-</file>
-
-<file path=ppt/slides/slide16.xml><?xml version="1.0" encoding="utf-8"?>
-<p:sld xmlns:a="http://schemas.openxmlformats.org/drawingml/2006/main" xmlns:r="http://schemas.openxmlformats.org/officeDocument/2006/relationships" xmlns:p="http://schemas.openxmlformats.org/presentationml/2006/main">
-  <p:cSld>
-    <p:spTree>
-      <p:nvGrpSpPr>
-        <p:cNvPr id="1" name=""/>
-        <p:cNvGrpSpPr/>
-        <p:nvPr/>
-      </p:nvGrpSpPr>
-      <p:grpSpPr>
-        <a:xfrm>
-          <a:off x="0" y="0"/>
-          <a:ext cx="0" cy="0"/>
-          <a:chOff x="0" y="0"/>
-          <a:chExt cx="0" cy="0"/>
-        </a:xfrm>
-      </p:grpSpPr>
-      <p:sp>
-        <p:nvSpPr>
-          <p:cNvPr id="2" name="Title 1">
-            <a:extLst>
-              <a:ext uri="{FF2B5EF4-FFF2-40B4-BE49-F238E27FC236}">
-                <a16:creationId xmlns:a16="http://schemas.microsoft.com/office/drawing/2014/main" id="{52273690-C467-F8EC-1E5C-5E7E4DBE77A3}"/>
-              </a:ext>
-            </a:extLst>
-          </p:cNvPr>
-          <p:cNvSpPr>
-            <a:spLocks noGrp="1"/>
-          </p:cNvSpPr>
-          <p:nvPr>
-            <p:ph type="title"/>
-          </p:nvPr>
-        </p:nvSpPr>
-        <p:spPr/>
-        <p:txBody>
-          <a:bodyPr/>
-          <a:lstStyle/>
-          <a:p>
-            <a:endParaRPr lang="en-US"/>
-          </a:p>
-        </p:txBody>
-      </p:sp>
-      <p:sp>
-        <p:nvSpPr>
-          <p:cNvPr id="3" name="Content Placeholder 2">
-            <a:extLst>
-              <a:ext uri="{FF2B5EF4-FFF2-40B4-BE49-F238E27FC236}">
-                <a16:creationId xmlns:a16="http://schemas.microsoft.com/office/drawing/2014/main" id="{DC967F6D-C115-E8DA-6DD3-DD0CDD85E090}"/>
-              </a:ext>
-            </a:extLst>
-          </p:cNvPr>
-          <p:cNvSpPr>
-            <a:spLocks noGrp="1"/>
-          </p:cNvSpPr>
-          <p:nvPr>
-            <p:ph idx="1"/>
-          </p:nvPr>
-        </p:nvSpPr>
-        <p:spPr/>
-        <p:txBody>
-          <a:bodyPr/>
-          <a:lstStyle/>
-          <a:p>
-            <a:endParaRPr lang="en-US"/>
-          </a:p>
-        </p:txBody>
-      </p:sp>
-    </p:spTree>
-    <p:extLst>
-      <p:ext uri="{BB962C8B-B14F-4D97-AF65-F5344CB8AC3E}">
-        <p14:creationId xmlns:p14="http://schemas.microsoft.com/office/powerpoint/2010/main" val="854540395"/>
-      </p:ext>
-    </p:extLst>
-  </p:cSld>
-  <p:clrMapOvr>
-    <a:masterClrMapping/>
-  </p:clrMapOvr>
-</p:sld>
-</file>
-
-<file path=ppt/slides/slide17.xml><?xml version="1.0" encoding="utf-8"?>
-<p:sld xmlns:a="http://schemas.openxmlformats.org/drawingml/2006/main" xmlns:r="http://schemas.openxmlformats.org/officeDocument/2006/relationships" xmlns:p="http://schemas.openxmlformats.org/presentationml/2006/main">
-  <p:cSld>
-    <p:spTree>
-      <p:nvGrpSpPr>
-        <p:cNvPr id="1" name=""/>
-        <p:cNvGrpSpPr/>
-        <p:nvPr/>
-      </p:nvGrpSpPr>
-      <p:grpSpPr>
-        <a:xfrm>
-          <a:off x="0" y="0"/>
-          <a:ext cx="0" cy="0"/>
-          <a:chOff x="0" y="0"/>
-          <a:chExt cx="0" cy="0"/>
-        </a:xfrm>
-      </p:grpSpPr>
-      <p:sp>
-        <p:nvSpPr>
-          <p:cNvPr id="2" name="Title 1">
-            <a:extLst>
-              <a:ext uri="{FF2B5EF4-FFF2-40B4-BE49-F238E27FC236}">
-                <a16:creationId xmlns:a16="http://schemas.microsoft.com/office/drawing/2014/main" id="{D8EC8C11-E4EB-4F63-AC9C-0DC491177BE1}"/>
-              </a:ext>
-            </a:extLst>
-          </p:cNvPr>
-          <p:cNvSpPr>
-            <a:spLocks noGrp="1"/>
-          </p:cNvSpPr>
-          <p:nvPr>
-            <p:ph type="title"/>
-          </p:nvPr>
-        </p:nvSpPr>
-        <p:spPr/>
-        <p:txBody>
-          <a:bodyPr/>
-          <a:lstStyle/>
-          <a:p>
-            <a:endParaRPr lang="en-US"/>
-          </a:p>
-        </p:txBody>
-      </p:sp>
-      <p:sp>
-        <p:nvSpPr>
-          <p:cNvPr id="3" name="Content Placeholder 2">
-            <a:extLst>
-              <a:ext uri="{FF2B5EF4-FFF2-40B4-BE49-F238E27FC236}">
-                <a16:creationId xmlns:a16="http://schemas.microsoft.com/office/drawing/2014/main" id="{796A77E4-C2F1-CAB7-03DB-7118E7AEF647}"/>
-              </a:ext>
-            </a:extLst>
-          </p:cNvPr>
-          <p:cNvSpPr>
-            <a:spLocks noGrp="1"/>
-          </p:cNvSpPr>
-          <p:nvPr>
-            <p:ph idx="1"/>
-          </p:nvPr>
-        </p:nvSpPr>
-        <p:spPr/>
-        <p:txBody>
-          <a:bodyPr/>
-          <a:lstStyle/>
-          <a:p>
-            <a:endParaRPr lang="en-US"/>
-          </a:p>
-        </p:txBody>
-      </p:sp>
-    </p:spTree>
-    <p:extLst>
-      <p:ext uri="{BB962C8B-B14F-4D97-AF65-F5344CB8AC3E}">
-        <p14:creationId xmlns:p14="http://schemas.microsoft.com/office/powerpoint/2010/main" val="57805444"/>
-      </p:ext>
-    </p:extLst>
-  </p:cSld>
-  <p:clrMapOvr>
-    <a:masterClrMapping/>
-  </p:clrMapOvr>
-</p:sld>
-</file>
-
-<file path=ppt/slides/slide18.xml><?xml version="1.0" encoding="utf-8"?>
-<p:sld xmlns:a="http://schemas.openxmlformats.org/drawingml/2006/main" xmlns:r="http://schemas.openxmlformats.org/officeDocument/2006/relationships" xmlns:p="http://schemas.openxmlformats.org/presentationml/2006/main">
-  <p:cSld>
-    <p:spTree>
-      <p:nvGrpSpPr>
-        <p:cNvPr id="1" name=""/>
-        <p:cNvGrpSpPr/>
-        <p:nvPr/>
-      </p:nvGrpSpPr>
-      <p:grpSpPr>
-        <a:xfrm>
-          <a:off x="0" y="0"/>
-          <a:ext cx="0" cy="0"/>
-          <a:chOff x="0" y="0"/>
-          <a:chExt cx="0" cy="0"/>
-        </a:xfrm>
-      </p:grpSpPr>
-      <p:sp>
-        <p:nvSpPr>
-          <p:cNvPr id="2" name="Title 1">
-            <a:extLst>
-              <a:ext uri="{FF2B5EF4-FFF2-40B4-BE49-F238E27FC236}">
-                <a16:creationId xmlns:a16="http://schemas.microsoft.com/office/drawing/2014/main" id="{D6538DB3-26AB-BF40-06B3-A5E6DF7E8727}"/>
-              </a:ext>
-            </a:extLst>
-          </p:cNvPr>
-          <p:cNvSpPr>
-            <a:spLocks noGrp="1"/>
-          </p:cNvSpPr>
-          <p:nvPr>
-            <p:ph type="title"/>
-          </p:nvPr>
-        </p:nvSpPr>
-        <p:spPr/>
-        <p:txBody>
-          <a:bodyPr/>
-          <a:lstStyle/>
-          <a:p>
-            <a:endParaRPr lang="en-US"/>
-          </a:p>
-        </p:txBody>
-      </p:sp>
-      <p:sp>
-        <p:nvSpPr>
-          <p:cNvPr id="3" name="Content Placeholder 2">
-            <a:extLst>
-              <a:ext uri="{FF2B5EF4-FFF2-40B4-BE49-F238E27FC236}">
-                <a16:creationId xmlns:a16="http://schemas.microsoft.com/office/drawing/2014/main" id="{B1A8EE95-3142-3A75-25BB-10E19C297425}"/>
-              </a:ext>
-            </a:extLst>
-          </p:cNvPr>
-          <p:cNvSpPr>
-            <a:spLocks noGrp="1"/>
-          </p:cNvSpPr>
-          <p:nvPr>
-            <p:ph idx="1"/>
-          </p:nvPr>
-        </p:nvSpPr>
-        <p:spPr/>
-        <p:txBody>
-          <a:bodyPr/>
-          <a:lstStyle/>
-          <a:p>
-            <a:endParaRPr lang="en-US"/>
-          </a:p>
-        </p:txBody>
-      </p:sp>
-    </p:spTree>
-    <p:extLst>
-      <p:ext uri="{BB962C8B-B14F-4D97-AF65-F5344CB8AC3E}">
-        <p14:creationId xmlns:p14="http://schemas.microsoft.com/office/powerpoint/2010/main" val="4086897436"/>
       </p:ext>
     </p:extLst>
   </p:cSld>
@@ -7654,6 +9188,195 @@
           <p:cNvPr id="2" name="Title 1">
             <a:extLst>
               <a:ext uri="{FF2B5EF4-FFF2-40B4-BE49-F238E27FC236}">
+                <a16:creationId xmlns:a16="http://schemas.microsoft.com/office/drawing/2014/main" id="{D8C32562-21B9-9DB7-5C1F-4E0A405E5F50}"/>
+              </a:ext>
+            </a:extLst>
+          </p:cNvPr>
+          <p:cNvSpPr>
+            <a:spLocks noGrp="1"/>
+          </p:cNvSpPr>
+          <p:nvPr>
+            <p:ph type="title"/>
+          </p:nvPr>
+        </p:nvSpPr>
+        <p:spPr>
+          <a:xfrm>
+            <a:off x="762000" y="466344"/>
+            <a:ext cx="10671048" cy="585216"/>
+          </a:xfrm>
+        </p:spPr>
+        <p:txBody>
+          <a:bodyPr>
+            <a:normAutofit/>
+          </a:bodyPr>
+          <a:lstStyle/>
+          <a:p>
+            <a:pPr algn="ctr"/>
+            <a:r>
+              <a:rPr lang="en-US" sz="3200"/>
+              <a:t>Descriptive Characteristics</a:t>
+            </a:r>
+            <a:endParaRPr lang="en-US" sz="3200" dirty="0"/>
+          </a:p>
+        </p:txBody>
+      </p:sp>
+      <p:pic>
+        <p:nvPicPr>
+          <p:cNvPr id="9" name="Content Placeholder 8">
+            <a:extLst>
+              <a:ext uri="{FF2B5EF4-FFF2-40B4-BE49-F238E27FC236}">
+                <a16:creationId xmlns:a16="http://schemas.microsoft.com/office/drawing/2014/main" id="{6401B28C-519A-BF29-8192-2674778CD630}"/>
+              </a:ext>
+            </a:extLst>
+          </p:cNvPr>
+          <p:cNvPicPr>
+            <a:picLocks noGrp="1" noChangeAspect="1"/>
+          </p:cNvPicPr>
+          <p:nvPr>
+            <p:ph idx="1"/>
+          </p:nvPr>
+        </p:nvPicPr>
+        <p:blipFill>
+          <a:blip r:embed="rId2"/>
+          <a:stretch>
+            <a:fillRect/>
+          </a:stretch>
+        </p:blipFill>
+        <p:spPr>
+          <a:xfrm>
+            <a:off x="43356" y="1427160"/>
+            <a:ext cx="5842000" cy="2146300"/>
+          </a:xfrm>
+          <a:prstGeom prst="rect">
+            <a:avLst/>
+          </a:prstGeom>
+        </p:spPr>
+      </p:pic>
+      <p:pic>
+        <p:nvPicPr>
+          <p:cNvPr id="10" name="Picture 9">
+            <a:extLst>
+              <a:ext uri="{FF2B5EF4-FFF2-40B4-BE49-F238E27FC236}">
+                <a16:creationId xmlns:a16="http://schemas.microsoft.com/office/drawing/2014/main" id="{B8EFA9C4-184D-5644-8CC6-E583A068C3D6}"/>
+              </a:ext>
+            </a:extLst>
+          </p:cNvPr>
+          <p:cNvPicPr>
+            <a:picLocks noChangeAspect="1"/>
+          </p:cNvPicPr>
+          <p:nvPr/>
+        </p:nvPicPr>
+        <p:blipFill>
+          <a:blip r:embed="rId3"/>
+          <a:stretch>
+            <a:fillRect/>
+          </a:stretch>
+        </p:blipFill>
+        <p:spPr>
+          <a:xfrm>
+            <a:off x="5859956" y="1427160"/>
+            <a:ext cx="6232028" cy="2146300"/>
+          </a:xfrm>
+          <a:prstGeom prst="rect">
+            <a:avLst/>
+          </a:prstGeom>
+        </p:spPr>
+      </p:pic>
+      <p:pic>
+        <p:nvPicPr>
+          <p:cNvPr id="11" name="Picture 10">
+            <a:extLst>
+              <a:ext uri="{FF2B5EF4-FFF2-40B4-BE49-F238E27FC236}">
+                <a16:creationId xmlns:a16="http://schemas.microsoft.com/office/drawing/2014/main" id="{8256BD13-402C-EAE5-C8BD-60CFC901BFFE}"/>
+              </a:ext>
+            </a:extLst>
+          </p:cNvPr>
+          <p:cNvPicPr>
+            <a:picLocks noChangeAspect="1"/>
+          </p:cNvPicPr>
+          <p:nvPr/>
+        </p:nvPicPr>
+        <p:blipFill>
+          <a:blip r:embed="rId4"/>
+          <a:stretch>
+            <a:fillRect/>
+          </a:stretch>
+        </p:blipFill>
+        <p:spPr>
+          <a:xfrm>
+            <a:off x="43356" y="3808413"/>
+            <a:ext cx="6121400" cy="2184400"/>
+          </a:xfrm>
+          <a:prstGeom prst="rect">
+            <a:avLst/>
+          </a:prstGeom>
+        </p:spPr>
+      </p:pic>
+      <p:pic>
+        <p:nvPicPr>
+          <p:cNvPr id="12" name="Picture 11">
+            <a:extLst>
+              <a:ext uri="{FF2B5EF4-FFF2-40B4-BE49-F238E27FC236}">
+                <a16:creationId xmlns:a16="http://schemas.microsoft.com/office/drawing/2014/main" id="{E8253CF4-5946-7013-8957-40AF80715828}"/>
+              </a:ext>
+            </a:extLst>
+          </p:cNvPr>
+          <p:cNvPicPr>
+            <a:picLocks noChangeAspect="1"/>
+          </p:cNvPicPr>
+          <p:nvPr/>
+        </p:nvPicPr>
+        <p:blipFill>
+          <a:blip r:embed="rId5"/>
+          <a:stretch>
+            <a:fillRect/>
+          </a:stretch>
+        </p:blipFill>
+        <p:spPr>
+          <a:xfrm>
+            <a:off x="6164756" y="3808413"/>
+            <a:ext cx="4490156" cy="2198688"/>
+          </a:xfrm>
+          <a:prstGeom prst="rect">
+            <a:avLst/>
+          </a:prstGeom>
+        </p:spPr>
+      </p:pic>
+    </p:spTree>
+    <p:extLst>
+      <p:ext uri="{BB962C8B-B14F-4D97-AF65-F5344CB8AC3E}">
+        <p14:creationId xmlns:p14="http://schemas.microsoft.com/office/powerpoint/2010/main" val="2346365609"/>
+      </p:ext>
+    </p:extLst>
+  </p:cSld>
+  <p:clrMapOvr>
+    <a:masterClrMapping/>
+  </p:clrMapOvr>
+</p:sld>
+</file>
+
+<file path=ppt/slides/slide5.xml><?xml version="1.0" encoding="utf-8"?>
+<p:sld xmlns:a="http://schemas.openxmlformats.org/drawingml/2006/main" xmlns:r="http://schemas.openxmlformats.org/officeDocument/2006/relationships" xmlns:p="http://schemas.openxmlformats.org/presentationml/2006/main">
+  <p:cSld>
+    <p:spTree>
+      <p:nvGrpSpPr>
+        <p:cNvPr id="1" name=""/>
+        <p:cNvGrpSpPr/>
+        <p:nvPr/>
+      </p:nvGrpSpPr>
+      <p:grpSpPr>
+        <a:xfrm>
+          <a:off x="0" y="0"/>
+          <a:ext cx="0" cy="0"/>
+          <a:chOff x="0" y="0"/>
+          <a:chExt cx="0" cy="0"/>
+        </a:xfrm>
+      </p:grpSpPr>
+      <p:sp>
+        <p:nvSpPr>
+          <p:cNvPr id="2" name="Title 1">
+            <a:extLst>
+              <a:ext uri="{FF2B5EF4-FFF2-40B4-BE49-F238E27FC236}">
                 <a16:creationId xmlns:a16="http://schemas.microsoft.com/office/drawing/2014/main" id="{40600A46-BB12-E393-6BDF-EEE2FFB5A093}"/>
               </a:ext>
             </a:extLst>
@@ -7816,7 +9539,7 @@
 </p:sld>
 </file>
 
-<file path=ppt/slides/slide5.xml><?xml version="1.0" encoding="utf-8"?>
+<file path=ppt/slides/slide6.xml><?xml version="1.0" encoding="utf-8"?>
 <p:sld xmlns:a="http://schemas.openxmlformats.org/drawingml/2006/main" xmlns:r="http://schemas.openxmlformats.org/officeDocument/2006/relationships" xmlns:p="http://schemas.openxmlformats.org/presentationml/2006/main">
   <p:cSld>
     <p:bg>
@@ -10068,7 +11791,7 @@
 </p:sld>
 </file>
 
-<file path=ppt/slides/slide6.xml><?xml version="1.0" encoding="utf-8"?>
+<file path=ppt/slides/slide7.xml><?xml version="1.0" encoding="utf-8"?>
 <p:sld xmlns:a="http://schemas.openxmlformats.org/drawingml/2006/main" xmlns:r="http://schemas.openxmlformats.org/officeDocument/2006/relationships" xmlns:p="http://schemas.openxmlformats.org/presentationml/2006/main">
   <p:cSld>
     <p:bg>
@@ -10573,7 +12296,7 @@
 </p:sld>
 </file>
 
-<file path=ppt/slides/slide7.xml><?xml version="1.0" encoding="utf-8"?>
+<file path=ppt/slides/slide8.xml><?xml version="1.0" encoding="utf-8"?>
 <p:sld xmlns:a="http://schemas.openxmlformats.org/drawingml/2006/main" xmlns:r="http://schemas.openxmlformats.org/officeDocument/2006/relationships" xmlns:p="http://schemas.openxmlformats.org/presentationml/2006/main">
   <p:cSld>
     <p:spTree>
@@ -10705,7 +12428,7 @@
 </p:sld>
 </file>
 
-<file path=ppt/slides/slide8.xml><?xml version="1.0" encoding="utf-8"?>
+<file path=ppt/slides/slide9.xml><?xml version="1.0" encoding="utf-8"?>
 <p:sld xmlns:a="http://schemas.openxmlformats.org/drawingml/2006/main" xmlns:r="http://schemas.openxmlformats.org/officeDocument/2006/relationships" xmlns:p="http://schemas.openxmlformats.org/presentationml/2006/main">
   <p:cSld>
     <p:bg>
@@ -11585,256 +13308,6 @@
     <p:extLst>
       <p:ext uri="{BB962C8B-B14F-4D97-AF65-F5344CB8AC3E}">
         <p14:creationId xmlns:p14="http://schemas.microsoft.com/office/powerpoint/2010/main" val="61579152"/>
-      </p:ext>
-    </p:extLst>
-  </p:cSld>
-  <p:clrMapOvr>
-    <a:masterClrMapping/>
-  </p:clrMapOvr>
-</p:sld>
-</file>
-
-<file path=ppt/slides/slide9.xml><?xml version="1.0" encoding="utf-8"?>
-<p:sld xmlns:a="http://schemas.openxmlformats.org/drawingml/2006/main" xmlns:r="http://schemas.openxmlformats.org/officeDocument/2006/relationships" xmlns:p="http://schemas.openxmlformats.org/presentationml/2006/main">
-  <p:cSld>
-    <p:spTree>
-      <p:nvGrpSpPr>
-        <p:cNvPr id="1" name=""/>
-        <p:cNvGrpSpPr/>
-        <p:nvPr/>
-      </p:nvGrpSpPr>
-      <p:grpSpPr>
-        <a:xfrm>
-          <a:off x="0" y="0"/>
-          <a:ext cx="0" cy="0"/>
-          <a:chOff x="0" y="0"/>
-          <a:chExt cx="0" cy="0"/>
-        </a:xfrm>
-      </p:grpSpPr>
-      <p:sp>
-        <p:nvSpPr>
-          <p:cNvPr id="2" name="Title 1">
-            <a:extLst>
-              <a:ext uri="{FF2B5EF4-FFF2-40B4-BE49-F238E27FC236}">
-                <a16:creationId xmlns:a16="http://schemas.microsoft.com/office/drawing/2014/main" id="{55D80D2B-EE06-2A33-106B-AB429EAD87EB}"/>
-              </a:ext>
-            </a:extLst>
-          </p:cNvPr>
-          <p:cNvSpPr>
-            <a:spLocks noGrp="1"/>
-          </p:cNvSpPr>
-          <p:nvPr>
-            <p:ph type="title"/>
-          </p:nvPr>
-        </p:nvSpPr>
-        <p:spPr>
-          <a:xfrm>
-            <a:off x="873251" y="1051560"/>
-            <a:ext cx="10656761" cy="4754880"/>
-          </a:xfrm>
-        </p:spPr>
-        <p:txBody>
-          <a:bodyPr anchor="ctr" anchorCtr="0">
-            <a:normAutofit/>
-          </a:bodyPr>
-          <a:lstStyle/>
-          <a:p>
-            <a:pPr marL="0" marR="0">
-              <a:spcBef>
-                <a:spcPts val="0"/>
-              </a:spcBef>
-              <a:spcAft>
-                <a:spcPts val="0"/>
-              </a:spcAft>
-            </a:pPr>
-            <a:r>
-              <a:rPr lang="en-US" sz="2400" b="1" kern="100" dirty="0" err="1">
-                <a:solidFill>
-                  <a:srgbClr val="000000"/>
-                </a:solidFill>
-                <a:effectLst/>
-                <a:latin typeface="Calibri" panose="020F0502020204030204" pitchFamily="34" charset="0"/>
-                <a:ea typeface="Calibri" panose="020F0502020204030204" pitchFamily="34" charset="0"/>
-                <a:cs typeface="Arial" panose="020B0604020202020204" pitchFamily="34" charset="0"/>
-              </a:rPr>
-              <a:t>Attractions_rating</a:t>
-            </a:r>
-            <a:r>
-              <a:rPr lang="en-US" sz="2400" b="1" kern="100" dirty="0">
-                <a:solidFill>
-                  <a:srgbClr val="000000"/>
-                </a:solidFill>
-                <a:effectLst/>
-                <a:latin typeface="Calibri" panose="020F0502020204030204" pitchFamily="34" charset="0"/>
-                <a:ea typeface="Calibri" panose="020F0502020204030204" pitchFamily="34" charset="0"/>
-                <a:cs typeface="Arial" panose="020B0604020202020204" pitchFamily="34" charset="0"/>
-              </a:rPr>
-              <a:t>: </a:t>
-            </a:r>
-            <a:r>
-              <a:rPr lang="en-US" sz="2400" kern="100" dirty="0">
-                <a:solidFill>
-                  <a:srgbClr val="000000"/>
-                </a:solidFill>
-                <a:effectLst/>
-                <a:latin typeface="Calibri" panose="020F0502020204030204" pitchFamily="34" charset="0"/>
-                <a:ea typeface="Calibri" panose="020F0502020204030204" pitchFamily="34" charset="0"/>
-                <a:cs typeface="Arial" panose="020B0604020202020204" pitchFamily="34" charset="0"/>
-              </a:rPr>
-              <a:t>The histogram shows a normal distribution with no outliers.</a:t>
-            </a:r>
-            <a:br>
-              <a:rPr lang="en-US" sz="2400" kern="100" dirty="0">
-                <a:effectLst/>
-                <a:latin typeface="Calibri" panose="020F0502020204030204" pitchFamily="34" charset="0"/>
-                <a:ea typeface="Calibri" panose="020F0502020204030204" pitchFamily="34" charset="0"/>
-                <a:cs typeface="Arial" panose="020B0604020202020204" pitchFamily="34" charset="0"/>
-              </a:rPr>
-            </a:br>
-            <a:br>
-              <a:rPr lang="en-US" sz="2400" kern="100" dirty="0">
-                <a:effectLst/>
-                <a:latin typeface="Calibri" panose="020F0502020204030204" pitchFamily="34" charset="0"/>
-                <a:ea typeface="Calibri" panose="020F0502020204030204" pitchFamily="34" charset="0"/>
-                <a:cs typeface="Arial" panose="020B0604020202020204" pitchFamily="34" charset="0"/>
-              </a:rPr>
-            </a:br>
-            <a:r>
-              <a:rPr lang="en-US" sz="2400" b="1" kern="100" dirty="0" err="1">
-                <a:solidFill>
-                  <a:srgbClr val="000000"/>
-                </a:solidFill>
-                <a:effectLst/>
-                <a:latin typeface="Calibri" panose="020F0502020204030204" pitchFamily="34" charset="0"/>
-                <a:ea typeface="Calibri" panose="020F0502020204030204" pitchFamily="34" charset="0"/>
-                <a:cs typeface="Arial" panose="020B0604020202020204" pitchFamily="34" charset="0"/>
-              </a:rPr>
-              <a:t>City_dist</a:t>
-            </a:r>
-            <a:r>
-              <a:rPr lang="en-US" sz="2400" b="1" kern="100" dirty="0">
-                <a:solidFill>
-                  <a:srgbClr val="000000"/>
-                </a:solidFill>
-                <a:effectLst/>
-                <a:latin typeface="Calibri" panose="020F0502020204030204" pitchFamily="34" charset="0"/>
-                <a:ea typeface="Calibri" panose="020F0502020204030204" pitchFamily="34" charset="0"/>
-                <a:cs typeface="Arial" panose="020B0604020202020204" pitchFamily="34" charset="0"/>
-              </a:rPr>
-              <a:t>: </a:t>
-            </a:r>
-            <a:r>
-              <a:rPr lang="en-US" sz="2400" kern="100" dirty="0">
-                <a:solidFill>
-                  <a:srgbClr val="000000"/>
-                </a:solidFill>
-                <a:effectLst/>
-                <a:latin typeface="Calibri" panose="020F0502020204030204" pitchFamily="34" charset="0"/>
-                <a:ea typeface="Calibri" panose="020F0502020204030204" pitchFamily="34" charset="0"/>
-                <a:cs typeface="Arial" panose="020B0604020202020204" pitchFamily="34" charset="0"/>
-              </a:rPr>
-              <a:t>The histogram shows a left-skewed distribution with no outliers.</a:t>
-            </a:r>
-            <a:br>
-              <a:rPr lang="en-US" sz="2400" kern="100" dirty="0">
-                <a:effectLst/>
-                <a:latin typeface="Calibri" panose="020F0502020204030204" pitchFamily="34" charset="0"/>
-                <a:ea typeface="Calibri" panose="020F0502020204030204" pitchFamily="34" charset="0"/>
-                <a:cs typeface="Arial" panose="020B0604020202020204" pitchFamily="34" charset="0"/>
-              </a:rPr>
-            </a:br>
-            <a:br>
-              <a:rPr lang="en-US" sz="2400" kern="100" dirty="0">
-                <a:effectLst/>
-                <a:latin typeface="Calibri" panose="020F0502020204030204" pitchFamily="34" charset="0"/>
-                <a:ea typeface="Calibri" panose="020F0502020204030204" pitchFamily="34" charset="0"/>
-                <a:cs typeface="Arial" panose="020B0604020202020204" pitchFamily="34" charset="0"/>
-              </a:rPr>
-            </a:br>
-            <a:r>
-              <a:rPr lang="en-US" sz="2400" b="1" kern="100" dirty="0" err="1">
-                <a:solidFill>
-                  <a:srgbClr val="000000"/>
-                </a:solidFill>
-                <a:effectLst/>
-                <a:latin typeface="Calibri" panose="020F0502020204030204" pitchFamily="34" charset="0"/>
-                <a:ea typeface="Calibri" panose="020F0502020204030204" pitchFamily="34" charset="0"/>
-                <a:cs typeface="Arial" panose="020B0604020202020204" pitchFamily="34" charset="0"/>
-              </a:rPr>
-              <a:t>Satisfaction_rating</a:t>
-            </a:r>
-            <a:r>
-              <a:rPr lang="en-US" sz="2400" b="1" kern="100" dirty="0">
-                <a:solidFill>
-                  <a:srgbClr val="000000"/>
-                </a:solidFill>
-                <a:effectLst/>
-                <a:latin typeface="Calibri" panose="020F0502020204030204" pitchFamily="34" charset="0"/>
-                <a:ea typeface="Calibri" panose="020F0502020204030204" pitchFamily="34" charset="0"/>
-                <a:cs typeface="Arial" panose="020B0604020202020204" pitchFamily="34" charset="0"/>
-              </a:rPr>
-              <a:t>: </a:t>
-            </a:r>
-            <a:r>
-              <a:rPr lang="en-US" sz="2400" kern="100" dirty="0">
-                <a:solidFill>
-                  <a:srgbClr val="000000"/>
-                </a:solidFill>
-                <a:effectLst/>
-                <a:latin typeface="Calibri" panose="020F0502020204030204" pitchFamily="34" charset="0"/>
-                <a:ea typeface="Calibri" panose="020F0502020204030204" pitchFamily="34" charset="0"/>
-                <a:cs typeface="Arial" panose="020B0604020202020204" pitchFamily="34" charset="0"/>
-              </a:rPr>
-              <a:t>The histogram shows a left-skewed distribution with no outliers.</a:t>
-            </a:r>
-            <a:br>
-              <a:rPr lang="en-US" sz="2400" kern="100" dirty="0">
-                <a:effectLst/>
-                <a:latin typeface="Calibri" panose="020F0502020204030204" pitchFamily="34" charset="0"/>
-                <a:ea typeface="Calibri" panose="020F0502020204030204" pitchFamily="34" charset="0"/>
-                <a:cs typeface="Arial" panose="020B0604020202020204" pitchFamily="34" charset="0"/>
-              </a:rPr>
-            </a:br>
-            <a:br>
-              <a:rPr lang="en-US" sz="2400" kern="100" dirty="0">
-                <a:effectLst/>
-                <a:latin typeface="Calibri" panose="020F0502020204030204" pitchFamily="34" charset="0"/>
-                <a:ea typeface="Calibri" panose="020F0502020204030204" pitchFamily="34" charset="0"/>
-                <a:cs typeface="Arial" panose="020B0604020202020204" pitchFamily="34" charset="0"/>
-              </a:rPr>
-            </a:br>
-            <a:r>
-              <a:rPr lang="en-US" sz="2400" b="1" kern="100" dirty="0">
-                <a:solidFill>
-                  <a:srgbClr val="000000"/>
-                </a:solidFill>
-                <a:effectLst/>
-                <a:latin typeface="Calibri" panose="020F0502020204030204" pitchFamily="34" charset="0"/>
-                <a:ea typeface="Calibri" panose="020F0502020204030204" pitchFamily="34" charset="0"/>
-                <a:cs typeface="Arial" panose="020B0604020202020204" pitchFamily="34" charset="0"/>
-              </a:rPr>
-              <a:t>Bedrooms: </a:t>
-            </a:r>
-            <a:r>
-              <a:rPr lang="en-US" sz="2400" kern="100" dirty="0">
-                <a:solidFill>
-                  <a:srgbClr val="000000"/>
-                </a:solidFill>
-                <a:effectLst/>
-                <a:latin typeface="Calibri" panose="020F0502020204030204" pitchFamily="34" charset="0"/>
-                <a:ea typeface="Calibri" panose="020F0502020204030204" pitchFamily="34" charset="0"/>
-                <a:cs typeface="Arial" panose="020B0604020202020204" pitchFamily="34" charset="0"/>
-              </a:rPr>
-              <a:t>The histogram shows a left-skewed distribution with outliers on the lower end of the number of bedrooms.</a:t>
-            </a:r>
-            <a:endParaRPr lang="en-US" sz="7200" dirty="0"/>
-          </a:p>
-        </p:txBody>
-      </p:sp>
-    </p:spTree>
-    <p:extLst>
-      <p:ext uri="{BB962C8B-B14F-4D97-AF65-F5344CB8AC3E}">
-        <p14:creationId xmlns:p14="http://schemas.microsoft.com/office/powerpoint/2010/main" val="3098079624"/>
       </p:ext>
     </p:extLst>
   </p:cSld>

</xml_diff>